<commit_message>
Update gov pro in branch 2023.1 (#90)
* Update of governance process
* Update workflow
* Add new action to the workflow
Add the possible action at the end of the Comitology procedure
* Add mentions of labels
</commit_message>
<xml_diff>
--- a/governance-release-process/governance_process_workflow.pptx
+++ b/governance-release-process/governance_process_workflow.pptx
@@ -11,7 +11,7 @@
     <p:handoutMasterId r:id="rId4"/>
   </p:handoutMasterIdLst>
   <p:sldIdLst>
-    <p:sldId id="266" r:id="rId2"/>
+    <p:sldId id="268" r:id="rId2"/>
   </p:sldIdLst>
   <p:sldSz cx="6858000" cy="12192000"/>
   <p:notesSz cx="6858000" cy="9144000"/>
@@ -129,6 +129,832 @@
 </p:presentation>
 </file>
 
+<file path=ppt/revisionInfo.xml><?xml version="1.0" encoding="utf-8"?>
+<p1510:revInfo xmlns:a="http://schemas.openxmlformats.org/drawingml/2006/main" xmlns:r="http://schemas.openxmlformats.org/officeDocument/2006/relationships" xmlns:p1510="http://schemas.microsoft.com/office/powerpoint/2015/10/main">
+  <p1510:revLst>
+    <p1510:client id="{2B2510D8-B5A3-44AC-BD20-F274C20EA16F}" v="6" dt="2023-01-18T11:52:27.542"/>
+  </p1510:revLst>
+</p1510:revInfo>
+</file>
+
+<file path=ppt/changesInfos/changesInfo1.xml><?xml version="1.0" encoding="utf-8"?>
+<pc:chgInfo xmlns:a="http://schemas.openxmlformats.org/drawingml/2006/main" xmlns:r="http://schemas.openxmlformats.org/officeDocument/2006/relationships" xmlns:ac="http://schemas.microsoft.com/office/drawing/2013/main/command" xmlns:pc="http://schemas.microsoft.com/office/powerpoint/2013/main/command">
+  <pc:docChgLst>
+    <pc:chgData name="Fabio Vinci" userId="2a8124e690d2756c" providerId="LiveId" clId="{31C23112-2DDE-4ECC-9385-8E7261994833}"/>
+    <pc:docChg chg="undo custSel modSld">
+      <pc:chgData name="Fabio Vinci" userId="2a8124e690d2756c" providerId="LiveId" clId="{31C23112-2DDE-4ECC-9385-8E7261994833}" dt="2022-12-13T17:27:20.572" v="480" actId="14100"/>
+      <pc:docMkLst>
+        <pc:docMk/>
+      </pc:docMkLst>
+      <pc:sldChg chg="addSp delSp modSp mod">
+        <pc:chgData name="Fabio Vinci" userId="2a8124e690d2756c" providerId="LiveId" clId="{31C23112-2DDE-4ECC-9385-8E7261994833}" dt="2022-12-13T17:27:20.572" v="480" actId="14100"/>
+        <pc:sldMkLst>
+          <pc:docMk/>
+          <pc:sldMk cId="1710378541" sldId="268"/>
+        </pc:sldMkLst>
+        <pc:spChg chg="add mod">
+          <ac:chgData name="Fabio Vinci" userId="2a8124e690d2756c" providerId="LiveId" clId="{31C23112-2DDE-4ECC-9385-8E7261994833}" dt="2022-12-13T17:12:21.880" v="247" actId="1037"/>
+          <ac:spMkLst>
+            <pc:docMk/>
+            <pc:sldMk cId="1710378541" sldId="268"/>
+            <ac:spMk id="8" creationId="{6474C2DA-6A96-21E0-C7D4-7FECA945ADF8}"/>
+          </ac:spMkLst>
+        </pc:spChg>
+        <pc:spChg chg="add mod">
+          <ac:chgData name="Fabio Vinci" userId="2a8124e690d2756c" providerId="LiveId" clId="{31C23112-2DDE-4ECC-9385-8E7261994833}" dt="2022-12-13T17:26:18.477" v="479" actId="1037"/>
+          <ac:spMkLst>
+            <pc:docMk/>
+            <pc:sldMk cId="1710378541" sldId="268"/>
+            <ac:spMk id="10" creationId="{F9AC6C59-F878-09DC-B071-2E8690CD74E6}"/>
+          </ac:spMkLst>
+        </pc:spChg>
+        <pc:spChg chg="add mod">
+          <ac:chgData name="Fabio Vinci" userId="2a8124e690d2756c" providerId="LiveId" clId="{31C23112-2DDE-4ECC-9385-8E7261994833}" dt="2022-12-13T17:26:18.477" v="479" actId="1037"/>
+          <ac:spMkLst>
+            <pc:docMk/>
+            <pc:sldMk cId="1710378541" sldId="268"/>
+            <ac:spMk id="13" creationId="{7B4BFC3E-0A02-EB34-7B13-B0998A090F9D}"/>
+          </ac:spMkLst>
+        </pc:spChg>
+        <pc:spChg chg="mod">
+          <ac:chgData name="Fabio Vinci" userId="2a8124e690d2756c" providerId="LiveId" clId="{31C23112-2DDE-4ECC-9385-8E7261994833}" dt="2022-12-13T17:24:00.100" v="310" actId="1036"/>
+          <ac:spMkLst>
+            <pc:docMk/>
+            <pc:sldMk cId="1710378541" sldId="268"/>
+            <ac:spMk id="16" creationId="{96AFF07E-3F28-A638-BCEB-29C7B54647E3}"/>
+          </ac:spMkLst>
+        </pc:spChg>
+        <pc:spChg chg="mod">
+          <ac:chgData name="Fabio Vinci" userId="2a8124e690d2756c" providerId="LiveId" clId="{31C23112-2DDE-4ECC-9385-8E7261994833}" dt="2022-12-13T17:17:05.831" v="273" actId="1076"/>
+          <ac:spMkLst>
+            <pc:docMk/>
+            <pc:sldMk cId="1710378541" sldId="268"/>
+            <ac:spMk id="18" creationId="{BEE7B066-2588-A17A-7CED-6ACC52963EF1}"/>
+          </ac:spMkLst>
+        </pc:spChg>
+        <pc:spChg chg="mod">
+          <ac:chgData name="Fabio Vinci" userId="2a8124e690d2756c" providerId="LiveId" clId="{31C23112-2DDE-4ECC-9385-8E7261994833}" dt="2022-12-13T17:19:45.368" v="279" actId="20577"/>
+          <ac:spMkLst>
+            <pc:docMk/>
+            <pc:sldMk cId="1710378541" sldId="268"/>
+            <ac:spMk id="32" creationId="{00000000-0000-0000-0000-000000000000}"/>
+          </ac:spMkLst>
+        </pc:spChg>
+        <pc:spChg chg="mod">
+          <ac:chgData name="Fabio Vinci" userId="2a8124e690d2756c" providerId="LiveId" clId="{31C23112-2DDE-4ECC-9385-8E7261994833}" dt="2022-12-13T17:16:38.699" v="268" actId="1076"/>
+          <ac:spMkLst>
+            <pc:docMk/>
+            <pc:sldMk cId="1710378541" sldId="268"/>
+            <ac:spMk id="52" creationId="{00000000-0000-0000-0000-000000000000}"/>
+          </ac:spMkLst>
+        </pc:spChg>
+        <pc:spChg chg="mod">
+          <ac:chgData name="Fabio Vinci" userId="2a8124e690d2756c" providerId="LiveId" clId="{31C23112-2DDE-4ECC-9385-8E7261994833}" dt="2022-12-13T17:18:09.597" v="276" actId="14100"/>
+          <ac:spMkLst>
+            <pc:docMk/>
+            <pc:sldMk cId="1710378541" sldId="268"/>
+            <ac:spMk id="54" creationId="{00000000-0000-0000-0000-000000000000}"/>
+          </ac:spMkLst>
+        </pc:spChg>
+        <pc:spChg chg="mod">
+          <ac:chgData name="Fabio Vinci" userId="2a8124e690d2756c" providerId="LiveId" clId="{31C23112-2DDE-4ECC-9385-8E7261994833}" dt="2022-12-13T17:25:10.927" v="403" actId="1035"/>
+          <ac:spMkLst>
+            <pc:docMk/>
+            <pc:sldMk cId="1710378541" sldId="268"/>
+            <ac:spMk id="90" creationId="{00000000-0000-0000-0000-000000000000}"/>
+          </ac:spMkLst>
+        </pc:spChg>
+        <pc:spChg chg="mod">
+          <ac:chgData name="Fabio Vinci" userId="2a8124e690d2756c" providerId="LiveId" clId="{31C23112-2DDE-4ECC-9385-8E7261994833}" dt="2022-12-13T17:24:55.711" v="397" actId="1035"/>
+          <ac:spMkLst>
+            <pc:docMk/>
+            <pc:sldMk cId="1710378541" sldId="268"/>
+            <ac:spMk id="91" creationId="{00000000-0000-0000-0000-000000000000}"/>
+          </ac:spMkLst>
+        </pc:spChg>
+        <pc:spChg chg="mod">
+          <ac:chgData name="Fabio Vinci" userId="2a8124e690d2756c" providerId="LiveId" clId="{31C23112-2DDE-4ECC-9385-8E7261994833}" dt="2022-12-13T17:24:55.711" v="397" actId="1035"/>
+          <ac:spMkLst>
+            <pc:docMk/>
+            <pc:sldMk cId="1710378541" sldId="268"/>
+            <ac:spMk id="92" creationId="{00000000-0000-0000-0000-000000000000}"/>
+          </ac:spMkLst>
+        </pc:spChg>
+        <pc:spChg chg="mod">
+          <ac:chgData name="Fabio Vinci" userId="2a8124e690d2756c" providerId="LiveId" clId="{31C23112-2DDE-4ECC-9385-8E7261994833}" dt="2022-12-13T17:25:34.348" v="404" actId="1076"/>
+          <ac:spMkLst>
+            <pc:docMk/>
+            <pc:sldMk cId="1710378541" sldId="268"/>
+            <ac:spMk id="98" creationId="{00000000-0000-0000-0000-000000000000}"/>
+          </ac:spMkLst>
+        </pc:spChg>
+        <pc:spChg chg="mod">
+          <ac:chgData name="Fabio Vinci" userId="2a8124e690d2756c" providerId="LiveId" clId="{31C23112-2DDE-4ECC-9385-8E7261994833}" dt="2022-12-13T17:25:47.982" v="445" actId="1036"/>
+          <ac:spMkLst>
+            <pc:docMk/>
+            <pc:sldMk cId="1710378541" sldId="268"/>
+            <ac:spMk id="100" creationId="{00000000-0000-0000-0000-000000000000}"/>
+          </ac:spMkLst>
+        </pc:spChg>
+        <pc:spChg chg="mod">
+          <ac:chgData name="Fabio Vinci" userId="2a8124e690d2756c" providerId="LiveId" clId="{31C23112-2DDE-4ECC-9385-8E7261994833}" dt="2022-12-13T17:25:47.982" v="445" actId="1036"/>
+          <ac:spMkLst>
+            <pc:docMk/>
+            <pc:sldMk cId="1710378541" sldId="268"/>
+            <ac:spMk id="130" creationId="{00000000-0000-0000-0000-000000000000}"/>
+          </ac:spMkLst>
+        </pc:spChg>
+        <pc:spChg chg="mod">
+          <ac:chgData name="Fabio Vinci" userId="2a8124e690d2756c" providerId="LiveId" clId="{31C23112-2DDE-4ECC-9385-8E7261994833}" dt="2022-12-13T17:24:55.711" v="397" actId="1035"/>
+          <ac:spMkLst>
+            <pc:docMk/>
+            <pc:sldMk cId="1710378541" sldId="268"/>
+            <ac:spMk id="131" creationId="{00000000-0000-0000-0000-000000000000}"/>
+          </ac:spMkLst>
+        </pc:spChg>
+        <pc:spChg chg="mod">
+          <ac:chgData name="Fabio Vinci" userId="2a8124e690d2756c" providerId="LiveId" clId="{31C23112-2DDE-4ECC-9385-8E7261994833}" dt="2022-12-13T17:24:44.438" v="374" actId="1037"/>
+          <ac:spMkLst>
+            <pc:docMk/>
+            <pc:sldMk cId="1710378541" sldId="268"/>
+            <ac:spMk id="132" creationId="{00000000-0000-0000-0000-000000000000}"/>
+          </ac:spMkLst>
+        </pc:spChg>
+        <pc:spChg chg="mod">
+          <ac:chgData name="Fabio Vinci" userId="2a8124e690d2756c" providerId="LiveId" clId="{31C23112-2DDE-4ECC-9385-8E7261994833}" dt="2022-12-13T17:24:25.191" v="340" actId="1038"/>
+          <ac:spMkLst>
+            <pc:docMk/>
+            <pc:sldMk cId="1710378541" sldId="268"/>
+            <ac:spMk id="133" creationId="{00000000-0000-0000-0000-000000000000}"/>
+          </ac:spMkLst>
+        </pc:spChg>
+        <pc:spChg chg="mod">
+          <ac:chgData name="Fabio Vinci" userId="2a8124e690d2756c" providerId="LiveId" clId="{31C23112-2DDE-4ECC-9385-8E7261994833}" dt="2022-12-13T17:24:44.438" v="374" actId="1037"/>
+          <ac:spMkLst>
+            <pc:docMk/>
+            <pc:sldMk cId="1710378541" sldId="268"/>
+            <ac:spMk id="136" creationId="{00000000-0000-0000-0000-000000000000}"/>
+          </ac:spMkLst>
+        </pc:spChg>
+        <pc:spChg chg="mod">
+          <ac:chgData name="Fabio Vinci" userId="2a8124e690d2756c" providerId="LiveId" clId="{31C23112-2DDE-4ECC-9385-8E7261994833}" dt="2022-12-13T17:16:07.588" v="267" actId="1037"/>
+          <ac:spMkLst>
+            <pc:docMk/>
+            <pc:sldMk cId="1710378541" sldId="268"/>
+            <ac:spMk id="142" creationId="{00000000-0000-0000-0000-000000000000}"/>
+          </ac:spMkLst>
+        </pc:spChg>
+        <pc:picChg chg="mod">
+          <ac:chgData name="Fabio Vinci" userId="2a8124e690d2756c" providerId="LiveId" clId="{31C23112-2DDE-4ECC-9385-8E7261994833}" dt="2022-12-13T17:19:49.117" v="289" actId="1038"/>
+          <ac:picMkLst>
+            <pc:docMk/>
+            <pc:sldMk cId="1710378541" sldId="268"/>
+            <ac:picMk id="40" creationId="{00000000-0000-0000-0000-000000000000}"/>
+          </ac:picMkLst>
+        </pc:picChg>
+        <pc:cxnChg chg="add mod">
+          <ac:chgData name="Fabio Vinci" userId="2a8124e690d2756c" providerId="LiveId" clId="{31C23112-2DDE-4ECC-9385-8E7261994833}" dt="2022-12-13T17:27:20.572" v="480" actId="14100"/>
+          <ac:cxnSpMkLst>
+            <pc:docMk/>
+            <pc:sldMk cId="1710378541" sldId="268"/>
+            <ac:cxnSpMk id="6" creationId="{87FA4D18-9130-6C63-48DD-63C5045BFFD0}"/>
+          </ac:cxnSpMkLst>
+        </pc:cxnChg>
+        <pc:cxnChg chg="del mod">
+          <ac:chgData name="Fabio Vinci" userId="2a8124e690d2756c" providerId="LiveId" clId="{31C23112-2DDE-4ECC-9385-8E7261994833}" dt="2022-12-13T17:15:40.646" v="259" actId="478"/>
+          <ac:cxnSpMkLst>
+            <pc:docMk/>
+            <pc:sldMk cId="1710378541" sldId="268"/>
+            <ac:cxnSpMk id="20" creationId="{ED76DC36-BA8A-110C-F705-A0B86A1EE13E}"/>
+          </ac:cxnSpMkLst>
+        </pc:cxnChg>
+        <pc:cxnChg chg="mod">
+          <ac:chgData name="Fabio Vinci" userId="2a8124e690d2756c" providerId="LiveId" clId="{31C23112-2DDE-4ECC-9385-8E7261994833}" dt="2022-12-13T17:24:55.711" v="397" actId="1035"/>
+          <ac:cxnSpMkLst>
+            <pc:docMk/>
+            <pc:sldMk cId="1710378541" sldId="268"/>
+            <ac:cxnSpMk id="25" creationId="{00000000-0000-0000-0000-000000000000}"/>
+          </ac:cxnSpMkLst>
+        </pc:cxnChg>
+        <pc:cxnChg chg="mod">
+          <ac:chgData name="Fabio Vinci" userId="2a8124e690d2756c" providerId="LiveId" clId="{31C23112-2DDE-4ECC-9385-8E7261994833}" dt="2022-12-13T17:25:34.348" v="404" actId="1076"/>
+          <ac:cxnSpMkLst>
+            <pc:docMk/>
+            <pc:sldMk cId="1710378541" sldId="268"/>
+            <ac:cxnSpMk id="31" creationId="{B2388BAB-3266-0889-FCFB-AF045DF4B67C}"/>
+          </ac:cxnSpMkLst>
+        </pc:cxnChg>
+        <pc:cxnChg chg="add mod">
+          <ac:chgData name="Fabio Vinci" userId="2a8124e690d2756c" providerId="LiveId" clId="{31C23112-2DDE-4ECC-9385-8E7261994833}" dt="2022-12-13T17:16:52.948" v="272" actId="33986"/>
+          <ac:cxnSpMkLst>
+            <pc:docMk/>
+            <pc:sldMk cId="1710378541" sldId="268"/>
+            <ac:cxnSpMk id="36" creationId="{F15951F4-414E-A332-4988-FFB640F67C64}"/>
+          </ac:cxnSpMkLst>
+        </pc:cxnChg>
+        <pc:cxnChg chg="mod">
+          <ac:chgData name="Fabio Vinci" userId="2a8124e690d2756c" providerId="LiveId" clId="{31C23112-2DDE-4ECC-9385-8E7261994833}" dt="2022-12-13T17:24:32.166" v="341" actId="14100"/>
+          <ac:cxnSpMkLst>
+            <pc:docMk/>
+            <pc:sldMk cId="1710378541" sldId="268"/>
+            <ac:cxnSpMk id="41" creationId="{FF15170E-5C68-616A-AE52-1CCD84B96C9F}"/>
+          </ac:cxnSpMkLst>
+        </pc:cxnChg>
+        <pc:cxnChg chg="mod">
+          <ac:chgData name="Fabio Vinci" userId="2a8124e690d2756c" providerId="LiveId" clId="{31C23112-2DDE-4ECC-9385-8E7261994833}" dt="2022-12-13T17:24:00.100" v="310" actId="1036"/>
+          <ac:cxnSpMkLst>
+            <pc:docMk/>
+            <pc:sldMk cId="1710378541" sldId="268"/>
+            <ac:cxnSpMk id="79" creationId="{00000000-0000-0000-0000-000000000000}"/>
+          </ac:cxnSpMkLst>
+        </pc:cxnChg>
+        <pc:cxnChg chg="mod">
+          <ac:chgData name="Fabio Vinci" userId="2a8124e690d2756c" providerId="LiveId" clId="{31C23112-2DDE-4ECC-9385-8E7261994833}" dt="2022-12-13T17:16:07.588" v="267" actId="1037"/>
+          <ac:cxnSpMkLst>
+            <pc:docMk/>
+            <pc:sldMk cId="1710378541" sldId="268"/>
+            <ac:cxnSpMk id="86" creationId="{00000000-0000-0000-0000-000000000000}"/>
+          </ac:cxnSpMkLst>
+        </pc:cxnChg>
+        <pc:cxnChg chg="mod">
+          <ac:chgData name="Fabio Vinci" userId="2a8124e690d2756c" providerId="LiveId" clId="{31C23112-2DDE-4ECC-9385-8E7261994833}" dt="2022-12-13T17:25:10.927" v="403" actId="1035"/>
+          <ac:cxnSpMkLst>
+            <pc:docMk/>
+            <pc:sldMk cId="1710378541" sldId="268"/>
+            <ac:cxnSpMk id="89" creationId="{00000000-0000-0000-0000-000000000000}"/>
+          </ac:cxnSpMkLst>
+        </pc:cxnChg>
+        <pc:cxnChg chg="mod">
+          <ac:chgData name="Fabio Vinci" userId="2a8124e690d2756c" providerId="LiveId" clId="{31C23112-2DDE-4ECC-9385-8E7261994833}" dt="2022-12-13T17:16:07.588" v="267" actId="1037"/>
+          <ac:cxnSpMkLst>
+            <pc:docMk/>
+            <pc:sldMk cId="1710378541" sldId="268"/>
+            <ac:cxnSpMk id="103" creationId="{00000000-0000-0000-0000-000000000000}"/>
+          </ac:cxnSpMkLst>
+        </pc:cxnChg>
+        <pc:cxnChg chg="mod">
+          <ac:chgData name="Fabio Vinci" userId="2a8124e690d2756c" providerId="LiveId" clId="{31C23112-2DDE-4ECC-9385-8E7261994833}" dt="2022-12-13T17:16:07.588" v="267" actId="1037"/>
+          <ac:cxnSpMkLst>
+            <pc:docMk/>
+            <pc:sldMk cId="1710378541" sldId="268"/>
+            <ac:cxnSpMk id="112" creationId="{00000000-0000-0000-0000-000000000000}"/>
+          </ac:cxnSpMkLst>
+        </pc:cxnChg>
+      </pc:sldChg>
+    </pc:docChg>
+  </pc:docChgLst>
+  <pc:docChgLst>
+    <pc:chgData name="Fabio Vinci" userId="2a8124e690d2756c" providerId="LiveId" clId="{D28B7F33-6154-4348-B192-02B2F5C2ED63}"/>
+    <pc:docChg chg="undo custSel addSld delSld modSld">
+      <pc:chgData name="Fabio Vinci" userId="2a8124e690d2756c" providerId="LiveId" clId="{D28B7F33-6154-4348-B192-02B2F5C2ED63}" dt="2022-12-07T13:52:31.494" v="396" actId="47"/>
+      <pc:docMkLst>
+        <pc:docMk/>
+      </pc:docMkLst>
+      <pc:sldChg chg="addSp modSp del mod">
+        <pc:chgData name="Fabio Vinci" userId="2a8124e690d2756c" providerId="LiveId" clId="{D28B7F33-6154-4348-B192-02B2F5C2ED63}" dt="2022-12-07T11:49:26.537" v="334" actId="47"/>
+        <pc:sldMkLst>
+          <pc:docMk/>
+          <pc:sldMk cId="1058563292" sldId="266"/>
+        </pc:sldMkLst>
+        <pc:spChg chg="mod">
+          <ac:chgData name="Fabio Vinci" userId="2a8124e690d2756c" providerId="LiveId" clId="{D28B7F33-6154-4348-B192-02B2F5C2ED63}" dt="2022-12-07T11:18:52.987" v="10" actId="12788"/>
+          <ac:spMkLst>
+            <pc:docMk/>
+            <pc:sldMk cId="1058563292" sldId="266"/>
+            <ac:spMk id="7" creationId="{00000000-0000-0000-0000-000000000000}"/>
+          </ac:spMkLst>
+        </pc:spChg>
+        <pc:spChg chg="mod">
+          <ac:chgData name="Fabio Vinci" userId="2a8124e690d2756c" providerId="LiveId" clId="{D28B7F33-6154-4348-B192-02B2F5C2ED63}" dt="2022-12-07T11:19:18.329" v="20" actId="1076"/>
+          <ac:spMkLst>
+            <pc:docMk/>
+            <pc:sldMk cId="1058563292" sldId="266"/>
+            <ac:spMk id="11" creationId="{00000000-0000-0000-0000-000000000000}"/>
+          </ac:spMkLst>
+        </pc:spChg>
+        <pc:spChg chg="add mod">
+          <ac:chgData name="Fabio Vinci" userId="2a8124e690d2756c" providerId="LiveId" clId="{D28B7F33-6154-4348-B192-02B2F5C2ED63}" dt="2022-12-07T11:17:14.008" v="2" actId="571"/>
+          <ac:spMkLst>
+            <pc:docMk/>
+            <pc:sldMk cId="1058563292" sldId="266"/>
+            <ac:spMk id="20" creationId="{C5818C6F-B571-E329-E8C6-E01AEC7050C5}"/>
+          </ac:spMkLst>
+        </pc:spChg>
+        <pc:spChg chg="add mod">
+          <ac:chgData name="Fabio Vinci" userId="2a8124e690d2756c" providerId="LiveId" clId="{D28B7F33-6154-4348-B192-02B2F5C2ED63}" dt="2022-12-07T11:17:14.008" v="2" actId="571"/>
+          <ac:spMkLst>
+            <pc:docMk/>
+            <pc:sldMk cId="1058563292" sldId="266"/>
+            <ac:spMk id="21" creationId="{3482B6CF-7290-5E38-3459-8134F4DA4F71}"/>
+          </ac:spMkLst>
+        </pc:spChg>
+        <pc:spChg chg="mod">
+          <ac:chgData name="Fabio Vinci" userId="2a8124e690d2756c" providerId="LiveId" clId="{D28B7F33-6154-4348-B192-02B2F5C2ED63}" dt="2022-12-07T11:19:31.211" v="22" actId="14100"/>
+          <ac:spMkLst>
+            <pc:docMk/>
+            <pc:sldMk cId="1058563292" sldId="266"/>
+            <ac:spMk id="32" creationId="{00000000-0000-0000-0000-000000000000}"/>
+          </ac:spMkLst>
+        </pc:spChg>
+        <pc:spChg chg="mod">
+          <ac:chgData name="Fabio Vinci" userId="2a8124e690d2756c" providerId="LiveId" clId="{D28B7F33-6154-4348-B192-02B2F5C2ED63}" dt="2022-12-07T11:20:41.837" v="26" actId="14100"/>
+          <ac:spMkLst>
+            <pc:docMk/>
+            <pc:sldMk cId="1058563292" sldId="266"/>
+            <ac:spMk id="67" creationId="{00000000-0000-0000-0000-000000000000}"/>
+          </ac:spMkLst>
+        </pc:spChg>
+        <pc:spChg chg="mod">
+          <ac:chgData name="Fabio Vinci" userId="2a8124e690d2756c" providerId="LiveId" clId="{D28B7F33-6154-4348-B192-02B2F5C2ED63}" dt="2022-12-07T11:21:16.686" v="36" actId="1037"/>
+          <ac:spMkLst>
+            <pc:docMk/>
+            <pc:sldMk cId="1058563292" sldId="266"/>
+            <ac:spMk id="109" creationId="{00000000-0000-0000-0000-000000000000}"/>
+          </ac:spMkLst>
+        </pc:spChg>
+        <pc:spChg chg="mod">
+          <ac:chgData name="Fabio Vinci" userId="2a8124e690d2756c" providerId="LiveId" clId="{D28B7F33-6154-4348-B192-02B2F5C2ED63}" dt="2022-12-07T11:20:53.049" v="28" actId="14100"/>
+          <ac:spMkLst>
+            <pc:docMk/>
+            <pc:sldMk cId="1058563292" sldId="266"/>
+            <ac:spMk id="126" creationId="{00000000-0000-0000-0000-000000000000}"/>
+          </ac:spMkLst>
+        </pc:spChg>
+        <pc:spChg chg="mod">
+          <ac:chgData name="Fabio Vinci" userId="2a8124e690d2756c" providerId="LiveId" clId="{D28B7F33-6154-4348-B192-02B2F5C2ED63}" dt="2022-12-07T11:21:39.426" v="54" actId="1038"/>
+          <ac:spMkLst>
+            <pc:docMk/>
+            <pc:sldMk cId="1058563292" sldId="266"/>
+            <ac:spMk id="127" creationId="{00000000-0000-0000-0000-000000000000}"/>
+          </ac:spMkLst>
+        </pc:spChg>
+        <pc:spChg chg="mod">
+          <ac:chgData name="Fabio Vinci" userId="2a8124e690d2756c" providerId="LiveId" clId="{D28B7F33-6154-4348-B192-02B2F5C2ED63}" dt="2022-12-07T11:21:47.379" v="56" actId="14100"/>
+          <ac:spMkLst>
+            <pc:docMk/>
+            <pc:sldMk cId="1058563292" sldId="266"/>
+            <ac:spMk id="130" creationId="{00000000-0000-0000-0000-000000000000}"/>
+          </ac:spMkLst>
+        </pc:spChg>
+        <pc:spChg chg="mod">
+          <ac:chgData name="Fabio Vinci" userId="2a8124e690d2756c" providerId="LiveId" clId="{D28B7F33-6154-4348-B192-02B2F5C2ED63}" dt="2022-12-07T11:21:22.495" v="38" actId="14100"/>
+          <ac:spMkLst>
+            <pc:docMk/>
+            <pc:sldMk cId="1058563292" sldId="266"/>
+            <ac:spMk id="137" creationId="{00000000-0000-0000-0000-000000000000}"/>
+          </ac:spMkLst>
+        </pc:spChg>
+        <pc:picChg chg="mod">
+          <ac:chgData name="Fabio Vinci" userId="2a8124e690d2756c" providerId="LiveId" clId="{D28B7F33-6154-4348-B192-02B2F5C2ED63}" dt="2022-12-07T11:19:35.930" v="23" actId="1076"/>
+          <ac:picMkLst>
+            <pc:docMk/>
+            <pc:sldMk cId="1058563292" sldId="266"/>
+            <ac:picMk id="39" creationId="{00000000-0000-0000-0000-000000000000}"/>
+          </ac:picMkLst>
+        </pc:picChg>
+        <pc:picChg chg="mod">
+          <ac:chgData name="Fabio Vinci" userId="2a8124e690d2756c" providerId="LiveId" clId="{D28B7F33-6154-4348-B192-02B2F5C2ED63}" dt="2022-12-07T11:19:42.939" v="24" actId="1076"/>
+          <ac:picMkLst>
+            <pc:docMk/>
+            <pc:sldMk cId="1058563292" sldId="266"/>
+            <ac:picMk id="40" creationId="{00000000-0000-0000-0000-000000000000}"/>
+          </ac:picMkLst>
+        </pc:picChg>
+        <pc:cxnChg chg="mod">
+          <ac:chgData name="Fabio Vinci" userId="2a8124e690d2756c" providerId="LiveId" clId="{D28B7F33-6154-4348-B192-02B2F5C2ED63}" dt="2022-12-07T11:18:52.987" v="10" actId="12788"/>
+          <ac:cxnSpMkLst>
+            <pc:docMk/>
+            <pc:sldMk cId="1058563292" sldId="266"/>
+            <ac:cxnSpMk id="5" creationId="{00000000-0000-0000-0000-000000000000}"/>
+          </ac:cxnSpMkLst>
+        </pc:cxnChg>
+        <pc:cxnChg chg="mod">
+          <ac:chgData name="Fabio Vinci" userId="2a8124e690d2756c" providerId="LiveId" clId="{D28B7F33-6154-4348-B192-02B2F5C2ED63}" dt="2022-12-07T11:19:18.329" v="20" actId="1076"/>
+          <ac:cxnSpMkLst>
+            <pc:docMk/>
+            <pc:sldMk cId="1058563292" sldId="266"/>
+            <ac:cxnSpMk id="9" creationId="{00000000-0000-0000-0000-000000000000}"/>
+          </ac:cxnSpMkLst>
+        </pc:cxnChg>
+        <pc:cxnChg chg="mod">
+          <ac:chgData name="Fabio Vinci" userId="2a8124e690d2756c" providerId="LiveId" clId="{D28B7F33-6154-4348-B192-02B2F5C2ED63}" dt="2022-12-07T11:19:18.329" v="20" actId="1076"/>
+          <ac:cxnSpMkLst>
+            <pc:docMk/>
+            <pc:sldMk cId="1058563292" sldId="266"/>
+            <ac:cxnSpMk id="77" creationId="{00000000-0000-0000-0000-000000000000}"/>
+          </ac:cxnSpMkLst>
+        </pc:cxnChg>
+        <pc:cxnChg chg="mod">
+          <ac:chgData name="Fabio Vinci" userId="2a8124e690d2756c" providerId="LiveId" clId="{D28B7F33-6154-4348-B192-02B2F5C2ED63}" dt="2022-12-07T11:18:52.987" v="10" actId="12788"/>
+          <ac:cxnSpMkLst>
+            <pc:docMk/>
+            <pc:sldMk cId="1058563292" sldId="266"/>
+            <ac:cxnSpMk id="143" creationId="{00000000-0000-0000-0000-000000000000}"/>
+          </ac:cxnSpMkLst>
+        </pc:cxnChg>
+        <pc:cxnChg chg="mod">
+          <ac:chgData name="Fabio Vinci" userId="2a8124e690d2756c" providerId="LiveId" clId="{D28B7F33-6154-4348-B192-02B2F5C2ED63}" dt="2022-12-07T11:18:52.987" v="10" actId="12788"/>
+          <ac:cxnSpMkLst>
+            <pc:docMk/>
+            <pc:sldMk cId="1058563292" sldId="266"/>
+            <ac:cxnSpMk id="144" creationId="{00000000-0000-0000-0000-000000000000}"/>
+          </ac:cxnSpMkLst>
+        </pc:cxnChg>
+        <pc:cxnChg chg="mod">
+          <ac:chgData name="Fabio Vinci" userId="2a8124e690d2756c" providerId="LiveId" clId="{D28B7F33-6154-4348-B192-02B2F5C2ED63}" dt="2022-12-07T11:18:52.987" v="10" actId="12788"/>
+          <ac:cxnSpMkLst>
+            <pc:docMk/>
+            <pc:sldMk cId="1058563292" sldId="266"/>
+            <ac:cxnSpMk id="145" creationId="{00000000-0000-0000-0000-000000000000}"/>
+          </ac:cxnSpMkLst>
+        </pc:cxnChg>
+        <pc:cxnChg chg="mod">
+          <ac:chgData name="Fabio Vinci" userId="2a8124e690d2756c" providerId="LiveId" clId="{D28B7F33-6154-4348-B192-02B2F5C2ED63}" dt="2022-12-07T11:20:41.837" v="26" actId="14100"/>
+          <ac:cxnSpMkLst>
+            <pc:docMk/>
+            <pc:sldMk cId="1058563292" sldId="266"/>
+            <ac:cxnSpMk id="153" creationId="{00000000-0000-0000-0000-000000000000}"/>
+          </ac:cxnSpMkLst>
+        </pc:cxnChg>
+        <pc:cxnChg chg="mod">
+          <ac:chgData name="Fabio Vinci" userId="2a8124e690d2756c" providerId="LiveId" clId="{D28B7F33-6154-4348-B192-02B2F5C2ED63}" dt="2022-12-07T11:20:41.837" v="26" actId="14100"/>
+          <ac:cxnSpMkLst>
+            <pc:docMk/>
+            <pc:sldMk cId="1058563292" sldId="266"/>
+            <ac:cxnSpMk id="156" creationId="{00000000-0000-0000-0000-000000000000}"/>
+          </ac:cxnSpMkLst>
+        </pc:cxnChg>
+      </pc:sldChg>
+      <pc:sldChg chg="addSp delSp modSp add del mod">
+        <pc:chgData name="Fabio Vinci" userId="2a8124e690d2756c" providerId="LiveId" clId="{D28B7F33-6154-4348-B192-02B2F5C2ED63}" dt="2022-12-07T11:52:01.921" v="377" actId="2696"/>
+        <pc:sldMkLst>
+          <pc:docMk/>
+          <pc:sldMk cId="2978882511" sldId="267"/>
+        </pc:sldMkLst>
+        <pc:spChg chg="add del mod">
+          <ac:chgData name="Fabio Vinci" userId="2a8124e690d2756c" providerId="LiveId" clId="{D28B7F33-6154-4348-B192-02B2F5C2ED63}" dt="2022-12-07T11:50:16.926" v="339" actId="478"/>
+          <ac:spMkLst>
+            <pc:docMk/>
+            <pc:sldMk cId="2978882511" sldId="267"/>
+            <ac:spMk id="16" creationId="{96AFF07E-3F28-A638-BCEB-29C7B54647E3}"/>
+          </ac:spMkLst>
+        </pc:spChg>
+        <pc:spChg chg="add mod">
+          <ac:chgData name="Fabio Vinci" userId="2a8124e690d2756c" providerId="LiveId" clId="{D28B7F33-6154-4348-B192-02B2F5C2ED63}" dt="2022-12-07T11:37:08.586" v="312" actId="20577"/>
+          <ac:spMkLst>
+            <pc:docMk/>
+            <pc:sldMk cId="2978882511" sldId="267"/>
+            <ac:spMk id="18" creationId="{BEE7B066-2588-A17A-7CED-6ACC52963EF1}"/>
+          </ac:spMkLst>
+        </pc:spChg>
+        <pc:spChg chg="mod">
+          <ac:chgData name="Fabio Vinci" userId="2a8124e690d2756c" providerId="LiveId" clId="{D28B7F33-6154-4348-B192-02B2F5C2ED63}" dt="2022-12-07T11:38:29.844" v="326" actId="1076"/>
+          <ac:spMkLst>
+            <pc:docMk/>
+            <pc:sldMk cId="2978882511" sldId="267"/>
+            <ac:spMk id="54" creationId="{00000000-0000-0000-0000-000000000000}"/>
+          </ac:spMkLst>
+        </pc:spChg>
+        <pc:spChg chg="add del mod">
+          <ac:chgData name="Fabio Vinci" userId="2a8124e690d2756c" providerId="LiveId" clId="{D28B7F33-6154-4348-B192-02B2F5C2ED63}" dt="2022-12-07T11:50:08.081" v="337" actId="478"/>
+          <ac:spMkLst>
+            <pc:docMk/>
+            <pc:sldMk cId="2978882511" sldId="267"/>
+            <ac:spMk id="60" creationId="{82B4057F-5DD3-2721-D3A9-5C6655DA7F22}"/>
+          </ac:spMkLst>
+        </pc:spChg>
+        <pc:spChg chg="mod topLvl">
+          <ac:chgData name="Fabio Vinci" userId="2a8124e690d2756c" providerId="LiveId" clId="{D28B7F33-6154-4348-B192-02B2F5C2ED63}" dt="2022-12-07T11:35:47.186" v="292" actId="1035"/>
+          <ac:spMkLst>
+            <pc:docMk/>
+            <pc:sldMk cId="2978882511" sldId="267"/>
+            <ac:spMk id="91" creationId="{00000000-0000-0000-0000-000000000000}"/>
+          </ac:spMkLst>
+        </pc:spChg>
+        <pc:spChg chg="mod topLvl">
+          <ac:chgData name="Fabio Vinci" userId="2a8124e690d2756c" providerId="LiveId" clId="{D28B7F33-6154-4348-B192-02B2F5C2ED63}" dt="2022-12-07T11:35:38.078" v="276" actId="1076"/>
+          <ac:spMkLst>
+            <pc:docMk/>
+            <pc:sldMk cId="2978882511" sldId="267"/>
+            <ac:spMk id="92" creationId="{00000000-0000-0000-0000-000000000000}"/>
+          </ac:spMkLst>
+        </pc:spChg>
+        <pc:spChg chg="mod topLvl">
+          <ac:chgData name="Fabio Vinci" userId="2a8124e690d2756c" providerId="LiveId" clId="{D28B7F33-6154-4348-B192-02B2F5C2ED63}" dt="2022-12-07T11:35:24.309" v="275" actId="1076"/>
+          <ac:spMkLst>
+            <pc:docMk/>
+            <pc:sldMk cId="2978882511" sldId="267"/>
+            <ac:spMk id="98" creationId="{00000000-0000-0000-0000-000000000000}"/>
+          </ac:spMkLst>
+        </pc:spChg>
+        <pc:spChg chg="mod topLvl">
+          <ac:chgData name="Fabio Vinci" userId="2a8124e690d2756c" providerId="LiveId" clId="{D28B7F33-6154-4348-B192-02B2F5C2ED63}" dt="2022-12-07T11:32:36.501" v="257" actId="1076"/>
+          <ac:spMkLst>
+            <pc:docMk/>
+            <pc:sldMk cId="2978882511" sldId="267"/>
+            <ac:spMk id="100" creationId="{00000000-0000-0000-0000-000000000000}"/>
+          </ac:spMkLst>
+        </pc:spChg>
+        <pc:spChg chg="mod topLvl">
+          <ac:chgData name="Fabio Vinci" userId="2a8124e690d2756c" providerId="LiveId" clId="{D28B7F33-6154-4348-B192-02B2F5C2ED63}" dt="2022-12-07T11:32:41.370" v="258" actId="1076"/>
+          <ac:spMkLst>
+            <pc:docMk/>
+            <pc:sldMk cId="2978882511" sldId="267"/>
+            <ac:spMk id="130" creationId="{00000000-0000-0000-0000-000000000000}"/>
+          </ac:spMkLst>
+        </pc:spChg>
+        <pc:spChg chg="mod topLvl">
+          <ac:chgData name="Fabio Vinci" userId="2a8124e690d2756c" providerId="LiveId" clId="{D28B7F33-6154-4348-B192-02B2F5C2ED63}" dt="2022-12-07T11:35:47.186" v="292" actId="1035"/>
+          <ac:spMkLst>
+            <pc:docMk/>
+            <pc:sldMk cId="2978882511" sldId="267"/>
+            <ac:spMk id="131" creationId="{00000000-0000-0000-0000-000000000000}"/>
+          </ac:spMkLst>
+        </pc:spChg>
+        <pc:spChg chg="mod topLvl">
+          <ac:chgData name="Fabio Vinci" userId="2a8124e690d2756c" providerId="LiveId" clId="{D28B7F33-6154-4348-B192-02B2F5C2ED63}" dt="2022-12-07T11:33:46.902" v="267" actId="1076"/>
+          <ac:spMkLst>
+            <pc:docMk/>
+            <pc:sldMk cId="2978882511" sldId="267"/>
+            <ac:spMk id="132" creationId="{00000000-0000-0000-0000-000000000000}"/>
+          </ac:spMkLst>
+        </pc:spChg>
+        <pc:spChg chg="mod topLvl">
+          <ac:chgData name="Fabio Vinci" userId="2a8124e690d2756c" providerId="LiveId" clId="{D28B7F33-6154-4348-B192-02B2F5C2ED63}" dt="2022-12-07T11:33:38.797" v="265" actId="1076"/>
+          <ac:spMkLst>
+            <pc:docMk/>
+            <pc:sldMk cId="2978882511" sldId="267"/>
+            <ac:spMk id="133" creationId="{00000000-0000-0000-0000-000000000000}"/>
+          </ac:spMkLst>
+        </pc:spChg>
+        <pc:spChg chg="mod topLvl">
+          <ac:chgData name="Fabio Vinci" userId="2a8124e690d2756c" providerId="LiveId" clId="{D28B7F33-6154-4348-B192-02B2F5C2ED63}" dt="2022-12-07T11:33:42.159" v="266" actId="1076"/>
+          <ac:spMkLst>
+            <pc:docMk/>
+            <pc:sldMk cId="2978882511" sldId="267"/>
+            <ac:spMk id="136" creationId="{00000000-0000-0000-0000-000000000000}"/>
+          </ac:spMkLst>
+        </pc:spChg>
+        <pc:grpChg chg="add mod">
+          <ac:chgData name="Fabio Vinci" userId="2a8124e690d2756c" providerId="LiveId" clId="{D28B7F33-6154-4348-B192-02B2F5C2ED63}" dt="2022-12-07T11:28:29.744" v="144" actId="164"/>
+          <ac:grpSpMkLst>
+            <pc:docMk/>
+            <pc:sldMk cId="2978882511" sldId="267"/>
+            <ac:grpSpMk id="4" creationId="{E4BA8430-135B-22E8-9622-6FC46906C663}"/>
+          </ac:grpSpMkLst>
+        </pc:grpChg>
+        <pc:grpChg chg="add del mod">
+          <ac:chgData name="Fabio Vinci" userId="2a8124e690d2756c" providerId="LiveId" clId="{D28B7F33-6154-4348-B192-02B2F5C2ED63}" dt="2022-12-07T11:31:39.747" v="251" actId="165"/>
+          <ac:grpSpMkLst>
+            <pc:docMk/>
+            <pc:sldMk cId="2978882511" sldId="267"/>
+            <ac:grpSpMk id="6" creationId="{4BB7B2CF-7856-84BB-C56F-CAB136A995A9}"/>
+          </ac:grpSpMkLst>
+        </pc:grpChg>
+        <pc:cxnChg chg="add del mod">
+          <ac:chgData name="Fabio Vinci" userId="2a8124e690d2756c" providerId="LiveId" clId="{D28B7F33-6154-4348-B192-02B2F5C2ED63}" dt="2022-12-07T11:50:13.571" v="338" actId="478"/>
+          <ac:cxnSpMkLst>
+            <pc:docMk/>
+            <pc:sldMk cId="2978882511" sldId="267"/>
+            <ac:cxnSpMk id="20" creationId="{ED76DC36-BA8A-110C-F705-A0B86A1EE13E}"/>
+          </ac:cxnSpMkLst>
+        </pc:cxnChg>
+        <pc:cxnChg chg="mod">
+          <ac:chgData name="Fabio Vinci" userId="2a8124e690d2756c" providerId="LiveId" clId="{D28B7F33-6154-4348-B192-02B2F5C2ED63}" dt="2022-12-07T11:51:11.154" v="366" actId="14100"/>
+          <ac:cxnSpMkLst>
+            <pc:docMk/>
+            <pc:sldMk cId="2978882511" sldId="267"/>
+            <ac:cxnSpMk id="25" creationId="{00000000-0000-0000-0000-000000000000}"/>
+          </ac:cxnSpMkLst>
+        </pc:cxnChg>
+        <pc:cxnChg chg="add del mod">
+          <ac:chgData name="Fabio Vinci" userId="2a8124e690d2756c" providerId="LiveId" clId="{D28B7F33-6154-4348-B192-02B2F5C2ED63}" dt="2022-12-07T11:50:04.870" v="336" actId="478"/>
+          <ac:cxnSpMkLst>
+            <pc:docMk/>
+            <pc:sldMk cId="2978882511" sldId="267"/>
+            <ac:cxnSpMk id="26" creationId="{EAE04681-FCAD-4F86-5CF1-BDDCCB023D54}"/>
+          </ac:cxnSpMkLst>
+        </pc:cxnChg>
+        <pc:cxnChg chg="add mod">
+          <ac:chgData name="Fabio Vinci" userId="2a8124e690d2756c" providerId="LiveId" clId="{D28B7F33-6154-4348-B192-02B2F5C2ED63}" dt="2022-12-07T11:51:35.683" v="376" actId="14100"/>
+          <ac:cxnSpMkLst>
+            <pc:docMk/>
+            <pc:sldMk cId="2978882511" sldId="267"/>
+            <ac:cxnSpMk id="31" creationId="{B2388BAB-3266-0889-FCFB-AF045DF4B67C}"/>
+          </ac:cxnSpMkLst>
+        </pc:cxnChg>
+        <pc:cxnChg chg="add mod">
+          <ac:chgData name="Fabio Vinci" userId="2a8124e690d2756c" providerId="LiveId" clId="{D28B7F33-6154-4348-B192-02B2F5C2ED63}" dt="2022-12-07T11:50:25.362" v="340" actId="14100"/>
+          <ac:cxnSpMkLst>
+            <pc:docMk/>
+            <pc:sldMk cId="2978882511" sldId="267"/>
+            <ac:cxnSpMk id="41" creationId="{FF15170E-5C68-616A-AE52-1CCD84B96C9F}"/>
+          </ac:cxnSpMkLst>
+        </pc:cxnChg>
+        <pc:cxnChg chg="add del mod">
+          <ac:chgData name="Fabio Vinci" userId="2a8124e690d2756c" providerId="LiveId" clId="{D28B7F33-6154-4348-B192-02B2F5C2ED63}" dt="2022-12-07T11:36:21.573" v="296"/>
+          <ac:cxnSpMkLst>
+            <pc:docMk/>
+            <pc:sldMk cId="2978882511" sldId="267"/>
+            <ac:cxnSpMk id="57" creationId="{A91F0934-7B20-3BAB-EBAA-D45C8BCE9887}"/>
+          </ac:cxnSpMkLst>
+        </pc:cxnChg>
+        <pc:cxnChg chg="del mod">
+          <ac:chgData name="Fabio Vinci" userId="2a8124e690d2756c" providerId="LiveId" clId="{D28B7F33-6154-4348-B192-02B2F5C2ED63}" dt="2022-12-07T11:32:18.944" v="256" actId="478"/>
+          <ac:cxnSpMkLst>
+            <pc:docMk/>
+            <pc:sldMk cId="2978882511" sldId="267"/>
+            <ac:cxnSpMk id="99" creationId="{00000000-0000-0000-0000-000000000000}"/>
+          </ac:cxnSpMkLst>
+        </pc:cxnChg>
+        <pc:cxnChg chg="del mod">
+          <ac:chgData name="Fabio Vinci" userId="2a8124e690d2756c" providerId="LiveId" clId="{D28B7F33-6154-4348-B192-02B2F5C2ED63}" dt="2022-12-07T11:34:43.303" v="269" actId="478"/>
+          <ac:cxnSpMkLst>
+            <pc:docMk/>
+            <pc:sldMk cId="2978882511" sldId="267"/>
+            <ac:cxnSpMk id="135" creationId="{00000000-0000-0000-0000-000000000000}"/>
+          </ac:cxnSpMkLst>
+        </pc:cxnChg>
+      </pc:sldChg>
+      <pc:sldChg chg="delSp modSp add mod">
+        <pc:chgData name="Fabio Vinci" userId="2a8124e690d2756c" providerId="LiveId" clId="{D28B7F33-6154-4348-B192-02B2F5C2ED63}" dt="2022-12-07T12:08:44.039" v="393" actId="14100"/>
+        <pc:sldMkLst>
+          <pc:docMk/>
+          <pc:sldMk cId="1710378541" sldId="268"/>
+        </pc:sldMkLst>
+        <pc:spChg chg="del">
+          <ac:chgData name="Fabio Vinci" userId="2a8124e690d2756c" providerId="LiveId" clId="{D28B7F33-6154-4348-B192-02B2F5C2ED63}" dt="2022-12-07T11:52:17.358" v="379" actId="478"/>
+          <ac:spMkLst>
+            <pc:docMk/>
+            <pc:sldMk cId="1710378541" sldId="268"/>
+            <ac:spMk id="60" creationId="{82B4057F-5DD3-2721-D3A9-5C6655DA7F22}"/>
+          </ac:spMkLst>
+        </pc:spChg>
+        <pc:spChg chg="mod">
+          <ac:chgData name="Fabio Vinci" userId="2a8124e690d2756c" providerId="LiveId" clId="{D28B7F33-6154-4348-B192-02B2F5C2ED63}" dt="2022-12-07T11:53:33.614" v="387" actId="1076"/>
+          <ac:spMkLst>
+            <pc:docMk/>
+            <pc:sldMk cId="1710378541" sldId="268"/>
+            <ac:spMk id="98" creationId="{00000000-0000-0000-0000-000000000000}"/>
+          </ac:spMkLst>
+        </pc:spChg>
+        <pc:cxnChg chg="mod">
+          <ac:chgData name="Fabio Vinci" userId="2a8124e690d2756c" providerId="LiveId" clId="{D28B7F33-6154-4348-B192-02B2F5C2ED63}" dt="2022-12-07T11:54:16.438" v="392" actId="14100"/>
+          <ac:cxnSpMkLst>
+            <pc:docMk/>
+            <pc:sldMk cId="1710378541" sldId="268"/>
+            <ac:cxnSpMk id="25" creationId="{00000000-0000-0000-0000-000000000000}"/>
+          </ac:cxnSpMkLst>
+        </pc:cxnChg>
+        <pc:cxnChg chg="del mod">
+          <ac:chgData name="Fabio Vinci" userId="2a8124e690d2756c" providerId="LiveId" clId="{D28B7F33-6154-4348-B192-02B2F5C2ED63}" dt="2022-12-07T11:52:18.406" v="380" actId="478"/>
+          <ac:cxnSpMkLst>
+            <pc:docMk/>
+            <pc:sldMk cId="1710378541" sldId="268"/>
+            <ac:cxnSpMk id="26" creationId="{EAE04681-FCAD-4F86-5CF1-BDDCCB023D54}"/>
+          </ac:cxnSpMkLst>
+        </pc:cxnChg>
+        <pc:cxnChg chg="mod">
+          <ac:chgData name="Fabio Vinci" userId="2a8124e690d2756c" providerId="LiveId" clId="{D28B7F33-6154-4348-B192-02B2F5C2ED63}" dt="2022-12-07T12:08:44.039" v="393" actId="14100"/>
+          <ac:cxnSpMkLst>
+            <pc:docMk/>
+            <pc:sldMk cId="1710378541" sldId="268"/>
+            <ac:cxnSpMk id="31" creationId="{B2388BAB-3266-0889-FCFB-AF045DF4B67C}"/>
+          </ac:cxnSpMkLst>
+        </pc:cxnChg>
+      </pc:sldChg>
+      <pc:sldChg chg="add del">
+        <pc:chgData name="Fabio Vinci" userId="2a8124e690d2756c" providerId="LiveId" clId="{D28B7F33-6154-4348-B192-02B2F5C2ED63}" dt="2022-12-07T13:52:31.494" v="396" actId="47"/>
+        <pc:sldMkLst>
+          <pc:docMk/>
+          <pc:sldMk cId="481329869" sldId="269"/>
+        </pc:sldMkLst>
+      </pc:sldChg>
+    </pc:docChg>
+  </pc:docChgLst>
+  <pc:docChgLst>
+    <pc:chgData name="Fabio Vinci" userId="2a8124e690d2756c" providerId="LiveId" clId="{2B2510D8-B5A3-44AC-BD20-F274C20EA16F}"/>
+    <pc:docChg chg="custSel modSld">
+      <pc:chgData name="Fabio Vinci" userId="2a8124e690d2756c" providerId="LiveId" clId="{2B2510D8-B5A3-44AC-BD20-F274C20EA16F}" dt="2023-01-18T11:54:52.131" v="262" actId="14100"/>
+      <pc:docMkLst>
+        <pc:docMk/>
+      </pc:docMkLst>
+      <pc:sldChg chg="addSp delSp modSp mod">
+        <pc:chgData name="Fabio Vinci" userId="2a8124e690d2756c" providerId="LiveId" clId="{2B2510D8-B5A3-44AC-BD20-F274C20EA16F}" dt="2023-01-18T11:54:52.131" v="262" actId="14100"/>
+        <pc:sldMkLst>
+          <pc:docMk/>
+          <pc:sldMk cId="1710378541" sldId="268"/>
+        </pc:sldMkLst>
+        <pc:spChg chg="mod">
+          <ac:chgData name="Fabio Vinci" userId="2a8124e690d2756c" providerId="LiveId" clId="{2B2510D8-B5A3-44AC-BD20-F274C20EA16F}" dt="2023-01-18T11:41:16.573" v="75" actId="1037"/>
+          <ac:spMkLst>
+            <pc:docMk/>
+            <pc:sldMk cId="1710378541" sldId="268"/>
+            <ac:spMk id="10" creationId="{F9AC6C59-F878-09DC-B071-2E8690CD74E6}"/>
+          </ac:spMkLst>
+        </pc:spChg>
+        <pc:spChg chg="mod">
+          <ac:chgData name="Fabio Vinci" userId="2a8124e690d2756c" providerId="LiveId" clId="{2B2510D8-B5A3-44AC-BD20-F274C20EA16F}" dt="2023-01-18T11:41:16.573" v="75" actId="1037"/>
+          <ac:spMkLst>
+            <pc:docMk/>
+            <pc:sldMk cId="1710378541" sldId="268"/>
+            <ac:spMk id="13" creationId="{7B4BFC3E-0A02-EB34-7B13-B0998A090F9D}"/>
+          </ac:spMkLst>
+        </pc:spChg>
+        <pc:spChg chg="mod">
+          <ac:chgData name="Fabio Vinci" userId="2a8124e690d2756c" providerId="LiveId" clId="{2B2510D8-B5A3-44AC-BD20-F274C20EA16F}" dt="2023-01-18T11:40:59.819" v="44" actId="1036"/>
+          <ac:spMkLst>
+            <pc:docMk/>
+            <pc:sldMk cId="1710378541" sldId="268"/>
+            <ac:spMk id="16" creationId="{96AFF07E-3F28-A638-BCEB-29C7B54647E3}"/>
+          </ac:spMkLst>
+        </pc:spChg>
+        <pc:spChg chg="add mod">
+          <ac:chgData name="Fabio Vinci" userId="2a8124e690d2756c" providerId="LiveId" clId="{2B2510D8-B5A3-44AC-BD20-F274C20EA16F}" dt="2023-01-18T11:44:34.869" v="181" actId="1035"/>
+          <ac:spMkLst>
+            <pc:docMk/>
+            <pc:sldMk cId="1710378541" sldId="268"/>
+            <ac:spMk id="24" creationId="{9813C827-84DE-3FA6-9FC3-C074A56944FA}"/>
+          </ac:spMkLst>
+        </pc:spChg>
+        <pc:spChg chg="add mod">
+          <ac:chgData name="Fabio Vinci" userId="2a8124e690d2756c" providerId="LiveId" clId="{2B2510D8-B5A3-44AC-BD20-F274C20EA16F}" dt="2023-01-18T11:54:52.131" v="262" actId="14100"/>
+          <ac:spMkLst>
+            <pc:docMk/>
+            <pc:sldMk cId="1710378541" sldId="268"/>
+            <ac:spMk id="26" creationId="{E57540F4-5344-D4A0-FD0F-74E90FC1D31F}"/>
+          </ac:spMkLst>
+        </pc:spChg>
+        <pc:spChg chg="mod">
+          <ac:chgData name="Fabio Vinci" userId="2a8124e690d2756c" providerId="LiveId" clId="{2B2510D8-B5A3-44AC-BD20-F274C20EA16F}" dt="2023-01-18T11:41:56.378" v="81" actId="1076"/>
+          <ac:spMkLst>
+            <pc:docMk/>
+            <pc:sldMk cId="1710378541" sldId="268"/>
+            <ac:spMk id="129" creationId="{00000000-0000-0000-0000-000000000000}"/>
+          </ac:spMkLst>
+        </pc:spChg>
+        <pc:cxnChg chg="mod">
+          <ac:chgData name="Fabio Vinci" userId="2a8124e690d2756c" providerId="LiveId" clId="{2B2510D8-B5A3-44AC-BD20-F274C20EA16F}" dt="2023-01-18T11:40:59.819" v="44" actId="1036"/>
+          <ac:cxnSpMkLst>
+            <pc:docMk/>
+            <pc:sldMk cId="1710378541" sldId="268"/>
+            <ac:cxnSpMk id="6" creationId="{87FA4D18-9130-6C63-48DD-63C5045BFFD0}"/>
+          </ac:cxnSpMkLst>
+        </pc:cxnChg>
+        <pc:cxnChg chg="add mod">
+          <ac:chgData name="Fabio Vinci" userId="2a8124e690d2756c" providerId="LiveId" clId="{2B2510D8-B5A3-44AC-BD20-F274C20EA16F}" dt="2023-01-18T11:50:36.577" v="182" actId="693"/>
+          <ac:cxnSpMkLst>
+            <pc:docMk/>
+            <pc:sldMk cId="1710378541" sldId="268"/>
+            <ac:cxnSpMk id="15" creationId="{50834D82-B7A7-CA75-F723-C1602FD794EF}"/>
+          </ac:cxnSpMkLst>
+        </pc:cxnChg>
+        <pc:cxnChg chg="add del mod">
+          <ac:chgData name="Fabio Vinci" userId="2a8124e690d2756c" providerId="LiveId" clId="{2B2510D8-B5A3-44AC-BD20-F274C20EA16F}" dt="2023-01-18T11:42:14.830" v="83"/>
+          <ac:cxnSpMkLst>
+            <pc:docMk/>
+            <pc:sldMk cId="1710378541" sldId="268"/>
+            <ac:cxnSpMk id="23" creationId="{0F8FF3FE-4814-6ADC-BC2E-2ED11B4F0A00}"/>
+          </ac:cxnSpMkLst>
+        </pc:cxnChg>
+        <pc:cxnChg chg="mod">
+          <ac:chgData name="Fabio Vinci" userId="2a8124e690d2756c" providerId="LiveId" clId="{2B2510D8-B5A3-44AC-BD20-F274C20EA16F}" dt="2023-01-18T11:40:59.819" v="44" actId="1036"/>
+          <ac:cxnSpMkLst>
+            <pc:docMk/>
+            <pc:sldMk cId="1710378541" sldId="268"/>
+            <ac:cxnSpMk id="25" creationId="{00000000-0000-0000-0000-000000000000}"/>
+          </ac:cxnSpMkLst>
+        </pc:cxnChg>
+        <pc:cxnChg chg="mod">
+          <ac:chgData name="Fabio Vinci" userId="2a8124e690d2756c" providerId="LiveId" clId="{2B2510D8-B5A3-44AC-BD20-F274C20EA16F}" dt="2023-01-18T11:40:59.819" v="44" actId="1036"/>
+          <ac:cxnSpMkLst>
+            <pc:docMk/>
+            <pc:sldMk cId="1710378541" sldId="268"/>
+            <ac:cxnSpMk id="31" creationId="{B2388BAB-3266-0889-FCFB-AF045DF4B67C}"/>
+          </ac:cxnSpMkLst>
+        </pc:cxnChg>
+        <pc:cxnChg chg="mod">
+          <ac:chgData name="Fabio Vinci" userId="2a8124e690d2756c" providerId="LiveId" clId="{2B2510D8-B5A3-44AC-BD20-F274C20EA16F}" dt="2023-01-18T11:40:59.819" v="44" actId="1036"/>
+          <ac:cxnSpMkLst>
+            <pc:docMk/>
+            <pc:sldMk cId="1710378541" sldId="268"/>
+            <ac:cxnSpMk id="41" creationId="{FF15170E-5C68-616A-AE52-1CCD84B96C9F}"/>
+          </ac:cxnSpMkLst>
+        </pc:cxnChg>
+        <pc:cxnChg chg="mod">
+          <ac:chgData name="Fabio Vinci" userId="2a8124e690d2756c" providerId="LiveId" clId="{2B2510D8-B5A3-44AC-BD20-F274C20EA16F}" dt="2023-01-18T11:41:23.390" v="76" actId="14100"/>
+          <ac:cxnSpMkLst>
+            <pc:docMk/>
+            <pc:sldMk cId="1710378541" sldId="268"/>
+            <ac:cxnSpMk id="79" creationId="{00000000-0000-0000-0000-000000000000}"/>
+          </ac:cxnSpMkLst>
+        </pc:cxnChg>
+      </pc:sldChg>
+    </pc:docChg>
+  </pc:docChgLst>
+</pc:chgInfo>
+</file>
+
 <file path=ppt/handoutMasters/handoutMaster1.xml><?xml version="1.0" encoding="utf-8"?>
 <p:handoutMaster xmlns:a="http://schemas.openxmlformats.org/drawingml/2006/main" xmlns:r="http://schemas.openxmlformats.org/officeDocument/2006/relationships" xmlns:p="http://schemas.openxmlformats.org/presentationml/2006/main">
   <p:cSld>
@@ -211,7 +1037,7 @@
           <a:p>
             <a:fld id="{3A939EFE-0303-44F6-9A16-FD3B5E015DB1}" type="datetimeFigureOut">
               <a:rPr lang="en-GB" smtClean="0"/>
-              <a:t>29/10/2021</a:t>
+              <a:t>18/01/2023</a:t>
             </a:fld>
             <a:endParaRPr lang="en-GB"/>
           </a:p>
@@ -277,7 +1103,7 @@
           <a:p>
             <a:fld id="{C4F04766-77AF-4EBE-9704-229FD5F6AD6A}" type="slidenum">
               <a:rPr lang="en-GB" smtClean="0"/>
-              <a:t>‹#›</a:t>
+              <a:t>‹N›</a:t>
             </a:fld>
             <a:endParaRPr lang="en-GB"/>
           </a:p>
@@ -377,7 +1203,7 @@
           <a:p>
             <a:fld id="{A3B926D1-0013-4A80-B64E-9D824EE65210}" type="datetimeFigureOut">
               <a:rPr lang="en-GB" smtClean="0"/>
-              <a:t>29/10/2021</a:t>
+              <a:t>18/01/2023</a:t>
             </a:fld>
             <a:endParaRPr lang="en-GB"/>
           </a:p>
@@ -536,7 +1362,7 @@
           <a:p>
             <a:fld id="{59CF2995-AB43-4B7C-B8CD-9DC7C3692A9C}" type="slidenum">
               <a:rPr lang="en-GB" smtClean="0"/>
-              <a:t>‹#›</a:t>
+              <a:t>‹N›</a:t>
             </a:fld>
             <a:endParaRPr lang="en-GB"/>
           </a:p>
@@ -682,7 +1508,7 @@
           <a:p>
             <a:fld id="{F46C79FD-C571-418B-AB0F-5EE936C85276}" type="slidenum">
               <a:rPr lang="en-GB" smtClean="0"/>
-              <a:t>‹#›</a:t>
+              <a:t>‹N›</a:t>
             </a:fld>
             <a:endParaRPr lang="en-GB"/>
           </a:p>
@@ -849,7 +1675,7 @@
           </a:lstStyle>
           <a:p>
             <a:r>
-              <a:rPr lang="en-US" smtClean="0"/>
+              <a:rPr lang="en-US"/>
               <a:t>Click to edit Master title style</a:t>
             </a:r>
             <a:endParaRPr lang="en-GB" dirty="0"/>
@@ -1003,7 +1829,7 @@
           </a:lstStyle>
           <a:p>
             <a:r>
-              <a:rPr lang="en-US" smtClean="0"/>
+              <a:rPr lang="en-US"/>
               <a:t>Click to edit Master subtitle style</a:t>
             </a:r>
             <a:endParaRPr lang="en-GB" dirty="0"/>
@@ -1044,7 +1870,7 @@
           <a:p>
             <a:pPr lvl="0"/>
             <a:r>
-              <a:rPr lang="en-US" smtClean="0"/>
+              <a:rPr lang="en-US"/>
               <a:t>Edit Master text styles</a:t>
             </a:r>
           </a:p>
@@ -1060,7 +1886,7 @@
   <p:clrMapOvr>
     <a:masterClrMapping/>
   </p:clrMapOvr>
-  <p:extLst mod="1">
+  <p:extLst>
     <p:ext uri="{DCECCB84-F9BA-43D5-87BE-67443E8EF086}">
       <p15:sldGuideLst xmlns:p15="http://schemas.microsoft.com/office/powerpoint/2012/main">
         <p15:guide id="1" orient="horz" pos="3840" userDrawn="1">
@@ -1127,35 +1953,35 @@
           <a:p>
             <a:pPr lvl="0"/>
             <a:r>
-              <a:rPr lang="en-US" smtClean="0"/>
+              <a:rPr lang="en-US"/>
               <a:t>Edit Master text styles</a:t>
             </a:r>
           </a:p>
           <a:p>
             <a:pPr lvl="1"/>
             <a:r>
-              <a:rPr lang="en-US" smtClean="0"/>
+              <a:rPr lang="en-US"/>
               <a:t>Second level</a:t>
             </a:r>
           </a:p>
           <a:p>
             <a:pPr lvl="2"/>
             <a:r>
-              <a:rPr lang="en-US" smtClean="0"/>
+              <a:rPr lang="en-US"/>
               <a:t>Third level</a:t>
             </a:r>
           </a:p>
           <a:p>
             <a:pPr lvl="3"/>
             <a:r>
-              <a:rPr lang="en-US" smtClean="0"/>
+              <a:rPr lang="en-US"/>
               <a:t>Fourth level</a:t>
             </a:r>
           </a:p>
           <a:p>
             <a:pPr lvl="4"/>
             <a:r>
-              <a:rPr lang="en-US" smtClean="0"/>
+              <a:rPr lang="en-US"/>
               <a:t>Fifth level</a:t>
             </a:r>
             <a:endParaRPr lang="en-GB" dirty="0"/>
@@ -1186,35 +2012,35 @@
           <a:p>
             <a:pPr lvl="0"/>
             <a:r>
-              <a:rPr lang="en-US" smtClean="0"/>
+              <a:rPr lang="en-US"/>
               <a:t>Edit Master text styles</a:t>
             </a:r>
           </a:p>
           <a:p>
             <a:pPr lvl="1"/>
             <a:r>
-              <a:rPr lang="en-US" smtClean="0"/>
+              <a:rPr lang="en-US"/>
               <a:t>Second level</a:t>
             </a:r>
           </a:p>
           <a:p>
             <a:pPr lvl="2"/>
             <a:r>
-              <a:rPr lang="en-US" smtClean="0"/>
+              <a:rPr lang="en-US"/>
               <a:t>Third level</a:t>
             </a:r>
           </a:p>
           <a:p>
             <a:pPr lvl="3"/>
             <a:r>
-              <a:rPr lang="en-US" smtClean="0"/>
+              <a:rPr lang="en-US"/>
               <a:t>Fourth level</a:t>
             </a:r>
           </a:p>
           <a:p>
             <a:pPr lvl="4"/>
             <a:r>
-              <a:rPr lang="en-US" smtClean="0"/>
+              <a:rPr lang="en-US"/>
               <a:t>Fifth level</a:t>
             </a:r>
             <a:endParaRPr lang="en-GB" dirty="0"/>
@@ -1238,7 +2064,7 @@
           <a:p>
             <a:fld id="{F46C79FD-C571-418B-AB0F-5EE936C85276}" type="slidenum">
               <a:rPr lang="en-GB" smtClean="0"/>
-              <a:t>‹#›</a:t>
+              <a:t>‹N›</a:t>
             </a:fld>
             <a:endParaRPr lang="en-GB"/>
           </a:p>
@@ -1305,7 +2131,7 @@
           <a:lstStyle/>
           <a:p>
             <a:r>
-              <a:rPr lang="en-US" smtClean="0"/>
+              <a:rPr lang="en-US"/>
               <a:t>Click to edit Master title style</a:t>
             </a:r>
             <a:endParaRPr lang="en-GB" dirty="0"/>
@@ -1366,35 +2192,35 @@
           <a:p>
             <a:pPr lvl="0"/>
             <a:r>
-              <a:rPr lang="en-US" smtClean="0"/>
+              <a:rPr lang="en-US"/>
               <a:t>Edit Master text styles</a:t>
             </a:r>
           </a:p>
           <a:p>
             <a:pPr lvl="1"/>
             <a:r>
-              <a:rPr lang="en-US" smtClean="0"/>
+              <a:rPr lang="en-US"/>
               <a:t>Second level</a:t>
             </a:r>
           </a:p>
           <a:p>
             <a:pPr lvl="2"/>
             <a:r>
-              <a:rPr lang="en-US" smtClean="0"/>
+              <a:rPr lang="en-US"/>
               <a:t>Third level</a:t>
             </a:r>
           </a:p>
           <a:p>
             <a:pPr lvl="3"/>
             <a:r>
-              <a:rPr lang="en-US" smtClean="0"/>
+              <a:rPr lang="en-US"/>
               <a:t>Fourth level</a:t>
             </a:r>
           </a:p>
           <a:p>
             <a:pPr lvl="4"/>
             <a:r>
-              <a:rPr lang="en-US" smtClean="0"/>
+              <a:rPr lang="en-US"/>
               <a:t>Fifth level</a:t>
             </a:r>
             <a:endParaRPr lang="en-GB" dirty="0"/>
@@ -1420,7 +2246,7 @@
           <a:p>
             <a:fld id="{F46C79FD-C571-418B-AB0F-5EE936C85276}" type="slidenum">
               <a:rPr lang="en-GB" smtClean="0"/>
-              <a:t>‹#›</a:t>
+              <a:t>‹N›</a:t>
             </a:fld>
             <a:endParaRPr lang="en-GB"/>
           </a:p>
@@ -1450,35 +2276,35 @@
           <a:p>
             <a:pPr lvl="0"/>
             <a:r>
-              <a:rPr lang="en-US" smtClean="0"/>
+              <a:rPr lang="en-US"/>
               <a:t>Edit Master text styles</a:t>
             </a:r>
           </a:p>
           <a:p>
             <a:pPr lvl="1"/>
             <a:r>
-              <a:rPr lang="en-US" smtClean="0"/>
+              <a:rPr lang="en-US"/>
               <a:t>Second level</a:t>
             </a:r>
           </a:p>
           <a:p>
             <a:pPr lvl="2"/>
             <a:r>
-              <a:rPr lang="en-US" smtClean="0"/>
+              <a:rPr lang="en-US"/>
               <a:t>Third level</a:t>
             </a:r>
           </a:p>
           <a:p>
             <a:pPr lvl="3"/>
             <a:r>
-              <a:rPr lang="en-US" smtClean="0"/>
+              <a:rPr lang="en-US"/>
               <a:t>Fourth level</a:t>
             </a:r>
           </a:p>
           <a:p>
             <a:pPr lvl="4"/>
             <a:r>
-              <a:rPr lang="en-US" smtClean="0"/>
+              <a:rPr lang="en-US"/>
               <a:t>Fifth level</a:t>
             </a:r>
             <a:endParaRPr lang="en-GB" dirty="0"/>
@@ -1509,35 +2335,35 @@
           <a:p>
             <a:pPr lvl="0"/>
             <a:r>
-              <a:rPr lang="en-US" smtClean="0"/>
+              <a:rPr lang="en-US"/>
               <a:t>Edit Master text styles</a:t>
             </a:r>
           </a:p>
           <a:p>
             <a:pPr lvl="1"/>
             <a:r>
-              <a:rPr lang="en-US" smtClean="0"/>
+              <a:rPr lang="en-US"/>
               <a:t>Second level</a:t>
             </a:r>
           </a:p>
           <a:p>
             <a:pPr lvl="2"/>
             <a:r>
-              <a:rPr lang="en-US" smtClean="0"/>
+              <a:rPr lang="en-US"/>
               <a:t>Third level</a:t>
             </a:r>
           </a:p>
           <a:p>
             <a:pPr lvl="3"/>
             <a:r>
-              <a:rPr lang="en-US" smtClean="0"/>
+              <a:rPr lang="en-US"/>
               <a:t>Fourth level</a:t>
             </a:r>
           </a:p>
           <a:p>
             <a:pPr lvl="4"/>
             <a:r>
-              <a:rPr lang="en-US" smtClean="0"/>
+              <a:rPr lang="en-US"/>
               <a:t>Fifth level</a:t>
             </a:r>
             <a:endParaRPr lang="en-GB" dirty="0"/>
@@ -1605,7 +2431,7 @@
           <a:lstStyle/>
           <a:p>
             <a:r>
-              <a:rPr lang="en-US" smtClean="0"/>
+              <a:rPr lang="en-US"/>
               <a:t>Click to edit Master title style</a:t>
             </a:r>
             <a:endParaRPr lang="en-GB" dirty="0"/>
@@ -1707,7 +2533,7 @@
           <a:p>
             <a:pPr lvl="0"/>
             <a:r>
-              <a:rPr lang="en-US" smtClean="0"/>
+              <a:rPr lang="en-US"/>
               <a:t>Edit Master text styles</a:t>
             </a:r>
           </a:p>
@@ -1737,35 +2563,35 @@
           <a:p>
             <a:pPr lvl="0"/>
             <a:r>
-              <a:rPr lang="en-US" smtClean="0"/>
+              <a:rPr lang="en-US"/>
               <a:t>Edit Master text styles</a:t>
             </a:r>
           </a:p>
           <a:p>
             <a:pPr lvl="1"/>
             <a:r>
-              <a:rPr lang="en-US" smtClean="0"/>
+              <a:rPr lang="en-US"/>
               <a:t>Second level</a:t>
             </a:r>
           </a:p>
           <a:p>
             <a:pPr lvl="2"/>
             <a:r>
-              <a:rPr lang="en-US" smtClean="0"/>
+              <a:rPr lang="en-US"/>
               <a:t>Third level</a:t>
             </a:r>
           </a:p>
           <a:p>
             <a:pPr lvl="3"/>
             <a:r>
-              <a:rPr lang="en-US" smtClean="0"/>
+              <a:rPr lang="en-US"/>
               <a:t>Fourth level</a:t>
             </a:r>
           </a:p>
           <a:p>
             <a:pPr lvl="4"/>
             <a:r>
-              <a:rPr lang="en-US" smtClean="0"/>
+              <a:rPr lang="en-US"/>
               <a:t>Fifth level</a:t>
             </a:r>
             <a:endParaRPr lang="en-GB" dirty="0"/>
@@ -1838,7 +2664,7 @@
           <a:p>
             <a:pPr lvl="0"/>
             <a:r>
-              <a:rPr lang="en-US" smtClean="0"/>
+              <a:rPr lang="en-US"/>
               <a:t>Edit Master text styles</a:t>
             </a:r>
           </a:p>
@@ -1868,35 +2694,35 @@
           <a:p>
             <a:pPr lvl="0"/>
             <a:r>
-              <a:rPr lang="en-US" smtClean="0"/>
+              <a:rPr lang="en-US"/>
               <a:t>Edit Master text styles</a:t>
             </a:r>
           </a:p>
           <a:p>
             <a:pPr lvl="1"/>
             <a:r>
-              <a:rPr lang="en-US" smtClean="0"/>
+              <a:rPr lang="en-US"/>
               <a:t>Second level</a:t>
             </a:r>
           </a:p>
           <a:p>
             <a:pPr lvl="2"/>
             <a:r>
-              <a:rPr lang="en-US" smtClean="0"/>
+              <a:rPr lang="en-US"/>
               <a:t>Third level</a:t>
             </a:r>
           </a:p>
           <a:p>
             <a:pPr lvl="3"/>
             <a:r>
-              <a:rPr lang="en-US" smtClean="0"/>
+              <a:rPr lang="en-US"/>
               <a:t>Fourth level</a:t>
             </a:r>
           </a:p>
           <a:p>
             <a:pPr lvl="4"/>
             <a:r>
-              <a:rPr lang="en-US" smtClean="0"/>
+              <a:rPr lang="en-US"/>
               <a:t>Fifth level</a:t>
             </a:r>
             <a:endParaRPr lang="en-GB" dirty="0"/>
@@ -1922,7 +2748,7 @@
           <a:p>
             <a:fld id="{F46C79FD-C571-418B-AB0F-5EE936C85276}" type="slidenum">
               <a:rPr lang="en-GB" smtClean="0"/>
-              <a:t>‹#›</a:t>
+              <a:t>‹N›</a:t>
             </a:fld>
             <a:endParaRPr lang="en-GB"/>
           </a:p>
@@ -1989,7 +2815,7 @@
           <a:lstStyle/>
           <a:p>
             <a:r>
-              <a:rPr lang="en-US" smtClean="0"/>
+              <a:rPr lang="en-US"/>
               <a:t>Click to edit Master title style</a:t>
             </a:r>
             <a:endParaRPr lang="en-GB" dirty="0"/>
@@ -2043,7 +2869,7 @@
           <a:p>
             <a:fld id="{F46C79FD-C571-418B-AB0F-5EE936C85276}" type="slidenum">
               <a:rPr lang="en-GB" smtClean="0"/>
-              <a:t>‹#›</a:t>
+              <a:t>‹N›</a:t>
             </a:fld>
             <a:endParaRPr lang="en-GB"/>
           </a:p>
@@ -2110,7 +2936,7 @@
           <a:lstStyle/>
           <a:p>
             <a:r>
-              <a:rPr lang="en-US" smtClean="0"/>
+              <a:rPr lang="en-US"/>
               <a:t>Click to edit Master title style</a:t>
             </a:r>
             <a:endParaRPr lang="en-GB" dirty="0"/>
@@ -2176,7 +3002,7 @@
           <a:lstStyle/>
           <a:p>
             <a:r>
-              <a:rPr lang="en-US" smtClean="0"/>
+              <a:rPr lang="en-US"/>
               <a:t>Click icon to add picture</a:t>
             </a:r>
             <a:endParaRPr lang="en-GB" dirty="0"/>
@@ -2296,7 +3122,7 @@
           <a:p>
             <a:pPr lvl="0"/>
             <a:r>
-              <a:rPr lang="en-US" smtClean="0"/>
+              <a:rPr lang="en-US"/>
               <a:t>Edit Master text styles</a:t>
             </a:r>
           </a:p>
@@ -2312,7 +3138,7 @@
   <p:clrMapOvr>
     <a:masterClrMapping/>
   </p:clrMapOvr>
-  <p:extLst mod="1">
+  <p:extLst>
     <p:ext uri="{DCECCB84-F9BA-43D5-87BE-67443E8EF086}">
       <p15:sldGuideLst xmlns:p15="http://schemas.microsoft.com/office/powerpoint/2012/main">
         <p15:guide id="1" orient="horz" pos="3840" userDrawn="1">
@@ -2372,35 +3198,35 @@
           <a:p>
             <a:pPr lvl="0"/>
             <a:r>
-              <a:rPr lang="en-US" smtClean="0"/>
+              <a:rPr lang="en-US"/>
               <a:t>Edit Master text styles</a:t>
             </a:r>
           </a:p>
           <a:p>
             <a:pPr lvl="1"/>
             <a:r>
-              <a:rPr lang="en-US" smtClean="0"/>
+              <a:rPr lang="en-US"/>
               <a:t>Second level</a:t>
             </a:r>
           </a:p>
           <a:p>
             <a:pPr lvl="2"/>
             <a:r>
-              <a:rPr lang="en-US" smtClean="0"/>
+              <a:rPr lang="en-US"/>
               <a:t>Third level</a:t>
             </a:r>
           </a:p>
           <a:p>
             <a:pPr lvl="3"/>
             <a:r>
-              <a:rPr lang="en-US" smtClean="0"/>
+              <a:rPr lang="en-US"/>
               <a:t>Fourth level</a:t>
             </a:r>
           </a:p>
           <a:p>
             <a:pPr lvl="4"/>
             <a:r>
-              <a:rPr lang="en-US" smtClean="0"/>
+              <a:rPr lang="en-US"/>
               <a:t>Fifth level</a:t>
             </a:r>
             <a:endParaRPr lang="en-GB" dirty="0"/>
@@ -2424,7 +3250,7 @@
           <a:p>
             <a:fld id="{F46C79FD-C571-418B-AB0F-5EE936C85276}" type="slidenum">
               <a:rPr lang="en-GB" smtClean="0"/>
-              <a:t>‹#›</a:t>
+              <a:t>‹N›</a:t>
             </a:fld>
             <a:endParaRPr lang="en-GB"/>
           </a:p>
@@ -2456,7 +3282,7 @@
           <a:lstStyle/>
           <a:p>
             <a:r>
-              <a:rPr lang="en-US" smtClean="0"/>
+              <a:rPr lang="en-US"/>
               <a:t>Click to edit Master title style</a:t>
             </a:r>
             <a:endParaRPr lang="en-GB" dirty="0"/>
@@ -2492,7 +3318,7 @@
           <a:lstStyle/>
           <a:p>
             <a:r>
-              <a:rPr lang="en-US" smtClean="0"/>
+              <a:rPr lang="en-US"/>
               <a:t>Click icon to add picture</a:t>
             </a:r>
             <a:endParaRPr lang="en-GB" dirty="0"/>
@@ -2509,7 +3335,7 @@
   <p:clrMapOvr>
     <a:masterClrMapping/>
   </p:clrMapOvr>
-  <p:extLst mod="1">
+  <p:extLst>
     <p:ext uri="{DCECCB84-F9BA-43D5-87BE-67443E8EF086}">
       <p15:sldGuideLst xmlns:p15="http://schemas.microsoft.com/office/powerpoint/2012/main">
         <p15:guide id="1" orient="horz" pos="3840" userDrawn="1">
@@ -2562,7 +3388,7 @@
           <a:p>
             <a:fld id="{F46C79FD-C571-418B-AB0F-5EE936C85276}" type="slidenum">
               <a:rPr lang="en-GB" smtClean="0"/>
-              <a:t>‹#›</a:t>
+              <a:t>‹N›</a:t>
             </a:fld>
             <a:endParaRPr lang="en-GB"/>
           </a:p>
@@ -2629,7 +3455,7 @@
           <a:lstStyle/>
           <a:p>
             <a:r>
-              <a:rPr lang="en-US" smtClean="0"/>
+              <a:rPr lang="en-US"/>
               <a:t>Click to edit Master title style</a:t>
             </a:r>
             <a:endParaRPr lang="en-GB" dirty="0"/>
@@ -2660,7 +3486,7 @@
           <a:lstStyle/>
           <a:p>
             <a:r>
-              <a:rPr lang="en-US" smtClean="0"/>
+              <a:rPr lang="en-US"/>
               <a:t>Click icon to add picture</a:t>
             </a:r>
             <a:endParaRPr lang="en-GB"/>
@@ -2691,7 +3517,7 @@
           <a:lstStyle/>
           <a:p>
             <a:r>
-              <a:rPr lang="en-US" smtClean="0"/>
+              <a:rPr lang="en-US"/>
               <a:t>Click icon to add picture</a:t>
             </a:r>
             <a:endParaRPr lang="en-GB"/>
@@ -2722,7 +3548,7 @@
           <a:lstStyle/>
           <a:p>
             <a:r>
-              <a:rPr lang="en-US" smtClean="0"/>
+              <a:rPr lang="en-US"/>
               <a:t>Click icon to add picture</a:t>
             </a:r>
             <a:endParaRPr lang="en-GB"/>
@@ -2759,7 +3585,7 @@
           <a:p>
             <a:pPr lvl="0"/>
             <a:r>
-              <a:rPr lang="en-US" smtClean="0"/>
+              <a:rPr lang="en-US"/>
               <a:t>Edit Master text styles</a:t>
             </a:r>
           </a:p>
@@ -2795,7 +3621,7 @@
           <a:p>
             <a:pPr lvl="0"/>
             <a:r>
-              <a:rPr lang="en-US" smtClean="0"/>
+              <a:rPr lang="en-US"/>
               <a:t>Edit Master text styles</a:t>
             </a:r>
           </a:p>
@@ -2831,7 +3657,7 @@
           <a:p>
             <a:pPr lvl="0"/>
             <a:r>
-              <a:rPr lang="en-US" smtClean="0"/>
+              <a:rPr lang="en-US"/>
               <a:t>Edit Master text styles</a:t>
             </a:r>
           </a:p>
@@ -2884,7 +3710,7 @@
           <a:p>
             <a:fld id="{F46C79FD-C571-418B-AB0F-5EE936C85276}" type="slidenum">
               <a:rPr lang="en-GB" smtClean="0"/>
-              <a:t>‹#›</a:t>
+              <a:t>‹N›</a:t>
             </a:fld>
             <a:endParaRPr lang="en-GB"/>
           </a:p>
@@ -2951,7 +3777,7 @@
           <a:lstStyle/>
           <a:p>
             <a:r>
-              <a:rPr lang="en-US" smtClean="0"/>
+              <a:rPr lang="en-US"/>
               <a:t>Click to edit Master title style</a:t>
             </a:r>
             <a:endParaRPr lang="en-GB" dirty="0"/>
@@ -2982,7 +3808,7 @@
           <a:lstStyle/>
           <a:p>
             <a:r>
-              <a:rPr lang="en-US" smtClean="0"/>
+              <a:rPr lang="en-US"/>
               <a:t>Click icon to add picture</a:t>
             </a:r>
             <a:endParaRPr lang="en-GB"/>
@@ -3013,7 +3839,7 @@
           <a:lstStyle/>
           <a:p>
             <a:r>
-              <a:rPr lang="en-US" smtClean="0"/>
+              <a:rPr lang="en-US"/>
               <a:t>Click icon to add picture</a:t>
             </a:r>
             <a:endParaRPr lang="en-GB"/>
@@ -3044,7 +3870,7 @@
           <a:lstStyle/>
           <a:p>
             <a:r>
-              <a:rPr lang="en-US" smtClean="0"/>
+              <a:rPr lang="en-US"/>
               <a:t>Click icon to add picture</a:t>
             </a:r>
             <a:endParaRPr lang="en-GB"/>
@@ -3079,7 +3905,7 @@
           <a:p>
             <a:pPr lvl="0"/>
             <a:r>
-              <a:rPr lang="en-US" smtClean="0"/>
+              <a:rPr lang="en-US"/>
               <a:t>Edit Master text styles</a:t>
             </a:r>
           </a:p>
@@ -3113,7 +3939,7 @@
           <a:p>
             <a:pPr lvl="0"/>
             <a:r>
-              <a:rPr lang="en-US" smtClean="0"/>
+              <a:rPr lang="en-US"/>
               <a:t>Edit Master text styles</a:t>
             </a:r>
           </a:p>
@@ -3143,7 +3969,7 @@
           <a:lstStyle/>
           <a:p>
             <a:r>
-              <a:rPr lang="en-US" smtClean="0"/>
+              <a:rPr lang="en-US"/>
               <a:t>Click icon to add picture</a:t>
             </a:r>
             <a:endParaRPr lang="en-GB"/>
@@ -3178,7 +4004,7 @@
           <a:p>
             <a:pPr lvl="0"/>
             <a:r>
-              <a:rPr lang="en-US" smtClean="0"/>
+              <a:rPr lang="en-US"/>
               <a:t>Edit Master text styles</a:t>
             </a:r>
           </a:p>
@@ -3212,7 +4038,7 @@
           <a:p>
             <a:pPr lvl="0"/>
             <a:r>
-              <a:rPr lang="en-US" smtClean="0"/>
+              <a:rPr lang="en-US"/>
               <a:t>Edit Master text styles</a:t>
             </a:r>
           </a:p>
@@ -3272,7 +4098,7 @@
           <a:lstStyle/>
           <a:p>
             <a:r>
-              <a:rPr lang="en-US" smtClean="0"/>
+              <a:rPr lang="en-US"/>
               <a:t>Click icon to add picture</a:t>
             </a:r>
             <a:endParaRPr lang="en-GB"/>
@@ -3303,7 +4129,7 @@
           <a:lstStyle/>
           <a:p>
             <a:r>
-              <a:rPr lang="en-US" smtClean="0"/>
+              <a:rPr lang="en-US"/>
               <a:t>Click to edit Master title style</a:t>
             </a:r>
             <a:endParaRPr lang="en-GB"/>
@@ -3328,7 +4154,7 @@
             <a:fld id="{F46C79FD-C571-418B-AB0F-5EE936C85276}" type="slidenum">
               <a:rPr lang="en-GB" smtClean="0"/>
               <a:pPr/>
-              <a:t>‹#›</a:t>
+              <a:t>‹N›</a:t>
             </a:fld>
             <a:endParaRPr lang="en-GB" dirty="0"/>
           </a:p>
@@ -3356,35 +4182,35 @@
           <a:p>
             <a:pPr lvl="0"/>
             <a:r>
-              <a:rPr lang="en-US" smtClean="0"/>
+              <a:rPr lang="en-US"/>
               <a:t>Edit Master text styles</a:t>
             </a:r>
           </a:p>
           <a:p>
             <a:pPr lvl="1"/>
             <a:r>
-              <a:rPr lang="en-US" smtClean="0"/>
+              <a:rPr lang="en-US"/>
               <a:t>Second level</a:t>
             </a:r>
           </a:p>
           <a:p>
             <a:pPr lvl="2"/>
             <a:r>
-              <a:rPr lang="en-US" smtClean="0"/>
+              <a:rPr lang="en-US"/>
               <a:t>Third level</a:t>
             </a:r>
           </a:p>
           <a:p>
             <a:pPr lvl="3"/>
             <a:r>
-              <a:rPr lang="en-US" smtClean="0"/>
+              <a:rPr lang="en-US"/>
               <a:t>Fourth level</a:t>
             </a:r>
           </a:p>
           <a:p>
             <a:pPr lvl="4"/>
             <a:r>
-              <a:rPr lang="en-US" smtClean="0"/>
+              <a:rPr lang="en-US"/>
               <a:t>Fifth level</a:t>
             </a:r>
             <a:endParaRPr lang="en-GB" dirty="0"/>
@@ -3401,7 +4227,7 @@
   <p:clrMapOvr>
     <a:masterClrMapping/>
   </p:clrMapOvr>
-  <p:extLst mod="1">
+  <p:extLst>
     <p:ext uri="{DCECCB84-F9BA-43D5-87BE-67443E8EF086}">
       <p15:sldGuideLst xmlns:p15="http://schemas.microsoft.com/office/powerpoint/2012/main">
         <p15:guide id="1" orient="horz" pos="3840" userDrawn="1">
@@ -3454,7 +4280,7 @@
           <a:p>
             <a:fld id="{F46C79FD-C571-418B-AB0F-5EE936C85276}" type="slidenum">
               <a:rPr lang="en-GB" smtClean="0"/>
-              <a:t>‹#›</a:t>
+              <a:t>‹N›</a:t>
             </a:fld>
             <a:endParaRPr lang="en-GB"/>
           </a:p>
@@ -3538,7 +4364,7 @@
           <a:p>
             <a:fld id="{F46C79FD-C571-418B-AB0F-5EE936C85276}" type="slidenum">
               <a:rPr lang="en-GB" smtClean="0"/>
-              <a:t>‹#›</a:t>
+              <a:t>‹N›</a:t>
             </a:fld>
             <a:endParaRPr lang="en-GB"/>
           </a:p>
@@ -3705,7 +4531,7 @@
           </a:lstStyle>
           <a:p>
             <a:r>
-              <a:rPr lang="en-US" smtClean="0"/>
+              <a:rPr lang="en-US"/>
               <a:t>Click to edit Master title style</a:t>
             </a:r>
             <a:endParaRPr lang="en-GB" dirty="0"/>
@@ -3859,7 +4685,7 @@
           </a:lstStyle>
           <a:p>
             <a:r>
-              <a:rPr lang="en-US" smtClean="0"/>
+              <a:rPr lang="en-US"/>
               <a:t>Click to edit Master subtitle style</a:t>
             </a:r>
             <a:endParaRPr lang="en-GB" dirty="0"/>
@@ -3900,7 +4726,7 @@
           <a:p>
             <a:pPr lvl="0"/>
             <a:r>
-              <a:rPr lang="en-US" smtClean="0"/>
+              <a:rPr lang="en-US"/>
               <a:t>Edit Master text styles</a:t>
             </a:r>
           </a:p>
@@ -3916,7 +4742,7 @@
   <p:clrMapOvr>
     <a:masterClrMapping/>
   </p:clrMapOvr>
-  <p:extLst mod="1">
+  <p:extLst>
     <p:ext uri="{DCECCB84-F9BA-43D5-87BE-67443E8EF086}">
       <p15:sldGuideLst xmlns:p15="http://schemas.microsoft.com/office/powerpoint/2012/main">
         <p15:guide id="1" orient="horz" pos="3840" userDrawn="1">
@@ -4115,7 +4941,7 @@
           </a:lstStyle>
           <a:p>
             <a:r>
-              <a:rPr lang="en-US" smtClean="0"/>
+              <a:rPr lang="en-US"/>
               <a:t>Click to edit Master title style</a:t>
             </a:r>
             <a:endParaRPr lang="en-GB" dirty="0"/>
@@ -4269,7 +5095,7 @@
           </a:lstStyle>
           <a:p>
             <a:r>
-              <a:rPr lang="en-US" smtClean="0"/>
+              <a:rPr lang="en-US"/>
               <a:t>Click to edit Master subtitle style</a:t>
             </a:r>
             <a:endParaRPr lang="en-GB" dirty="0"/>
@@ -4340,7 +5166,7 @@
           <a:p>
             <a:pPr lvl="0"/>
             <a:r>
-              <a:rPr lang="en-US" smtClean="0"/>
+              <a:rPr lang="en-US"/>
               <a:t>Edit Master text styles</a:t>
             </a:r>
           </a:p>
@@ -4356,7 +5182,7 @@
   <p:clrMapOvr>
     <a:masterClrMapping/>
   </p:clrMapOvr>
-  <p:extLst mod="1">
+  <p:extLst>
     <p:ext uri="{DCECCB84-F9BA-43D5-87BE-67443E8EF086}">
       <p15:sldGuideLst xmlns:p15="http://schemas.microsoft.com/office/powerpoint/2012/main">
         <p15:guide id="1" orient="horz" pos="3840" userDrawn="1">
@@ -4471,7 +5297,7 @@
           </a:lstStyle>
           <a:p>
             <a:r>
-              <a:rPr lang="en-US" smtClean="0"/>
+              <a:rPr lang="en-US"/>
               <a:t>Click to edit Master title style</a:t>
             </a:r>
             <a:endParaRPr lang="en-GB" dirty="0"/>
@@ -4542,7 +5368,7 @@
           </a:lstStyle>
           <a:p>
             <a:r>
-              <a:rPr lang="en-US" smtClean="0"/>
+              <a:rPr lang="en-US"/>
               <a:t>Click to edit Master subtitle style</a:t>
             </a:r>
             <a:endParaRPr lang="en-GB" dirty="0"/>
@@ -4577,7 +5403,7 @@
             <a:fld id="{F46C79FD-C571-418B-AB0F-5EE936C85276}" type="slidenum">
               <a:rPr lang="en-GB" smtClean="0"/>
               <a:pPr/>
-              <a:t>‹#›</a:t>
+              <a:t>‹N›</a:t>
             </a:fld>
             <a:endParaRPr lang="en-GB" dirty="0"/>
           </a:p>
@@ -4745,7 +5571,7 @@
           <a:p>
             <a:fld id="{F46C79FD-C571-418B-AB0F-5EE936C85276}" type="slidenum">
               <a:rPr lang="en-GB" smtClean="0"/>
-              <a:t>‹#›</a:t>
+              <a:t>‹N›</a:t>
             </a:fld>
             <a:endParaRPr lang="en-GB"/>
           </a:p>
@@ -4812,7 +5638,7 @@
           </a:lstStyle>
           <a:p>
             <a:r>
-              <a:rPr lang="en-US" smtClean="0"/>
+              <a:rPr lang="en-US"/>
               <a:t>Click to edit Master title style</a:t>
             </a:r>
             <a:endParaRPr lang="en-GB" dirty="0"/>
@@ -4918,7 +5744,7 @@
           </a:lstStyle>
           <a:p>
             <a:r>
-              <a:rPr lang="en-US" smtClean="0"/>
+              <a:rPr lang="en-US"/>
               <a:t>Click to edit Master subtitle style</a:t>
             </a:r>
             <a:endParaRPr lang="en-GB" dirty="0"/>
@@ -5022,7 +5848,7 @@
           <a:p>
             <a:fld id="{F46C79FD-C571-418B-AB0F-5EE936C85276}" type="slidenum">
               <a:rPr lang="en-GB" smtClean="0"/>
-              <a:t>‹#›</a:t>
+              <a:t>‹N›</a:t>
             </a:fld>
             <a:endParaRPr lang="en-GB"/>
           </a:p>
@@ -5059,7 +5885,7 @@
           </a:lstStyle>
           <a:p>
             <a:r>
-              <a:rPr lang="en-US" smtClean="0"/>
+              <a:rPr lang="en-US"/>
               <a:t>Click to edit Master title style</a:t>
             </a:r>
             <a:endParaRPr lang="en-GB" dirty="0"/>
@@ -5167,7 +5993,7 @@
           </a:lstStyle>
           <a:p>
             <a:r>
-              <a:rPr lang="en-US" smtClean="0"/>
+              <a:rPr lang="en-US"/>
               <a:t>Click to edit Master subtitle style</a:t>
             </a:r>
             <a:endParaRPr lang="en-GB" dirty="0"/>
@@ -5184,7 +6010,7 @@
   <p:clrMapOvr>
     <a:masterClrMapping/>
   </p:clrMapOvr>
-  <p:extLst mod="1">
+  <p:extLst>
     <p:ext uri="{DCECCB84-F9BA-43D5-87BE-67443E8EF086}">
       <p15:sldGuideLst xmlns:p15="http://schemas.microsoft.com/office/powerpoint/2012/main">
         <p15:guide id="1" orient="horz" pos="3840" userDrawn="1">
@@ -5287,7 +6113,7 @@
           <a:p>
             <a:fld id="{F46C79FD-C571-418B-AB0F-5EE936C85276}" type="slidenum">
               <a:rPr lang="en-GB" smtClean="0"/>
-              <a:t>‹#›</a:t>
+              <a:t>‹N›</a:t>
             </a:fld>
             <a:endParaRPr lang="en-GB"/>
           </a:p>
@@ -5324,7 +6150,7 @@
           </a:lstStyle>
           <a:p>
             <a:r>
-              <a:rPr lang="en-US" smtClean="0"/>
+              <a:rPr lang="en-US"/>
               <a:t>Click to edit Master title style</a:t>
             </a:r>
             <a:endParaRPr lang="en-GB" dirty="0"/>
@@ -5432,7 +6258,7 @@
           </a:lstStyle>
           <a:p>
             <a:r>
-              <a:rPr lang="en-US" smtClean="0"/>
+              <a:rPr lang="en-US"/>
               <a:t>Click to edit Master subtitle style</a:t>
             </a:r>
             <a:endParaRPr lang="en-GB" dirty="0"/>
@@ -5449,7 +6275,7 @@
   <p:clrMapOvr>
     <a:masterClrMapping/>
   </p:clrMapOvr>
-  <p:extLst mod="1">
+  <p:extLst>
     <p:ext uri="{DCECCB84-F9BA-43D5-87BE-67443E8EF086}">
       <p15:sldGuideLst xmlns:p15="http://schemas.microsoft.com/office/powerpoint/2012/main">
         <p15:guide id="1" orient="horz" pos="3840" userDrawn="1">
@@ -5558,35 +6384,35 @@
           <a:p>
             <a:pPr lvl="0"/>
             <a:r>
-              <a:rPr lang="en-US" smtClean="0"/>
+              <a:rPr lang="en-US"/>
               <a:t>Edit Master text styles</a:t>
             </a:r>
           </a:p>
           <a:p>
             <a:pPr lvl="1"/>
             <a:r>
-              <a:rPr lang="en-US" smtClean="0"/>
+              <a:rPr lang="en-US"/>
               <a:t>Second level</a:t>
             </a:r>
           </a:p>
           <a:p>
             <a:pPr lvl="2"/>
             <a:r>
-              <a:rPr lang="en-US" smtClean="0"/>
+              <a:rPr lang="en-US"/>
               <a:t>Third level</a:t>
             </a:r>
           </a:p>
           <a:p>
             <a:pPr lvl="3"/>
             <a:r>
-              <a:rPr lang="en-US" smtClean="0"/>
+              <a:rPr lang="en-US"/>
               <a:t>Fourth level</a:t>
             </a:r>
           </a:p>
           <a:p>
             <a:pPr lvl="4"/>
             <a:r>
-              <a:rPr lang="en-US" smtClean="0"/>
+              <a:rPr lang="en-US"/>
               <a:t>Fifth level</a:t>
             </a:r>
             <a:endParaRPr lang="en-GB" dirty="0"/>
@@ -5612,7 +6438,7 @@
           <a:p>
             <a:fld id="{F46C79FD-C571-418B-AB0F-5EE936C85276}" type="slidenum">
               <a:rPr lang="en-GB" smtClean="0"/>
-              <a:t>‹#›</a:t>
+              <a:t>‹N›</a:t>
             </a:fld>
             <a:endParaRPr lang="en-GB"/>
           </a:p>
@@ -5679,7 +6505,7 @@
           <a:lstStyle/>
           <a:p>
             <a:r>
-              <a:rPr lang="en-US" smtClean="0"/>
+              <a:rPr lang="en-US"/>
               <a:t>Click to edit Master title style</a:t>
             </a:r>
             <a:endParaRPr lang="en-GB" dirty="0"/>
@@ -5771,35 +6597,35 @@
           <a:p>
             <a:pPr lvl="0"/>
             <a:r>
-              <a:rPr lang="en-US" smtClean="0"/>
+              <a:rPr lang="en-US"/>
               <a:t>Edit Master text styles</a:t>
             </a:r>
           </a:p>
           <a:p>
             <a:pPr lvl="1"/>
             <a:r>
-              <a:rPr lang="en-US" smtClean="0"/>
+              <a:rPr lang="en-US"/>
               <a:t>Second level</a:t>
             </a:r>
           </a:p>
           <a:p>
             <a:pPr lvl="2"/>
             <a:r>
-              <a:rPr lang="en-US" smtClean="0"/>
+              <a:rPr lang="en-US"/>
               <a:t>Third level</a:t>
             </a:r>
           </a:p>
           <a:p>
             <a:pPr lvl="3"/>
             <a:r>
-              <a:rPr lang="en-US" smtClean="0"/>
+              <a:rPr lang="en-US"/>
               <a:t>Fourth level</a:t>
             </a:r>
           </a:p>
           <a:p>
             <a:pPr lvl="4"/>
             <a:r>
-              <a:rPr lang="en-US" smtClean="0"/>
+              <a:rPr lang="en-US"/>
               <a:t>Fifth level</a:t>
             </a:r>
             <a:endParaRPr lang="en-GB" dirty="0"/>
@@ -5836,7 +6662,7 @@
           <a:p>
             <a:pPr lvl="0"/>
             <a:r>
-              <a:rPr lang="en-US" smtClean="0"/>
+              <a:rPr lang="en-US"/>
               <a:t>Edit Master text styles</a:t>
             </a:r>
           </a:p>
@@ -5861,7 +6687,7 @@
           <a:p>
             <a:fld id="{F46C79FD-C571-418B-AB0F-5EE936C85276}" type="slidenum">
               <a:rPr lang="en-GB" smtClean="0"/>
-              <a:t>‹#›</a:t>
+              <a:t>‹N›</a:t>
             </a:fld>
             <a:endParaRPr lang="en-GB"/>
           </a:p>
@@ -5928,7 +6754,7 @@
           <a:lstStyle/>
           <a:p>
             <a:r>
-              <a:rPr lang="en-US" smtClean="0"/>
+              <a:rPr lang="en-US"/>
               <a:t>Click to edit Master title style</a:t>
             </a:r>
             <a:endParaRPr lang="en-GB" dirty="0"/>
@@ -5996,7 +6822,7 @@
           <a:lstStyle/>
           <a:p>
             <a:r>
-              <a:rPr lang="en-US" smtClean="0"/>
+              <a:rPr lang="en-US"/>
               <a:t>Click to edit Master title style</a:t>
             </a:r>
             <a:endParaRPr lang="en-GB" dirty="0"/>
@@ -6103,7 +6929,7 @@
             <a:fld id="{F46C79FD-C571-418B-AB0F-5EE936C85276}" type="slidenum">
               <a:rPr lang="en-GB" smtClean="0"/>
               <a:pPr/>
-              <a:t>‹#›</a:t>
+              <a:t>‹N›</a:t>
             </a:fld>
             <a:endParaRPr lang="en-GB" dirty="0"/>
           </a:p>
@@ -6507,8 +7333,8 @@
         </p:nvSpPr>
         <p:spPr>
           <a:xfrm>
-            <a:off x="-3115652" y="-3824784"/>
-            <a:ext cx="11975873" cy="16035834"/>
+            <a:off x="-3112915" y="-4047260"/>
+            <a:ext cx="11975873" cy="20911574"/>
           </a:xfrm>
           <a:prstGeom prst="rect">
             <a:avLst/>
@@ -6602,15 +7428,16 @@
         <p:nvCxnSpPr>
           <p:cNvPr id="9" name="Straight Arrow Connector 8"/>
           <p:cNvCxnSpPr>
+            <a:cxnSpLocks/>
             <a:stCxn id="7" idx="2"/>
             <a:endCxn id="11" idx="0"/>
           </p:cNvCxnSpPr>
           <p:nvPr/>
         </p:nvCxnSpPr>
         <p:spPr>
-          <a:xfrm>
-            <a:off x="2815356" y="-2970419"/>
-            <a:ext cx="0" cy="654903"/>
+          <a:xfrm flipH="1">
+            <a:off x="2813260" y="-2970419"/>
+            <a:ext cx="2096" cy="574225"/>
           </a:xfrm>
           <a:prstGeom prst="straightConnector1">
             <a:avLst/>
@@ -6645,8 +7472,8 @@
         </p:nvSpPr>
         <p:spPr>
           <a:xfrm>
-            <a:off x="1380256" y="-2315516"/>
-            <a:ext cx="2870199" cy="748795"/>
+            <a:off x="1304944" y="-2396194"/>
+            <a:ext cx="3016632" cy="748795"/>
           </a:xfrm>
           <a:prstGeom prst="rect">
             <a:avLst/>
@@ -6675,16 +7502,10 @@
           <a:p>
             <a:pPr algn="ctr"/>
             <a:r>
-              <a:rPr lang="en-GB" sz="2133" b="1" i="1" dirty="0" smtClean="0">
-                <a:latin typeface="EC Square Sans Cond Pro" panose="020B0506040000020004" pitchFamily="34" charset="0"/>
-              </a:rPr>
-              <a:t>[MIWP Sub-group</a:t>
-            </a:r>
-            <a:r>
               <a:rPr lang="en-GB" sz="2133" b="1" i="1" dirty="0">
                 <a:latin typeface="EC Square Sans Cond Pro" panose="020B0506040000020004" pitchFamily="34" charset="0"/>
               </a:rPr>
-              <a:t>]</a:t>
+              <a:t>[MIWP Sub-group]</a:t>
             </a:r>
           </a:p>
         </p:txBody>
@@ -6920,13 +7741,7 @@
               <a:rPr lang="en-GB" sz="2133" dirty="0">
                 <a:latin typeface="EC Square Sans Cond Pro" panose="020B0506040000020004" pitchFamily="34" charset="0"/>
               </a:rPr>
-              <a:t>a</a:t>
-            </a:r>
-            <a:r>
-              <a:rPr lang="en-GB" sz="2133" dirty="0" smtClean="0">
-                <a:latin typeface="EC Square Sans Cond Pro" panose="020B0506040000020004" pitchFamily="34" charset="0"/>
-              </a:rPr>
-              <a:t>sk to amend</a:t>
+              <a:t>ask to amend</a:t>
             </a:r>
             <a:endParaRPr lang="en-GB" sz="2133" i="1" dirty="0">
               <a:latin typeface="EC Square Sans Cond Pro" panose="020B0506040000020004" pitchFamily="34" charset="0"/>
@@ -7197,8 +8012,8 @@
         </p:nvSpPr>
         <p:spPr>
           <a:xfrm>
-            <a:off x="1236746" y="3969579"/>
-            <a:ext cx="3157219" cy="748795"/>
+            <a:off x="1236745" y="3969579"/>
+            <a:ext cx="3204000" cy="748795"/>
           </a:xfrm>
           <a:prstGeom prst="rect">
             <a:avLst/>
@@ -7218,14 +8033,11 @@
           <a:p>
             <a:pPr algn="ctr"/>
             <a:r>
-              <a:rPr lang="en-GB" sz="2133" dirty="0" smtClean="0">
+              <a:rPr lang="en-GB" sz="2133" dirty="0">
                 <a:latin typeface="EC Square Sans Cond Pro" panose="020B0506040000020004" pitchFamily="34" charset="0"/>
               </a:rPr>
               <a:t>Two-week objection period</a:t>
             </a:r>
-            <a:endParaRPr lang="en-GB" sz="2133" dirty="0">
-              <a:latin typeface="EC Square Sans Cond Pro" panose="020B0506040000020004" pitchFamily="34" charset="0"/>
-            </a:endParaRPr>
           </a:p>
           <a:p>
             <a:pPr algn="ctr"/>
@@ -7268,13 +8080,7 @@
               <a:rPr lang="en-GB" sz="2133" dirty="0">
                 <a:latin typeface="EC Square Sans Cond Pro" panose="020B0506040000020004" pitchFamily="34" charset="0"/>
               </a:rPr>
-              <a:t>ask to </a:t>
-            </a:r>
-            <a:r>
-              <a:rPr lang="en-GB" sz="2133" dirty="0" smtClean="0">
-                <a:latin typeface="EC Square Sans Cond Pro" panose="020B0506040000020004" pitchFamily="34" charset="0"/>
-              </a:rPr>
-              <a:t>amend</a:t>
+              <a:t>ask to amend</a:t>
             </a:r>
             <a:endParaRPr lang="en-GB" sz="2133" i="1" dirty="0">
               <a:latin typeface="EC Square Sans Cond Pro" panose="020B0506040000020004" pitchFamily="34" charset="0"/>
@@ -7286,18 +8092,21 @@
         <p:nvCxnSpPr>
           <p:cNvPr id="79" name="Straight Arrow Connector 78"/>
           <p:cNvCxnSpPr>
+            <a:cxnSpLocks/>
             <a:stCxn id="52" idx="2"/>
-            <a:endCxn id="142" idx="0"/>
+            <a:endCxn id="16" idx="0"/>
           </p:cNvCxnSpPr>
           <p:nvPr/>
         </p:nvCxnSpPr>
         <p:spPr>
-          <a:xfrm flipH="1">
-            <a:off x="2815355" y="8787607"/>
-            <a:ext cx="1" cy="628763"/>
-          </a:xfrm>
-          <a:prstGeom prst="straightConnector1">
-            <a:avLst/>
+          <a:xfrm rot="16200000" flipH="1">
+            <a:off x="-201027" y="9777284"/>
+            <a:ext cx="2611480" cy="3421283"/>
+          </a:xfrm>
+          <a:prstGeom prst="bentConnector3">
+            <a:avLst>
+              <a:gd name="adj1" fmla="val 73544"/>
+            </a:avLst>
           </a:prstGeom>
           <a:ln w="15875">
             <a:solidFill>
@@ -7325,17 +8134,18 @@
         <p:nvCxnSpPr>
           <p:cNvPr id="86" name="Straight Arrow Connector 85"/>
           <p:cNvCxnSpPr>
-            <a:stCxn id="142" idx="3"/>
+            <a:cxnSpLocks/>
+            <a:stCxn id="142" idx="2"/>
             <a:endCxn id="88" idx="1"/>
           </p:cNvCxnSpPr>
           <p:nvPr/>
         </p:nvCxnSpPr>
         <p:spPr>
-          <a:xfrm>
-            <a:off x="3211355" y="9812370"/>
-            <a:ext cx="2554164" cy="1"/>
-          </a:xfrm>
-          <a:prstGeom prst="straightConnector1">
+          <a:xfrm rot="16200000" flipH="1">
+            <a:off x="3833433" y="7880284"/>
+            <a:ext cx="927375" cy="2936797"/>
+          </a:xfrm>
+          <a:prstGeom prst="bentConnector2">
             <a:avLst/>
           </a:prstGeom>
           <a:ln w="15875">
@@ -7394,13 +8204,7 @@
               <a:rPr lang="en-GB" sz="2133" dirty="0">
                 <a:latin typeface="EC Square Sans Cond Pro" panose="020B0506040000020004" pitchFamily="34" charset="0"/>
               </a:rPr>
-              <a:t>r</a:t>
-            </a:r>
-            <a:r>
-              <a:rPr lang="en-GB" sz="2133" dirty="0" smtClean="0">
-                <a:latin typeface="EC Square Sans Cond Pro" panose="020B0506040000020004" pitchFamily="34" charset="0"/>
-              </a:rPr>
-              <a:t>equires update of IR</a:t>
+              <a:t>requires update of IR</a:t>
             </a:r>
             <a:endParaRPr lang="en-GB" sz="2133" i="1" dirty="0">
               <a:latin typeface="EC Square Sans Cond Pro" panose="020B0506040000020004" pitchFamily="34" charset="0"/>
@@ -7437,26 +8241,20 @@
           <a:p>
             <a:pPr algn="ctr"/>
             <a:r>
-              <a:rPr lang="en-GB" sz="2133" dirty="0" smtClean="0">
+              <a:rPr lang="en-GB" sz="2133" dirty="0">
                 <a:latin typeface="EC Square Sans Cond Pro" panose="020B0506040000020004" pitchFamily="34" charset="0"/>
               </a:rPr>
               <a:t>Draft amendment of IR</a:t>
             </a:r>
-            <a:endParaRPr lang="en-GB" sz="2133" dirty="0">
-              <a:latin typeface="EC Square Sans Cond Pro" panose="020B0506040000020004" pitchFamily="34" charset="0"/>
-            </a:endParaRPr>
           </a:p>
           <a:p>
             <a:pPr algn="ctr"/>
             <a:r>
-              <a:rPr lang="en-GB" sz="2133" b="1" i="1" dirty="0" smtClean="0">
+              <a:rPr lang="en-GB" sz="2133" b="1" i="1" dirty="0">
                 <a:latin typeface="EC Square Sans Cond Pro" panose="020B0506040000020004" pitchFamily="34" charset="0"/>
               </a:rPr>
               <a:t>[INSPIRE CT]</a:t>
             </a:r>
-            <a:endParaRPr lang="en-GB" sz="2133" b="1" i="1" dirty="0">
-              <a:latin typeface="EC Square Sans Cond Pro" panose="020B0506040000020004" pitchFamily="34" charset="0"/>
-            </a:endParaRPr>
           </a:p>
         </p:txBody>
       </p:sp>
@@ -7472,7 +8270,7 @@
         <p:spPr>
           <a:xfrm>
             <a:off x="7200619" y="10186768"/>
-            <a:ext cx="0" cy="728970"/>
+            <a:ext cx="0" cy="642162"/>
           </a:xfrm>
           <a:prstGeom prst="straightConnector1">
             <a:avLst/>
@@ -7507,7 +8305,7 @@
         </p:nvSpPr>
         <p:spPr>
           <a:xfrm>
-            <a:off x="5765519" y="10915738"/>
+            <a:off x="5765519" y="10828930"/>
             <a:ext cx="2870199" cy="1077026"/>
           </a:xfrm>
           <a:prstGeom prst="rect">
@@ -7528,39 +8326,33 @@
           <a:p>
             <a:pPr algn="ctr"/>
             <a:r>
-              <a:rPr lang="en-GB" sz="2133" dirty="0" smtClean="0">
+              <a:rPr lang="en-GB" sz="2133" dirty="0">
                 <a:latin typeface="EC Square Sans Cond Pro" panose="020B0506040000020004" pitchFamily="34" charset="0"/>
               </a:rPr>
               <a:t>Comitology procedure</a:t>
             </a:r>
-            <a:endParaRPr lang="en-GB" sz="2133" dirty="0">
-              <a:latin typeface="EC Square Sans Cond Pro" panose="020B0506040000020004" pitchFamily="34" charset="0"/>
-            </a:endParaRPr>
           </a:p>
           <a:p>
             <a:pPr algn="ctr"/>
             <a:r>
-              <a:rPr lang="en-GB" sz="2133" b="1" i="1" dirty="0" smtClean="0">
+              <a:rPr lang="en-GB" sz="2133" b="1" i="1" dirty="0">
                 <a:latin typeface="EC Square Sans Cond Pro" panose="020B0506040000020004" pitchFamily="34" charset="0"/>
               </a:rPr>
               <a:t>[EC, INSPIRE Committee, EP, Council]</a:t>
             </a:r>
-            <a:endParaRPr lang="en-GB" sz="2133" b="1" i="1" dirty="0">
-              <a:latin typeface="EC Square Sans Cond Pro" panose="020B0506040000020004" pitchFamily="34" charset="0"/>
-            </a:endParaRPr>
-          </a:p>
-        </p:txBody>
-      </p:sp>
-      <p:sp>
-        <p:nvSpPr>
-          <p:cNvPr id="91" name="TextBox 90"/>
+          </a:p>
+        </p:txBody>
+      </p:sp>
+      <p:sp>
+        <p:nvSpPr>
+          <p:cNvPr id="93" name="TextBox 92"/>
           <p:cNvSpPr txBox="1"/>
           <p:nvPr/>
         </p:nvSpPr>
         <p:spPr>
           <a:xfrm>
-            <a:off x="3048160" y="9971625"/>
-            <a:ext cx="2199805" cy="611771"/>
+            <a:off x="663360" y="386135"/>
+            <a:ext cx="1704091" cy="355290"/>
           </a:xfrm>
           <a:prstGeom prst="rect">
             <a:avLst/>
@@ -7585,13 +8377,7 @@
               <a:rPr lang="en-GB" sz="2133" dirty="0">
                 <a:latin typeface="EC Square Sans Cond Pro" panose="020B0506040000020004" pitchFamily="34" charset="0"/>
               </a:rPr>
-              <a:t>r</a:t>
-            </a:r>
-            <a:r>
-              <a:rPr lang="en-GB" sz="2133" dirty="0" smtClean="0">
-                <a:latin typeface="EC Square Sans Cond Pro" panose="020B0506040000020004" pitchFamily="34" charset="0"/>
-              </a:rPr>
-              <a:t>equires update of XML schemas</a:t>
+              <a:t>major change</a:t>
             </a:r>
             <a:endParaRPr lang="en-GB" sz="2133" i="1" dirty="0">
               <a:latin typeface="EC Square Sans Cond Pro" panose="020B0506040000020004" pitchFamily="34" charset="0"/>
@@ -7601,14 +8387,14 @@
       </p:sp>
       <p:sp>
         <p:nvSpPr>
-          <p:cNvPr id="92" name="TextBox 91"/>
+          <p:cNvPr id="52" name="TextBox 51"/>
           <p:cNvSpPr txBox="1"/>
           <p:nvPr/>
         </p:nvSpPr>
         <p:spPr>
           <a:xfrm>
-            <a:off x="1643604" y="10921755"/>
-            <a:ext cx="3812611" cy="1077026"/>
+            <a:off x="-2041028" y="9433391"/>
+            <a:ext cx="2870199" cy="748795"/>
           </a:xfrm>
           <a:prstGeom prst="rect">
             <a:avLst/>
@@ -7628,114 +8414,11 @@
           <a:p>
             <a:pPr algn="ctr"/>
             <a:r>
-              <a:rPr lang="en-GB" sz="2133" dirty="0" smtClean="0">
-                <a:latin typeface="EC Square Sans Cond Pro" panose="020B0506040000020004" pitchFamily="34" charset="0"/>
-              </a:rPr>
-              <a:t>Update XML schemas </a:t>
-            </a:r>
-            <a:endParaRPr lang="en-GB" sz="2133" dirty="0">
-              <a:latin typeface="EC Square Sans Cond Pro" panose="020B0506040000020004" pitchFamily="34" charset="0"/>
-            </a:endParaRPr>
-          </a:p>
-          <a:p>
-            <a:pPr algn="ctr"/>
-            <a:r>
-              <a:rPr lang="en-GB" sz="2133" b="1" i="1" dirty="0" smtClean="0">
-                <a:latin typeface="EC Square Sans Cond Pro" panose="020B0506040000020004" pitchFamily="34" charset="0"/>
-              </a:rPr>
-              <a:t>[Actors of schemas governance process]</a:t>
-            </a:r>
-            <a:endParaRPr lang="en-GB" sz="2133" b="1" i="1" dirty="0">
-              <a:latin typeface="EC Square Sans Cond Pro" panose="020B0506040000020004" pitchFamily="34" charset="0"/>
-            </a:endParaRPr>
-          </a:p>
-        </p:txBody>
-      </p:sp>
-      <p:sp>
-        <p:nvSpPr>
-          <p:cNvPr id="93" name="TextBox 92"/>
-          <p:cNvSpPr txBox="1"/>
-          <p:nvPr/>
-        </p:nvSpPr>
-        <p:spPr>
-          <a:xfrm>
-            <a:off x="663360" y="386135"/>
-            <a:ext cx="1704091" cy="355290"/>
-          </a:xfrm>
-          <a:prstGeom prst="rect">
-            <a:avLst/>
-          </a:prstGeom>
-          <a:noFill/>
-          <a:ln w="19050">
-            <a:noFill/>
-          </a:ln>
-        </p:spPr>
-        <p:txBody>
-          <a:bodyPr wrap="square" rtlCol="0" anchor="ctr" anchorCtr="0">
-            <a:spAutoFit/>
-          </a:bodyPr>
-          <a:lstStyle/>
-          <a:p>
-            <a:pPr algn="ctr">
-              <a:lnSpc>
-                <a:spcPts val="2000"/>
-              </a:lnSpc>
-            </a:pPr>
-            <a:r>
-              <a:rPr lang="en-GB" sz="2133" dirty="0" smtClean="0">
-                <a:latin typeface="EC Square Sans Cond Pro" panose="020B0506040000020004" pitchFamily="34" charset="0"/>
-              </a:rPr>
-              <a:t>major change</a:t>
-            </a:r>
-            <a:endParaRPr lang="en-GB" sz="2133" i="1" dirty="0">
-              <a:latin typeface="EC Square Sans Cond Pro" panose="020B0506040000020004" pitchFamily="34" charset="0"/>
-            </a:endParaRPr>
-          </a:p>
-        </p:txBody>
-      </p:sp>
-      <p:sp>
-        <p:nvSpPr>
-          <p:cNvPr id="52" name="TextBox 51"/>
-          <p:cNvSpPr txBox="1"/>
-          <p:nvPr/>
-        </p:nvSpPr>
-        <p:spPr>
-          <a:xfrm>
-            <a:off x="1380256" y="8038812"/>
-            <a:ext cx="2870199" cy="748795"/>
-          </a:xfrm>
-          <a:prstGeom prst="rect">
-            <a:avLst/>
-          </a:prstGeom>
-          <a:noFill/>
-          <a:ln w="19050">
-            <a:solidFill>
-              <a:srgbClr val="0356B1"/>
-            </a:solidFill>
-          </a:ln>
-        </p:spPr>
-        <p:txBody>
-          <a:bodyPr wrap="square" rtlCol="0" anchor="ctr" anchorCtr="0">
-            <a:spAutoFit/>
-          </a:bodyPr>
-          <a:lstStyle/>
-          <a:p>
-            <a:pPr algn="ctr"/>
-            <a:r>
               <a:rPr lang="en-GB" sz="2133" dirty="0">
                 <a:latin typeface="EC Square Sans Cond Pro" panose="020B0506040000020004" pitchFamily="34" charset="0"/>
               </a:rPr>
-              <a:t>Update </a:t>
-            </a:r>
-            <a:r>
-              <a:rPr lang="en-GB" sz="2133" dirty="0" smtClean="0">
-                <a:latin typeface="EC Square Sans Cond Pro" panose="020B0506040000020004" pitchFamily="34" charset="0"/>
-              </a:rPr>
-              <a:t>TG</a:t>
-            </a:r>
-            <a:endParaRPr lang="en-GB" sz="2133" dirty="0">
-              <a:latin typeface="EC Square Sans Cond Pro" panose="020B0506040000020004" pitchFamily="34" charset="0"/>
-            </a:endParaRPr>
+              <a:t>Update TG</a:t>
+            </a:r>
           </a:p>
           <a:p>
             <a:pPr algn="ctr"/>
@@ -7969,12 +8652,6 @@
               </a:rPr>
               <a:t>END</a:t>
             </a:r>
-            <a:endParaRPr lang="en-GB" sz="2130" dirty="0">
-              <a:solidFill>
-                <a:schemeClr val="tx1"/>
-              </a:solidFill>
-              <a:latin typeface="EC Square Sans Cond Pro" panose="020B0506040000020004" pitchFamily="34" charset="0"/>
-            </a:endParaRPr>
           </a:p>
         </p:txBody>
       </p:sp>
@@ -8020,15 +8697,16 @@
         <p:nvCxnSpPr>
           <p:cNvPr id="103" name="Straight Arrow Connector 102"/>
           <p:cNvCxnSpPr>
+            <a:cxnSpLocks/>
             <a:stCxn id="140" idx="2"/>
-            <a:endCxn id="52" idx="0"/>
+            <a:endCxn id="142" idx="0"/>
           </p:cNvCxnSpPr>
           <p:nvPr/>
         </p:nvCxnSpPr>
         <p:spPr>
           <a:xfrm>
             <a:off x="2815355" y="6123129"/>
-            <a:ext cx="1" cy="1915683"/>
+            <a:ext cx="13367" cy="1969867"/>
           </a:xfrm>
           <a:prstGeom prst="straightConnector1">
             <a:avLst/>
@@ -8102,8 +8780,8 @@
         </p:nvSpPr>
         <p:spPr>
           <a:xfrm>
-            <a:off x="1233823" y="6826956"/>
-            <a:ext cx="1605233" cy="605294"/>
+            <a:off x="1183022" y="6826956"/>
+            <a:ext cx="1692000" cy="605294"/>
           </a:xfrm>
           <a:prstGeom prst="rect">
             <a:avLst/>
@@ -8125,7 +8803,7 @@
               </a:lnSpc>
             </a:pPr>
             <a:r>
-              <a:rPr lang="en-GB" sz="2133" dirty="0" smtClean="0">
+              <a:rPr lang="en-GB" sz="2133" dirty="0">
                 <a:latin typeface="EC Square Sans Cond Pro" panose="020B0506040000020004" pitchFamily="34" charset="0"/>
               </a:rPr>
               <a:t>no objections raised</a:t>
@@ -8176,15 +8854,16 @@
         <p:nvCxnSpPr>
           <p:cNvPr id="112" name="Straight Arrow Connector 111"/>
           <p:cNvCxnSpPr>
+            <a:cxnSpLocks/>
             <a:stCxn id="141" idx="2"/>
-            <a:endCxn id="52" idx="3"/>
+            <a:endCxn id="142" idx="3"/>
           </p:cNvCxnSpPr>
           <p:nvPr/>
         </p:nvCxnSpPr>
         <p:spPr>
           <a:xfrm rot="5400000">
-            <a:off x="4855023" y="6861800"/>
-            <a:ext cx="946843" cy="2155977"/>
+            <a:off x="4304263" y="6386826"/>
+            <a:ext cx="1022629" cy="3181710"/>
           </a:xfrm>
           <a:prstGeom prst="bentConnector2">
             <a:avLst/>
@@ -8242,7 +8921,7 @@
               </a:lnSpc>
             </a:pPr>
             <a:r>
-              <a:rPr lang="en-GB" sz="2133" dirty="0" smtClean="0">
+              <a:rPr lang="en-GB" sz="2133" dirty="0">
                 <a:latin typeface="EC Square Sans Cond Pro" panose="020B0506040000020004" pitchFamily="34" charset="0"/>
               </a:rPr>
               <a:t>objections raised</a:t>
@@ -8294,17 +8973,8 @@
               <a:rPr lang="en-GB" sz="2133" b="1" i="1" dirty="0">
                 <a:latin typeface="EC Square Sans Cond Pro" panose="020B0506040000020004" pitchFamily="34" charset="0"/>
               </a:rPr>
-              <a:t>[</a:t>
-            </a:r>
-            <a:r>
-              <a:rPr lang="en-GB" sz="2133" b="1" i="1" dirty="0" smtClean="0">
-                <a:latin typeface="EC Square Sans Cond Pro" panose="020B0506040000020004" pitchFamily="34" charset="0"/>
-              </a:rPr>
-              <a:t>MIG]</a:t>
-            </a:r>
-            <a:endParaRPr lang="en-GB" sz="2133" b="1" i="1" dirty="0">
-              <a:latin typeface="EC Square Sans Cond Pro" panose="020B0506040000020004" pitchFamily="34" charset="0"/>
-            </a:endParaRPr>
+              <a:t>[MIG]</a:t>
+            </a:r>
           </a:p>
         </p:txBody>
       </p:sp>
@@ -8415,13 +9085,7 @@
               <a:rPr lang="en-GB" sz="2133" dirty="0">
                 <a:latin typeface="EC Square Sans Cond Pro" panose="020B0506040000020004" pitchFamily="34" charset="0"/>
               </a:rPr>
-              <a:t>a</a:t>
-            </a:r>
-            <a:r>
-              <a:rPr lang="en-GB" sz="2133" dirty="0" smtClean="0">
-                <a:latin typeface="EC Square Sans Cond Pro" panose="020B0506040000020004" pitchFamily="34" charset="0"/>
-              </a:rPr>
-              <a:t>sk to amend</a:t>
+              <a:t>ask to amend</a:t>
             </a:r>
             <a:endParaRPr lang="en-GB" sz="2133" i="1" dirty="0">
               <a:latin typeface="EC Square Sans Cond Pro" panose="020B0506040000020004" pitchFamily="34" charset="0"/>
@@ -8549,7 +9213,7 @@
           <a:p>
             <a:pPr algn="ctr"/>
             <a:r>
-              <a:rPr lang="en-GB" sz="2130" dirty="0" smtClean="0">
+              <a:rPr lang="en-GB" sz="2130" dirty="0">
                 <a:solidFill>
                   <a:schemeClr val="tx1"/>
                 </a:solidFill>
@@ -8564,15 +9228,16 @@
         <p:nvCxnSpPr>
           <p:cNvPr id="77" name="Straight Arrow Connector 76"/>
           <p:cNvCxnSpPr>
+            <a:cxnSpLocks/>
             <a:stCxn id="11" idx="2"/>
             <a:endCxn id="134" idx="0"/>
           </p:cNvCxnSpPr>
           <p:nvPr/>
         </p:nvCxnSpPr>
         <p:spPr>
-          <a:xfrm flipH="1">
-            <a:off x="2815355" y="-1566721"/>
-            <a:ext cx="1" cy="611545"/>
+          <a:xfrm>
+            <a:off x="2813260" y="-1647399"/>
+            <a:ext cx="2095" cy="692223"/>
           </a:xfrm>
           <a:prstGeom prst="straightConnector1">
             <a:avLst/>
@@ -8629,13 +9294,7 @@
               <a:rPr lang="en-GB" sz="2133" dirty="0">
                 <a:latin typeface="EC Square Sans Cond Pro" panose="020B0506040000020004" pitchFamily="34" charset="0"/>
               </a:rPr>
-              <a:t>a</a:t>
-            </a:r>
-            <a:r>
-              <a:rPr lang="en-GB" sz="2133" dirty="0" smtClean="0">
-                <a:latin typeface="EC Square Sans Cond Pro" panose="020B0506040000020004" pitchFamily="34" charset="0"/>
-              </a:rPr>
-              <a:t>sk to amend</a:t>
+              <a:t>ask to amend</a:t>
             </a:r>
             <a:endParaRPr lang="en-GB" sz="2133" i="1" dirty="0">
               <a:latin typeface="EC Square Sans Cond Pro" panose="020B0506040000020004" pitchFamily="34" charset="0"/>
@@ -8806,7 +9465,7 @@
           <a:p>
             <a:pPr algn="ctr"/>
             <a:r>
-              <a:rPr lang="en-GB" sz="2133" dirty="0" smtClean="0">
+              <a:rPr lang="en-GB" sz="2133" dirty="0">
                 <a:latin typeface="EC Square Sans Cond Pro" panose="020B0506040000020004" pitchFamily="34" charset="0"/>
               </a:rPr>
               <a:t>review</a:t>
@@ -8814,142 +9473,6 @@
             <a:endParaRPr lang="en-GB" sz="2133" i="1" dirty="0">
               <a:latin typeface="EC Square Sans Cond Pro" panose="020B0506040000020004" pitchFamily="34" charset="0"/>
             </a:endParaRPr>
-          </a:p>
-        </p:txBody>
-      </p:sp>
-      <p:sp>
-        <p:nvSpPr>
-          <p:cNvPr id="98" name="TextBox 97"/>
-          <p:cNvSpPr txBox="1"/>
-          <p:nvPr/>
-        </p:nvSpPr>
-        <p:spPr>
-          <a:xfrm>
-            <a:off x="-2443784" y="9273857"/>
-            <a:ext cx="2870199" cy="1077026"/>
-          </a:xfrm>
-          <a:prstGeom prst="rect">
-            <a:avLst/>
-          </a:prstGeom>
-          <a:noFill/>
-          <a:ln w="19050">
-            <a:solidFill>
-              <a:srgbClr val="0356B1"/>
-            </a:solidFill>
-          </a:ln>
-        </p:spPr>
-        <p:txBody>
-          <a:bodyPr wrap="square" rtlCol="0" anchor="ctr" anchorCtr="0">
-            <a:spAutoFit/>
-          </a:bodyPr>
-          <a:lstStyle/>
-          <a:p>
-            <a:pPr algn="ctr"/>
-            <a:r>
-              <a:rPr lang="en-GB" sz="2133" dirty="0" smtClean="0">
-                <a:latin typeface="EC Square Sans Cond Pro" panose="020B0506040000020004" pitchFamily="34" charset="0"/>
-              </a:rPr>
-              <a:t>Update validator</a:t>
-            </a:r>
-            <a:endParaRPr lang="en-GB" sz="2133" dirty="0">
-              <a:latin typeface="EC Square Sans Cond Pro" panose="020B0506040000020004" pitchFamily="34" charset="0"/>
-            </a:endParaRPr>
-          </a:p>
-          <a:p>
-            <a:pPr algn="ctr"/>
-            <a:r>
-              <a:rPr lang="en-GB" sz="2133" b="1" i="1" dirty="0" smtClean="0">
-                <a:latin typeface="EC Square Sans Cond Pro" panose="020B0506040000020004" pitchFamily="34" charset="0"/>
-              </a:rPr>
-              <a:t>[Actors of validator governance structure]</a:t>
-            </a:r>
-            <a:endParaRPr lang="en-GB" sz="2133" b="1" i="1" dirty="0">
-              <a:latin typeface="EC Square Sans Cond Pro" panose="020B0506040000020004" pitchFamily="34" charset="0"/>
-            </a:endParaRPr>
-          </a:p>
-        </p:txBody>
-      </p:sp>
-      <p:cxnSp>
-        <p:nvCxnSpPr>
-          <p:cNvPr id="99" name="Straight Arrow Connector 98"/>
-          <p:cNvCxnSpPr>
-            <a:stCxn id="142" idx="1"/>
-            <a:endCxn id="98" idx="3"/>
-          </p:cNvCxnSpPr>
-          <p:nvPr/>
-        </p:nvCxnSpPr>
-        <p:spPr>
-          <a:xfrm flipH="1">
-            <a:off x="426415" y="9812370"/>
-            <a:ext cx="1992940" cy="0"/>
-          </a:xfrm>
-          <a:prstGeom prst="straightConnector1">
-            <a:avLst/>
-          </a:prstGeom>
-          <a:ln w="15875">
-            <a:solidFill>
-              <a:schemeClr val="tx1"/>
-            </a:solidFill>
-            <a:tailEnd type="triangle" w="lg" len="lg"/>
-          </a:ln>
-        </p:spPr>
-        <p:style>
-          <a:lnRef idx="1">
-            <a:schemeClr val="accent1"/>
-          </a:lnRef>
-          <a:fillRef idx="0">
-            <a:schemeClr val="accent1"/>
-          </a:fillRef>
-          <a:effectRef idx="0">
-            <a:schemeClr val="accent1"/>
-          </a:effectRef>
-          <a:fontRef idx="minor">
-            <a:schemeClr val="tx1"/>
-          </a:fontRef>
-        </p:style>
-      </p:cxnSp>
-      <p:sp>
-        <p:nvSpPr>
-          <p:cNvPr id="100" name="TextBox 99"/>
-          <p:cNvSpPr txBox="1"/>
-          <p:nvPr/>
-        </p:nvSpPr>
-        <p:spPr>
-          <a:xfrm>
-            <a:off x="602757" y="9225838"/>
-            <a:ext cx="1874500" cy="611771"/>
-          </a:xfrm>
-          <a:prstGeom prst="rect">
-            <a:avLst/>
-          </a:prstGeom>
-          <a:noFill/>
-          <a:ln w="19050">
-            <a:noFill/>
-          </a:ln>
-        </p:spPr>
-        <p:txBody>
-          <a:bodyPr wrap="square" rtlCol="0" anchor="ctr" anchorCtr="0">
-            <a:spAutoFit/>
-          </a:bodyPr>
-          <a:lstStyle/>
-          <a:p>
-            <a:pPr algn="ctr">
-              <a:lnSpc>
-                <a:spcPts val="2000"/>
-              </a:lnSpc>
-            </a:pPr>
-            <a:r>
-              <a:rPr lang="en-GB" sz="2133" dirty="0">
-                <a:latin typeface="EC Square Sans Cond Pro" panose="020B0506040000020004" pitchFamily="34" charset="0"/>
-              </a:rPr>
-              <a:t>r</a:t>
-            </a:r>
-            <a:r>
-              <a:rPr lang="en-GB" sz="2133" dirty="0" smtClean="0">
-                <a:latin typeface="EC Square Sans Cond Pro" panose="020B0506040000020004" pitchFamily="34" charset="0"/>
-              </a:rPr>
-              <a:t>equires update of validator</a:t>
-            </a:r>
           </a:p>
         </p:txBody>
       </p:sp>
@@ -8998,7 +9521,7 @@
           <a:p>
             <a:pPr algn="ctr"/>
             <a:r>
-              <a:rPr lang="da-DK" sz="1400" dirty="0" err="1" smtClean="0">
+              <a:rPr lang="da-DK" sz="1400" dirty="0" err="1">
                 <a:solidFill>
                   <a:srgbClr val="000000"/>
                 </a:solidFill>
@@ -9007,7 +9530,7 @@
               <a:t>further</a:t>
             </a:r>
             <a:r>
-              <a:rPr lang="da-DK" sz="1400" dirty="0" smtClean="0">
+              <a:rPr lang="da-DK" sz="1400" dirty="0">
                 <a:solidFill>
                   <a:srgbClr val="000000"/>
                 </a:solidFill>
@@ -9016,7 +9539,7 @@
               <a:t> info </a:t>
             </a:r>
             <a:r>
-              <a:rPr lang="da-DK" sz="1400" dirty="0" err="1" smtClean="0">
+              <a:rPr lang="da-DK" sz="1400" dirty="0" err="1">
                 <a:solidFill>
                   <a:srgbClr val="000000"/>
                 </a:solidFill>
@@ -9078,7 +9601,7 @@
           <a:p>
             <a:pPr algn="ctr"/>
             <a:r>
-              <a:rPr lang="da-DK" sz="1400" dirty="0" err="1" smtClean="0">
+              <a:rPr lang="da-DK" sz="1400" dirty="0" err="1">
                 <a:solidFill>
                   <a:srgbClr val="000000"/>
                 </a:solidFill>
@@ -9087,7 +9610,7 @@
               <a:t>further</a:t>
             </a:r>
             <a:r>
-              <a:rPr lang="da-DK" sz="1400" dirty="0" smtClean="0">
+              <a:rPr lang="da-DK" sz="1400" dirty="0">
                 <a:solidFill>
                   <a:srgbClr val="000000"/>
                 </a:solidFill>
@@ -9096,7 +9619,7 @@
               <a:t> info </a:t>
             </a:r>
             <a:r>
-              <a:rPr lang="da-DK" sz="1400" dirty="0" err="1" smtClean="0">
+              <a:rPr lang="da-DK" sz="1400" dirty="0" err="1">
                 <a:solidFill>
                   <a:srgbClr val="000000"/>
                 </a:solidFill>
@@ -9158,7 +9681,7 @@
           <a:p>
             <a:pPr algn="ctr"/>
             <a:r>
-              <a:rPr lang="da-DK" sz="1400" dirty="0" err="1" smtClean="0">
+              <a:rPr lang="da-DK" sz="1400" dirty="0" err="1">
                 <a:solidFill>
                   <a:srgbClr val="000000"/>
                 </a:solidFill>
@@ -9167,7 +9690,7 @@
               <a:t>further</a:t>
             </a:r>
             <a:r>
-              <a:rPr lang="da-DK" sz="1400" dirty="0" smtClean="0">
+              <a:rPr lang="da-DK" sz="1400" dirty="0">
                 <a:solidFill>
                   <a:srgbClr val="000000"/>
                 </a:solidFill>
@@ -9176,7 +9699,7 @@
               <a:t> info </a:t>
             </a:r>
             <a:r>
-              <a:rPr lang="da-DK" sz="1400" dirty="0" err="1" smtClean="0">
+              <a:rPr lang="da-DK" sz="1400" dirty="0" err="1">
                 <a:solidFill>
                   <a:srgbClr val="000000"/>
                 </a:solidFill>
@@ -9238,7 +9761,7 @@
           <a:p>
             <a:pPr algn="ctr"/>
             <a:r>
-              <a:rPr lang="da-DK" sz="1400" dirty="0" err="1" smtClean="0">
+              <a:rPr lang="da-DK" sz="1400" dirty="0" err="1">
                 <a:solidFill>
                   <a:srgbClr val="000000"/>
                 </a:solidFill>
@@ -9247,7 +9770,7 @@
               <a:t>further</a:t>
             </a:r>
             <a:r>
-              <a:rPr lang="da-DK" sz="1400" dirty="0" smtClean="0">
+              <a:rPr lang="da-DK" sz="1400" dirty="0">
                 <a:solidFill>
                   <a:srgbClr val="000000"/>
                 </a:solidFill>
@@ -9256,7 +9779,7 @@
               <a:t> info </a:t>
             </a:r>
             <a:r>
-              <a:rPr lang="da-DK" sz="1400" dirty="0" err="1" smtClean="0">
+              <a:rPr lang="da-DK" sz="1400" dirty="0" err="1">
                 <a:solidFill>
                   <a:srgbClr val="000000"/>
                 </a:solidFill>
@@ -9318,7 +9841,7 @@
           <a:p>
             <a:pPr algn="ctr"/>
             <a:r>
-              <a:rPr lang="da-DK" sz="1400" dirty="0" smtClean="0">
+              <a:rPr lang="da-DK" sz="1400" dirty="0">
                 <a:solidFill>
                   <a:schemeClr val="bg1"/>
                 </a:solidFill>
@@ -9326,12 +9849,6 @@
               </a:rPr>
               <a:t>for INSPIRE MIG-T</a:t>
             </a:r>
-            <a:endParaRPr lang="da-DK" sz="1400" dirty="0">
-              <a:solidFill>
-                <a:schemeClr val="bg1"/>
-              </a:solidFill>
-              <a:latin typeface="EC Square Sans Cond Pro" panose="020B0506040000020004"/>
-            </a:endParaRPr>
           </a:p>
         </p:txBody>
       </p:sp>
@@ -9380,7 +9897,7 @@
           <a:p>
             <a:pPr algn="ctr"/>
             <a:r>
-              <a:rPr lang="da-DK" sz="1400" dirty="0" smtClean="0">
+              <a:rPr lang="da-DK" sz="1400" dirty="0">
                 <a:solidFill>
                   <a:schemeClr val="bg1"/>
                 </a:solidFill>
@@ -9388,12 +9905,6 @@
               </a:rPr>
               <a:t>for INSPIRE CT</a:t>
             </a:r>
-            <a:endParaRPr lang="da-DK" sz="1400" dirty="0">
-              <a:solidFill>
-                <a:schemeClr val="bg1"/>
-              </a:solidFill>
-              <a:latin typeface="EC Square Sans Cond Pro" panose="020B0506040000020004"/>
-            </a:endParaRPr>
           </a:p>
         </p:txBody>
       </p:sp>
@@ -9442,7 +9953,7 @@
           <a:p>
             <a:pPr algn="ctr"/>
             <a:r>
-              <a:rPr lang="da-DK" sz="1400" dirty="0" smtClean="0">
+              <a:rPr lang="da-DK" sz="1400" dirty="0">
                 <a:solidFill>
                   <a:srgbClr val="000000"/>
                 </a:solidFill>
@@ -9450,12 +9961,6 @@
               </a:rPr>
               <a:t>for INSPIRE MIG</a:t>
             </a:r>
-            <a:endParaRPr lang="da-DK" sz="1400" dirty="0">
-              <a:solidFill>
-                <a:srgbClr val="000000"/>
-              </a:solidFill>
-              <a:latin typeface="EC Square Sans Cond Pro" panose="020B0506040000020004"/>
-            </a:endParaRPr>
           </a:p>
         </p:txBody>
       </p:sp>
@@ -9468,7 +9973,7 @@
         <p:spPr>
           <a:xfrm>
             <a:off x="2972716" y="5955053"/>
-            <a:ext cx="2183832" cy="298186"/>
+            <a:ext cx="2232000" cy="298186"/>
           </a:xfrm>
           <a:prstGeom prst="roundRect">
             <a:avLst>
@@ -9504,7 +10009,7 @@
           <a:p>
             <a:pPr algn="ctr"/>
             <a:r>
-              <a:rPr lang="da-DK" sz="1400" dirty="0" smtClean="0">
+              <a:rPr lang="da-DK" sz="1400" dirty="0">
                 <a:solidFill>
                   <a:schemeClr val="bg1"/>
                 </a:solidFill>
@@ -9513,7 +10018,7 @@
               <a:t>for INSPIRE MIG </a:t>
             </a:r>
             <a:r>
-              <a:rPr lang="da-DK" sz="1400" dirty="0" err="1" smtClean="0">
+              <a:rPr lang="da-DK" sz="1400" dirty="0" err="1">
                 <a:solidFill>
                   <a:schemeClr val="bg1"/>
                 </a:solidFill>
@@ -9538,8 +10043,8 @@
         </p:nvSpPr>
         <p:spPr>
           <a:xfrm>
-            <a:off x="4748652" y="7826447"/>
-            <a:ext cx="926157" cy="298186"/>
+            <a:off x="4890891" y="7826447"/>
+            <a:ext cx="972000" cy="298186"/>
           </a:xfrm>
           <a:prstGeom prst="roundRect">
             <a:avLst>
@@ -9575,7 +10080,7 @@
           <a:p>
             <a:pPr algn="ctr"/>
             <a:r>
-              <a:rPr lang="da-DK" sz="1400" dirty="0" err="1" smtClean="0">
+              <a:rPr lang="da-DK" sz="1400" dirty="0" err="1">
                 <a:solidFill>
                   <a:schemeClr val="bg1"/>
                 </a:solidFill>
@@ -9637,7 +10142,7 @@
           <a:p>
             <a:pPr algn="ctr"/>
             <a:r>
-              <a:rPr lang="da-DK" sz="1400" dirty="0" smtClean="0">
+              <a:rPr lang="da-DK" sz="1400" dirty="0">
                 <a:solidFill>
                   <a:schemeClr val="bg1"/>
                 </a:solidFill>
@@ -9646,7 +10151,7 @@
               <a:t>for </a:t>
             </a:r>
             <a:r>
-              <a:rPr lang="da-DK" sz="1400" dirty="0" err="1" smtClean="0">
+              <a:rPr lang="da-DK" sz="1400" dirty="0" err="1">
                 <a:solidFill>
                   <a:schemeClr val="bg1"/>
                 </a:solidFill>
@@ -9671,7 +10176,7 @@
         </p:nvSpPr>
         <p:spPr>
           <a:xfrm>
-            <a:off x="4654712" y="8957764"/>
+            <a:off x="3707188" y="8957298"/>
             <a:ext cx="1232715" cy="298186"/>
           </a:xfrm>
           <a:prstGeom prst="roundRect">
@@ -9708,7 +10213,7 @@
           <a:p>
             <a:pPr algn="ctr"/>
             <a:r>
-              <a:rPr lang="da-DK" sz="1400" dirty="0" err="1" smtClean="0">
+              <a:rPr lang="da-DK" sz="1400" dirty="0" err="1">
                 <a:solidFill>
                   <a:schemeClr val="bg1"/>
                 </a:solidFill>
@@ -9717,7 +10222,7 @@
               <a:t>impact</a:t>
             </a:r>
             <a:r>
-              <a:rPr lang="da-DK" sz="1400" dirty="0" smtClean="0">
+              <a:rPr lang="da-DK" sz="1400" dirty="0">
                 <a:solidFill>
                   <a:schemeClr val="bg1"/>
                 </a:solidFill>
@@ -9725,12 +10230,221 @@
               </a:rPr>
               <a:t> on IR</a:t>
             </a:r>
-            <a:endParaRPr lang="da-DK" sz="1400" dirty="0">
-              <a:solidFill>
-                <a:schemeClr val="bg1"/>
-              </a:solidFill>
-              <a:latin typeface="EC Square Sans Cond Pro" panose="020B0506040000020004"/>
+          </a:p>
+        </p:txBody>
+      </p:sp>
+      <p:cxnSp>
+        <p:nvCxnSpPr>
+          <p:cNvPr id="25" name="Straight Arrow Connector 24"/>
+          <p:cNvCxnSpPr>
+            <a:cxnSpLocks/>
+            <a:stCxn id="16" idx="3"/>
+            <a:endCxn id="92" idx="1"/>
+          </p:cNvCxnSpPr>
+          <p:nvPr/>
+        </p:nvCxnSpPr>
+        <p:spPr>
+          <a:xfrm>
+            <a:off x="3211355" y="13189666"/>
+            <a:ext cx="1576635" cy="754488"/>
+          </a:xfrm>
+          <a:prstGeom prst="bentConnector3">
+            <a:avLst>
+              <a:gd name="adj1" fmla="val 50000"/>
+            </a:avLst>
+          </a:prstGeom>
+          <a:ln w="15875">
+            <a:solidFill>
+              <a:schemeClr val="tx1"/>
+            </a:solidFill>
+            <a:tailEnd type="triangle" w="lg" len="lg"/>
+          </a:ln>
+        </p:spPr>
+        <p:style>
+          <a:lnRef idx="1">
+            <a:schemeClr val="accent1"/>
+          </a:lnRef>
+          <a:fillRef idx="0">
+            <a:schemeClr val="accent1"/>
+          </a:fillRef>
+          <a:effectRef idx="0">
+            <a:schemeClr val="accent1"/>
+          </a:effectRef>
+          <a:fontRef idx="minor">
+            <a:schemeClr val="tx1"/>
+          </a:fontRef>
+        </p:style>
+      </p:cxnSp>
+      <p:sp>
+        <p:nvSpPr>
+          <p:cNvPr id="91" name="TextBox 90"/>
+          <p:cNvSpPr txBox="1"/>
+          <p:nvPr/>
+        </p:nvSpPr>
+        <p:spPr>
+          <a:xfrm>
+            <a:off x="5534543" y="12338407"/>
+            <a:ext cx="2199805" cy="611771"/>
+          </a:xfrm>
+          <a:prstGeom prst="rect">
+            <a:avLst/>
+          </a:prstGeom>
+          <a:noFill/>
+          <a:ln w="19050">
+            <a:noFill/>
+          </a:ln>
+        </p:spPr>
+        <p:txBody>
+          <a:bodyPr wrap="square" rtlCol="0" anchor="ctr" anchorCtr="0">
+            <a:spAutoFit/>
+          </a:bodyPr>
+          <a:lstStyle/>
+          <a:p>
+            <a:pPr algn="ctr">
+              <a:lnSpc>
+                <a:spcPts val="2000"/>
+              </a:lnSpc>
+            </a:pPr>
+            <a:r>
+              <a:rPr lang="en-GB" sz="2133" dirty="0">
+                <a:latin typeface="EC Square Sans Cond Pro" panose="020B0506040000020004" pitchFamily="34" charset="0"/>
+              </a:rPr>
+              <a:t>requires update of XML schemas</a:t>
+            </a:r>
+            <a:endParaRPr lang="en-GB" sz="2133" i="1" dirty="0">
+              <a:latin typeface="EC Square Sans Cond Pro" panose="020B0506040000020004" pitchFamily="34" charset="0"/>
             </a:endParaRPr>
+          </a:p>
+        </p:txBody>
+      </p:sp>
+      <p:sp>
+        <p:nvSpPr>
+          <p:cNvPr id="92" name="TextBox 91"/>
+          <p:cNvSpPr txBox="1"/>
+          <p:nvPr/>
+        </p:nvSpPr>
+        <p:spPr>
+          <a:xfrm>
+            <a:off x="4787990" y="13405641"/>
+            <a:ext cx="3812611" cy="1077026"/>
+          </a:xfrm>
+          <a:prstGeom prst="rect">
+            <a:avLst/>
+          </a:prstGeom>
+          <a:noFill/>
+          <a:ln w="19050">
+            <a:solidFill>
+              <a:srgbClr val="0356B1"/>
+            </a:solidFill>
+          </a:ln>
+        </p:spPr>
+        <p:txBody>
+          <a:bodyPr wrap="square" rtlCol="0" anchor="ctr" anchorCtr="0">
+            <a:spAutoFit/>
+          </a:bodyPr>
+          <a:lstStyle/>
+          <a:p>
+            <a:pPr algn="ctr"/>
+            <a:r>
+              <a:rPr lang="en-GB" sz="2133" dirty="0">
+                <a:latin typeface="EC Square Sans Cond Pro" panose="020B0506040000020004" pitchFamily="34" charset="0"/>
+              </a:rPr>
+              <a:t>Update XML schemas </a:t>
+            </a:r>
+          </a:p>
+          <a:p>
+            <a:pPr algn="ctr"/>
+            <a:r>
+              <a:rPr lang="en-GB" sz="2133" b="1" i="1" dirty="0">
+                <a:latin typeface="EC Square Sans Cond Pro" panose="020B0506040000020004" pitchFamily="34" charset="0"/>
+              </a:rPr>
+              <a:t>[Actors of schemas governance process]</a:t>
+            </a:r>
+          </a:p>
+        </p:txBody>
+      </p:sp>
+      <p:sp>
+        <p:nvSpPr>
+          <p:cNvPr id="98" name="TextBox 97"/>
+          <p:cNvSpPr txBox="1"/>
+          <p:nvPr/>
+        </p:nvSpPr>
+        <p:spPr>
+          <a:xfrm>
+            <a:off x="-1886738" y="15514599"/>
+            <a:ext cx="2870199" cy="1077026"/>
+          </a:xfrm>
+          <a:prstGeom prst="rect">
+            <a:avLst/>
+          </a:prstGeom>
+          <a:noFill/>
+          <a:ln w="19050">
+            <a:solidFill>
+              <a:srgbClr val="0356B1"/>
+            </a:solidFill>
+          </a:ln>
+        </p:spPr>
+        <p:txBody>
+          <a:bodyPr wrap="square" rtlCol="0" anchor="ctr" anchorCtr="0">
+            <a:spAutoFit/>
+          </a:bodyPr>
+          <a:lstStyle/>
+          <a:p>
+            <a:pPr algn="ctr"/>
+            <a:r>
+              <a:rPr lang="en-GB" sz="2133" dirty="0">
+                <a:latin typeface="EC Square Sans Cond Pro" panose="020B0506040000020004" pitchFamily="34" charset="0"/>
+              </a:rPr>
+              <a:t>Update validator</a:t>
+            </a:r>
+          </a:p>
+          <a:p>
+            <a:pPr algn="ctr"/>
+            <a:r>
+              <a:rPr lang="en-GB" sz="2133" b="1" i="1" dirty="0">
+                <a:latin typeface="EC Square Sans Cond Pro" panose="020B0506040000020004" pitchFamily="34" charset="0"/>
+              </a:rPr>
+              <a:t>[Actors of validator governance structure]</a:t>
+            </a:r>
+          </a:p>
+        </p:txBody>
+      </p:sp>
+      <p:sp>
+        <p:nvSpPr>
+          <p:cNvPr id="100" name="TextBox 99"/>
+          <p:cNvSpPr txBox="1"/>
+          <p:nvPr/>
+        </p:nvSpPr>
+        <p:spPr>
+          <a:xfrm>
+            <a:off x="-1405366" y="14517841"/>
+            <a:ext cx="1944000" cy="611771"/>
+          </a:xfrm>
+          <a:prstGeom prst="rect">
+            <a:avLst/>
+          </a:prstGeom>
+          <a:noFill/>
+          <a:ln w="19050">
+            <a:noFill/>
+          </a:ln>
+        </p:spPr>
+        <p:txBody>
+          <a:bodyPr wrap="square" rtlCol="0" anchor="ctr" anchorCtr="0">
+            <a:spAutoFit/>
+          </a:bodyPr>
+          <a:lstStyle/>
+          <a:p>
+            <a:pPr algn="ctr">
+              <a:lnSpc>
+                <a:spcPts val="2000"/>
+              </a:lnSpc>
+            </a:pPr>
+            <a:r>
+              <a:rPr lang="en-GB" sz="2133" dirty="0">
+                <a:latin typeface="EC Square Sans Cond Pro" panose="020B0506040000020004" pitchFamily="34" charset="0"/>
+              </a:rPr>
+              <a:t>requires update of validator</a:t>
+            </a:r>
           </a:p>
         </p:txBody>
       </p:sp>
@@ -9742,8 +10456,8 @@
         </p:nvSpPr>
         <p:spPr>
           <a:xfrm>
-            <a:off x="-579843" y="8957381"/>
-            <a:ext cx="1640745" cy="298186"/>
+            <a:off x="-1279366" y="15129612"/>
+            <a:ext cx="1692000" cy="298186"/>
           </a:xfrm>
           <a:prstGeom prst="roundRect">
             <a:avLst>
@@ -9779,7 +10493,7 @@
           <a:p>
             <a:pPr algn="ctr"/>
             <a:r>
-              <a:rPr lang="da-DK" sz="1400" dirty="0" err="1" smtClean="0">
+              <a:rPr lang="da-DK" sz="1400" dirty="0" err="1">
                 <a:solidFill>
                   <a:schemeClr val="bg1"/>
                 </a:solidFill>
@@ -9788,7 +10502,7 @@
               <a:t>impact</a:t>
             </a:r>
             <a:r>
-              <a:rPr lang="da-DK" sz="1400" dirty="0" smtClean="0">
+              <a:rPr lang="da-DK" sz="1400" dirty="0">
                 <a:solidFill>
                   <a:schemeClr val="bg1"/>
                 </a:solidFill>
@@ -9797,7 +10511,7 @@
               <a:t> on </a:t>
             </a:r>
             <a:r>
-              <a:rPr lang="da-DK" sz="1400" dirty="0" err="1" smtClean="0">
+              <a:rPr lang="da-DK" sz="1400" dirty="0" err="1">
                 <a:solidFill>
                   <a:schemeClr val="bg1"/>
                 </a:solidFill>
@@ -9822,8 +10536,8 @@
         </p:nvSpPr>
         <p:spPr>
           <a:xfrm>
-            <a:off x="3685701" y="10565791"/>
-            <a:ext cx="1640745" cy="298186"/>
+            <a:off x="5718908" y="12942552"/>
+            <a:ext cx="1692000" cy="298186"/>
           </a:xfrm>
           <a:prstGeom prst="roundRect">
             <a:avLst>
@@ -9859,7 +10573,7 @@
           <a:p>
             <a:pPr algn="ctr"/>
             <a:r>
-              <a:rPr lang="da-DK" sz="1400" dirty="0" err="1" smtClean="0">
+              <a:rPr lang="da-DK" sz="1400" dirty="0" err="1">
                 <a:solidFill>
                   <a:schemeClr val="bg1"/>
                 </a:solidFill>
@@ -9868,7 +10582,7 @@
               <a:t>impact</a:t>
             </a:r>
             <a:r>
-              <a:rPr lang="da-DK" sz="1400" dirty="0" smtClean="0">
+              <a:rPr lang="da-DK" sz="1400" dirty="0">
                 <a:solidFill>
                   <a:schemeClr val="bg1"/>
                 </a:solidFill>
@@ -9877,7 +10591,7 @@
               <a:t> on </a:t>
             </a:r>
             <a:r>
-              <a:rPr lang="da-DK" sz="1400" dirty="0" err="1" smtClean="0">
+              <a:rPr lang="da-DK" sz="1400" dirty="0" err="1">
                 <a:solidFill>
                   <a:schemeClr val="bg1"/>
                 </a:solidFill>
@@ -9902,7 +10616,7 @@
         </p:nvSpPr>
         <p:spPr>
           <a:xfrm>
-            <a:off x="-2448390" y="10907437"/>
+            <a:off x="4085721" y="15518748"/>
             <a:ext cx="3812611" cy="1077026"/>
           </a:xfrm>
           <a:prstGeom prst="rect">
@@ -9923,111 +10637,23 @@
           <a:p>
             <a:pPr algn="ctr"/>
             <a:r>
-              <a:rPr lang="en-GB" sz="2133" dirty="0" smtClean="0">
+              <a:rPr lang="en-GB" sz="2133" dirty="0">
                 <a:latin typeface="EC Square Sans Cond Pro" panose="020B0506040000020004" pitchFamily="34" charset="0"/>
               </a:rPr>
               <a:t>Update registry contents </a:t>
             </a:r>
-            <a:endParaRPr lang="en-GB" sz="2133" dirty="0">
-              <a:latin typeface="EC Square Sans Cond Pro" panose="020B0506040000020004" pitchFamily="34" charset="0"/>
-            </a:endParaRPr>
           </a:p>
           <a:p>
             <a:pPr algn="ctr"/>
             <a:r>
-              <a:rPr lang="en-GB" sz="2133" b="1" i="1" dirty="0" smtClean="0">
+              <a:rPr lang="en-GB" sz="2133" b="1" i="1" dirty="0">
                 <a:latin typeface="EC Square Sans Cond Pro" panose="020B0506040000020004" pitchFamily="34" charset="0"/>
               </a:rPr>
               <a:t>[Actors of registry governance structure]</a:t>
             </a:r>
-            <a:endParaRPr lang="en-GB" sz="2133" b="1" i="1" dirty="0">
-              <a:latin typeface="EC Square Sans Cond Pro" panose="020B0506040000020004" pitchFamily="34" charset="0"/>
-            </a:endParaRPr>
-          </a:p>
-        </p:txBody>
-      </p:sp>
-      <p:cxnSp>
-        <p:nvCxnSpPr>
-          <p:cNvPr id="25" name="Straight Arrow Connector 24"/>
-          <p:cNvCxnSpPr>
-            <a:stCxn id="142" idx="2"/>
-            <a:endCxn id="92" idx="0"/>
-          </p:cNvCxnSpPr>
-          <p:nvPr/>
-        </p:nvCxnSpPr>
-        <p:spPr>
-          <a:xfrm rot="16200000" flipH="1">
-            <a:off x="2825940" y="10197784"/>
-            <a:ext cx="713385" cy="734555"/>
-          </a:xfrm>
-          <a:prstGeom prst="bentConnector3">
-            <a:avLst>
-              <a:gd name="adj1" fmla="val 44659"/>
-            </a:avLst>
-          </a:prstGeom>
-          <a:ln w="15875">
-            <a:solidFill>
-              <a:schemeClr val="tx1"/>
-            </a:solidFill>
-            <a:tailEnd type="triangle" w="lg" len="lg"/>
-          </a:ln>
-        </p:spPr>
-        <p:style>
-          <a:lnRef idx="1">
-            <a:schemeClr val="accent1"/>
-          </a:lnRef>
-          <a:fillRef idx="0">
-            <a:schemeClr val="accent1"/>
-          </a:fillRef>
-          <a:effectRef idx="0">
-            <a:schemeClr val="accent1"/>
-          </a:effectRef>
-          <a:fontRef idx="minor">
-            <a:schemeClr val="tx1"/>
-          </a:fontRef>
-        </p:style>
-      </p:cxnSp>
-      <p:cxnSp>
-        <p:nvCxnSpPr>
-          <p:cNvPr id="135" name="Straight Arrow Connector 134"/>
-          <p:cNvCxnSpPr>
-            <a:stCxn id="142" idx="2"/>
-            <a:endCxn id="133" idx="0"/>
-          </p:cNvCxnSpPr>
-          <p:nvPr/>
-        </p:nvCxnSpPr>
-        <p:spPr>
-          <a:xfrm rot="5400000">
-            <a:off x="787103" y="8879184"/>
-            <a:ext cx="699067" cy="3357439"/>
-          </a:xfrm>
-          <a:prstGeom prst="bentConnector3">
-            <a:avLst>
-              <a:gd name="adj1" fmla="val 45458"/>
-            </a:avLst>
-          </a:prstGeom>
-          <a:ln w="15875">
-            <a:solidFill>
-              <a:schemeClr val="tx1"/>
-            </a:solidFill>
-            <a:tailEnd type="triangle" w="lg" len="lg"/>
-          </a:ln>
-        </p:spPr>
-        <p:style>
-          <a:lnRef idx="1">
-            <a:schemeClr val="accent1"/>
-          </a:lnRef>
-          <a:fillRef idx="0">
-            <a:schemeClr val="accent1"/>
-          </a:fillRef>
-          <a:effectRef idx="0">
-            <a:schemeClr val="accent1"/>
-          </a:effectRef>
-          <a:fontRef idx="minor">
-            <a:schemeClr val="tx1"/>
-          </a:fontRef>
-        </p:style>
-      </p:cxnSp>
+          </a:p>
+        </p:txBody>
+      </p:sp>
       <p:sp>
         <p:nvSpPr>
           <p:cNvPr id="136" name="TextBox 135"/>
@@ -10036,8 +10662,8 @@
         </p:nvSpPr>
         <p:spPr>
           <a:xfrm>
-            <a:off x="465895" y="9971625"/>
-            <a:ext cx="1874500" cy="611771"/>
+            <a:off x="2893590" y="14543331"/>
+            <a:ext cx="1944000" cy="611771"/>
           </a:xfrm>
           <a:prstGeom prst="rect">
             <a:avLst/>
@@ -10062,13 +10688,7 @@
               <a:rPr lang="en-GB" sz="2133" dirty="0">
                 <a:latin typeface="EC Square Sans Cond Pro" panose="020B0506040000020004" pitchFamily="34" charset="0"/>
               </a:rPr>
-              <a:t>r</a:t>
-            </a:r>
-            <a:r>
-              <a:rPr lang="en-GB" sz="2133" dirty="0" smtClean="0">
-                <a:latin typeface="EC Square Sans Cond Pro" panose="020B0506040000020004" pitchFamily="34" charset="0"/>
-              </a:rPr>
-              <a:t>equires update of registry</a:t>
+              <a:t>requires update of registry</a:t>
             </a:r>
           </a:p>
         </p:txBody>
@@ -10081,7 +10701,7 @@
         </p:nvSpPr>
         <p:spPr>
           <a:xfrm>
-            <a:off x="-445108" y="10603269"/>
+            <a:off x="3045217" y="15152116"/>
             <a:ext cx="1640745" cy="298186"/>
           </a:xfrm>
           <a:prstGeom prst="roundRect">
@@ -10118,7 +10738,7 @@
           <a:p>
             <a:pPr algn="ctr"/>
             <a:r>
-              <a:rPr lang="da-DK" sz="1400" dirty="0" err="1" smtClean="0">
+              <a:rPr lang="da-DK" sz="1400" dirty="0" err="1">
                 <a:solidFill>
                   <a:schemeClr val="bg1"/>
                 </a:solidFill>
@@ -10127,7 +10747,7 @@
               <a:t>impact</a:t>
             </a:r>
             <a:r>
-              <a:rPr lang="da-DK" sz="1400" dirty="0" smtClean="0">
+              <a:rPr lang="da-DK" sz="1400" dirty="0">
                 <a:solidFill>
                   <a:schemeClr val="bg1"/>
                 </a:solidFill>
@@ -10136,7 +10756,7 @@
               <a:t> on </a:t>
             </a:r>
             <a:r>
-              <a:rPr lang="da-DK" sz="1400" dirty="0" err="1" smtClean="0">
+              <a:rPr lang="da-DK" sz="1400" dirty="0" err="1">
                 <a:solidFill>
                   <a:schemeClr val="bg1"/>
                 </a:solidFill>
@@ -10162,7 +10782,7 @@
         <p:spPr>
           <a:xfrm>
             <a:off x="4699647" y="-3106715"/>
-            <a:ext cx="3067049" cy="682835"/>
+            <a:ext cx="3380524" cy="682835"/>
           </a:xfrm>
           <a:prstGeom prst="accentCallout1">
             <a:avLst>
@@ -10200,33 +10820,24 @@
           <a:lstStyle/>
           <a:p>
             <a:r>
-              <a:rPr lang="en-US" sz="1600" i="1" dirty="0" smtClean="0">
+              <a:rPr lang="en-US" sz="1600" i="1" dirty="0">
                 <a:solidFill>
                   <a:schemeClr val="tx1"/>
                 </a:solidFill>
                 <a:latin typeface="EC Square Sans Cond Pro" panose="020B0506040000020004"/>
               </a:rPr>
-              <a:t>Submit as GitHub issue</a:t>
-            </a:r>
-          </a:p>
-          <a:p>
-            <a:r>
-              <a:rPr lang="en-US" sz="1600" i="1" dirty="0" err="1" smtClean="0">
+              <a:t>Submit as a GitHub issue</a:t>
+            </a:r>
+          </a:p>
+          <a:p>
+            <a:r>
+              <a:rPr lang="en-US" sz="1600" i="1" dirty="0">
                 <a:solidFill>
                   <a:schemeClr val="tx1"/>
                 </a:solidFill>
                 <a:latin typeface="EC Square Sans Cond Pro" panose="020B0506040000020004"/>
               </a:rPr>
-              <a:t>accompagnied</a:t>
-            </a:r>
-            <a:r>
-              <a:rPr lang="en-US" sz="1600" i="1" dirty="0" smtClean="0">
-                <a:solidFill>
-                  <a:schemeClr val="tx1"/>
-                </a:solidFill>
-                <a:latin typeface="EC Square Sans Cond Pro" panose="020B0506040000020004"/>
-              </a:rPr>
-              <a:t> by GitHub pull request</a:t>
+              <a:t>accompanied by GitHub pull request</a:t>
             </a:r>
             <a:endParaRPr lang="da-DK" sz="1600" i="1" dirty="0">
               <a:solidFill>
@@ -10268,7 +10879,7 @@
         </p:blipFill>
         <p:spPr>
           <a:xfrm>
-            <a:off x="7625889" y="-2788512"/>
+            <a:off x="7917266" y="-2765298"/>
             <a:ext cx="272728" cy="272728"/>
           </a:xfrm>
           <a:prstGeom prst="rect">
@@ -10298,7 +10909,7 @@
         </p:blipFill>
         <p:spPr>
           <a:xfrm>
-            <a:off x="6559386" y="-3010011"/>
+            <a:off x="6900027" y="-3003423"/>
             <a:ext cx="238125" cy="238125"/>
           </a:xfrm>
           <a:prstGeom prst="rect">
@@ -10314,8 +10925,8 @@
         </p:nvSpPr>
         <p:spPr>
           <a:xfrm>
-            <a:off x="1540228" y="7431164"/>
-            <a:ext cx="926157" cy="298186"/>
+            <a:off x="1540227" y="7431164"/>
+            <a:ext cx="972000" cy="298186"/>
           </a:xfrm>
           <a:prstGeom prst="roundRect">
             <a:avLst>
@@ -10351,7 +10962,7 @@
           <a:p>
             <a:pPr algn="ctr"/>
             <a:r>
-              <a:rPr lang="da-DK" sz="1400" dirty="0" err="1" smtClean="0">
+              <a:rPr lang="da-DK" sz="1400" dirty="0" err="1">
                 <a:solidFill>
                   <a:schemeClr val="bg1"/>
                 </a:solidFill>
@@ -10672,7 +11283,7 @@
         </p:nvSpPr>
         <p:spPr>
           <a:xfrm>
-            <a:off x="2419355" y="9416370"/>
+            <a:off x="2432722" y="8092996"/>
             <a:ext cx="792000" cy="792000"/>
           </a:xfrm>
           <a:prstGeom prst="diamond">
@@ -10849,8 +11460,8 @@
         </p:nvCxnSpPr>
         <p:spPr>
           <a:xfrm rot="16200000" flipH="1">
-            <a:off x="330882" y="1485105"/>
-            <a:ext cx="1324446" cy="3644501"/>
+            <a:off x="342577" y="1473411"/>
+            <a:ext cx="1324446" cy="3667890"/>
           </a:xfrm>
           <a:prstGeom prst="bentConnector3">
             <a:avLst>
@@ -10890,8 +11501,8 @@
         </p:nvCxnSpPr>
         <p:spPr>
           <a:xfrm rot="5400000">
-            <a:off x="3948671" y="1511818"/>
-            <a:ext cx="1324446" cy="3591076"/>
+            <a:off x="3960366" y="1523513"/>
+            <a:ext cx="1324446" cy="3567687"/>
           </a:xfrm>
           <a:prstGeom prst="bentConnector3">
             <a:avLst>
@@ -10949,38 +11560,20 @@
           <a:p>
             <a:pPr algn="ctr"/>
             <a:r>
-              <a:rPr lang="en-GB" sz="2133" dirty="0" smtClean="0">
+              <a:rPr lang="en-GB" sz="2133" dirty="0">
                 <a:latin typeface="EC Square Sans Cond Pro" panose="020B0506040000020004" pitchFamily="34" charset="0"/>
               </a:rPr>
               <a:t>Implement change</a:t>
             </a:r>
-            <a:endParaRPr lang="en-GB" sz="2133" dirty="0">
-              <a:latin typeface="EC Square Sans Cond Pro" panose="020B0506040000020004" pitchFamily="34" charset="0"/>
-            </a:endParaRPr>
           </a:p>
           <a:p>
             <a:pPr algn="ctr"/>
             <a:r>
-              <a:rPr lang="en-GB" sz="2133" b="1" i="1" dirty="0" smtClean="0">
+              <a:rPr lang="en-GB" sz="2133" b="1" i="1" dirty="0">
                 <a:latin typeface="EC Square Sans Cond Pro" panose="020B0506040000020004" pitchFamily="34" charset="0"/>
               </a:rPr>
-              <a:t>[</a:t>
-            </a:r>
-            <a:r>
-              <a:rPr lang="en-GB" sz="2133" b="1" i="1" dirty="0" smtClean="0">
-                <a:latin typeface="EC Square Sans Cond Pro" panose="020B0506040000020004" pitchFamily="34" charset="0"/>
-              </a:rPr>
-              <a:t>JRC</a:t>
-            </a:r>
-            <a:r>
-              <a:rPr lang="en-GB" sz="2133" b="1" i="1" dirty="0" smtClean="0">
-                <a:latin typeface="EC Square Sans Cond Pro" panose="020B0506040000020004" pitchFamily="34" charset="0"/>
-              </a:rPr>
-              <a:t>]</a:t>
-            </a:r>
-            <a:endParaRPr lang="en-GB" sz="2133" b="1" i="1" dirty="0">
-              <a:latin typeface="EC Square Sans Cond Pro" panose="020B0506040000020004" pitchFamily="34" charset="0"/>
-            </a:endParaRPr>
+              <a:t>[JRC]</a:t>
+            </a:r>
           </a:p>
         </p:txBody>
       </p:sp>
@@ -11054,16 +11647,10 @@
               </a:lnSpc>
             </a:pPr>
             <a:r>
-              <a:rPr lang="en-GB" sz="2133" dirty="0" smtClean="0">
+              <a:rPr lang="en-GB" sz="2133" dirty="0">
                 <a:latin typeface="EC Square Sans Cond Pro" panose="020B0506040000020004" pitchFamily="34" charset="0"/>
               </a:rPr>
-              <a:t>trivial </a:t>
-            </a:r>
-            <a:r>
-              <a:rPr lang="en-GB" sz="2133" dirty="0" smtClean="0">
-                <a:latin typeface="EC Square Sans Cond Pro" panose="020B0506040000020004" pitchFamily="34" charset="0"/>
-              </a:rPr>
-              <a:t>change</a:t>
+              <a:t>trivial change</a:t>
             </a:r>
             <a:endParaRPr lang="en-GB" sz="2133" i="1" dirty="0">
               <a:latin typeface="EC Square Sans Cond Pro" panose="020B0506040000020004" pitchFamily="34" charset="0"/>
@@ -11118,28 +11705,629 @@
           <a:p>
             <a:pPr algn="ctr"/>
             <a:r>
-              <a:rPr lang="da-DK" sz="1400" dirty="0" smtClean="0">
+              <a:rPr lang="da-DK" sz="1400" dirty="0">
                 <a:solidFill>
                   <a:srgbClr val="000000"/>
                 </a:solidFill>
                 <a:latin typeface="EC Square Sans Cond Pro" panose="020B0506040000020004"/>
               </a:rPr>
-              <a:t>for </a:t>
-            </a:r>
-            <a:r>
-              <a:rPr lang="da-DK" sz="1400" dirty="0" smtClean="0">
+              <a:t>for JRC</a:t>
+            </a:r>
+          </a:p>
+        </p:txBody>
+      </p:sp>
+      <p:sp>
+        <p:nvSpPr>
+          <p:cNvPr id="16" name="Diamond 141">
+            <a:extLst>
+              <a:ext uri="{FF2B5EF4-FFF2-40B4-BE49-F238E27FC236}">
+                <a16:creationId xmlns:a16="http://schemas.microsoft.com/office/drawing/2014/main" id="{96AFF07E-3F28-A638-BCEB-29C7B54647E3}"/>
+              </a:ext>
+            </a:extLst>
+          </p:cNvPr>
+          <p:cNvSpPr/>
+          <p:nvPr/>
+        </p:nvSpPr>
+        <p:spPr>
+          <a:xfrm>
+            <a:off x="2419355" y="12793666"/>
+            <a:ext cx="792000" cy="792000"/>
+          </a:xfrm>
+          <a:prstGeom prst="diamond">
+            <a:avLst/>
+          </a:prstGeom>
+          <a:noFill/>
+          <a:ln w="19050">
+            <a:solidFill>
+              <a:srgbClr val="0356B1"/>
+            </a:solidFill>
+          </a:ln>
+        </p:spPr>
+        <p:style>
+          <a:lnRef idx="2">
+            <a:schemeClr val="accent1">
+              <a:shade val="50000"/>
+            </a:schemeClr>
+          </a:lnRef>
+          <a:fillRef idx="1">
+            <a:schemeClr val="accent1"/>
+          </a:fillRef>
+          <a:effectRef idx="0">
+            <a:schemeClr val="accent1"/>
+          </a:effectRef>
+          <a:fontRef idx="minor">
+            <a:schemeClr val="lt1"/>
+          </a:fontRef>
+        </p:style>
+        <p:txBody>
+          <a:bodyPr rot="0" spcFirstLastPara="0" vertOverflow="overflow" horzOverflow="overflow" vert="horz" wrap="square" lIns="121920" tIns="60961" rIns="121920" bIns="60961" numCol="1" spcCol="0" rtlCol="0" fromWordArt="0" anchor="ctr" anchorCtr="0" forceAA="0" compatLnSpc="1">
+            <a:prstTxWarp prst="textNoShape">
+              <a:avLst/>
+            </a:prstTxWarp>
+            <a:noAutofit/>
+          </a:bodyPr>
+          <a:lstStyle/>
+          <a:p>
+            <a:pPr algn="ctr"/>
+            <a:endParaRPr lang="en-GB" sz="2401"/>
+          </a:p>
+        </p:txBody>
+      </p:sp>
+      <p:sp>
+        <p:nvSpPr>
+          <p:cNvPr id="18" name="TextBox 86">
+            <a:extLst>
+              <a:ext uri="{FF2B5EF4-FFF2-40B4-BE49-F238E27FC236}">
+                <a16:creationId xmlns:a16="http://schemas.microsoft.com/office/drawing/2014/main" id="{BEE7B066-2588-A17A-7CED-6ACC52963EF1}"/>
+              </a:ext>
+            </a:extLst>
+          </p:cNvPr>
+          <p:cNvSpPr txBox="1"/>
+          <p:nvPr/>
+        </p:nvSpPr>
+        <p:spPr>
+          <a:xfrm>
+            <a:off x="152753" y="8551498"/>
+            <a:ext cx="1704091" cy="869854"/>
+          </a:xfrm>
+          <a:prstGeom prst="rect">
+            <a:avLst/>
+          </a:prstGeom>
+          <a:noFill/>
+          <a:ln w="19050">
+            <a:noFill/>
+          </a:ln>
+        </p:spPr>
+        <p:txBody>
+          <a:bodyPr wrap="square" rtlCol="0" anchor="ctr" anchorCtr="0">
+            <a:spAutoFit/>
+          </a:bodyPr>
+          <a:lstStyle/>
+          <a:p>
+            <a:pPr algn="ctr">
+              <a:lnSpc>
+                <a:spcPts val="2000"/>
+              </a:lnSpc>
+            </a:pPr>
+            <a:r>
+              <a:rPr lang="en-GB" sz="2133" dirty="0">
+                <a:latin typeface="EC Square Sans Cond Pro" panose="020B0506040000020004" pitchFamily="34" charset="0"/>
+              </a:rPr>
+              <a:t>does not require update of IR</a:t>
+            </a:r>
+            <a:endParaRPr lang="en-GB" sz="2133" i="1" dirty="0">
+              <a:latin typeface="EC Square Sans Cond Pro" panose="020B0506040000020004" pitchFamily="34" charset="0"/>
+            </a:endParaRPr>
+          </a:p>
+        </p:txBody>
+      </p:sp>
+      <p:cxnSp>
+        <p:nvCxnSpPr>
+          <p:cNvPr id="31" name="Straight Arrow Connector 24">
+            <a:extLst>
+              <a:ext uri="{FF2B5EF4-FFF2-40B4-BE49-F238E27FC236}">
+                <a16:creationId xmlns:a16="http://schemas.microsoft.com/office/drawing/2014/main" id="{B2388BAB-3266-0889-FCFB-AF045DF4B67C}"/>
+              </a:ext>
+            </a:extLst>
+          </p:cNvPr>
+          <p:cNvCxnSpPr>
+            <a:cxnSpLocks/>
+            <a:stCxn id="16" idx="1"/>
+            <a:endCxn id="98" idx="3"/>
+          </p:cNvCxnSpPr>
+          <p:nvPr/>
+        </p:nvCxnSpPr>
+        <p:spPr>
+          <a:xfrm rot="10800000" flipV="1">
+            <a:off x="983461" y="13189666"/>
+            <a:ext cx="1435894" cy="2863446"/>
+          </a:xfrm>
+          <a:prstGeom prst="bentConnector3">
+            <a:avLst>
+              <a:gd name="adj1" fmla="val 50000"/>
+            </a:avLst>
+          </a:prstGeom>
+          <a:ln w="15875">
+            <a:solidFill>
+              <a:schemeClr val="tx1"/>
+            </a:solidFill>
+            <a:tailEnd type="triangle" w="lg" len="lg"/>
+          </a:ln>
+        </p:spPr>
+        <p:style>
+          <a:lnRef idx="1">
+            <a:schemeClr val="accent1"/>
+          </a:lnRef>
+          <a:fillRef idx="0">
+            <a:schemeClr val="accent1"/>
+          </a:fillRef>
+          <a:effectRef idx="0">
+            <a:schemeClr val="accent1"/>
+          </a:effectRef>
+          <a:fontRef idx="minor">
+            <a:schemeClr val="tx1"/>
+          </a:fontRef>
+        </p:style>
+      </p:cxnSp>
+      <p:cxnSp>
+        <p:nvCxnSpPr>
+          <p:cNvPr id="41" name="Straight Arrow Connector 78">
+            <a:extLst>
+              <a:ext uri="{FF2B5EF4-FFF2-40B4-BE49-F238E27FC236}">
+                <a16:creationId xmlns:a16="http://schemas.microsoft.com/office/drawing/2014/main" id="{FF15170E-5C68-616A-AE52-1CCD84B96C9F}"/>
+              </a:ext>
+            </a:extLst>
+          </p:cNvPr>
+          <p:cNvCxnSpPr>
+            <a:cxnSpLocks/>
+            <a:stCxn id="16" idx="2"/>
+            <a:endCxn id="133" idx="1"/>
+          </p:cNvCxnSpPr>
+          <p:nvPr/>
+        </p:nvCxnSpPr>
+        <p:spPr>
+          <a:xfrm rot="16200000" flipH="1">
+            <a:off x="2214741" y="14186280"/>
+            <a:ext cx="2471595" cy="1270366"/>
+          </a:xfrm>
+          <a:prstGeom prst="bentConnector2">
+            <a:avLst/>
+          </a:prstGeom>
+          <a:ln w="15875">
+            <a:solidFill>
+              <a:schemeClr val="tx1"/>
+            </a:solidFill>
+            <a:tailEnd type="triangle" w="lg" len="lg"/>
+          </a:ln>
+        </p:spPr>
+        <p:style>
+          <a:lnRef idx="1">
+            <a:schemeClr val="accent1"/>
+          </a:lnRef>
+          <a:fillRef idx="0">
+            <a:schemeClr val="accent1"/>
+          </a:fillRef>
+          <a:effectRef idx="0">
+            <a:schemeClr val="accent1"/>
+          </a:effectRef>
+          <a:fontRef idx="minor">
+            <a:schemeClr val="tx1"/>
+          </a:fontRef>
+        </p:style>
+      </p:cxnSp>
+      <p:cxnSp>
+        <p:nvCxnSpPr>
+          <p:cNvPr id="6" name="Straight Arrow Connector 24">
+            <a:extLst>
+              <a:ext uri="{FF2B5EF4-FFF2-40B4-BE49-F238E27FC236}">
+                <a16:creationId xmlns:a16="http://schemas.microsoft.com/office/drawing/2014/main" id="{87FA4D18-9130-6C63-48DD-63C5045BFFD0}"/>
+              </a:ext>
+            </a:extLst>
+          </p:cNvPr>
+          <p:cNvCxnSpPr>
+            <a:cxnSpLocks/>
+            <a:stCxn id="16" idx="1"/>
+            <a:endCxn id="8" idx="3"/>
+          </p:cNvCxnSpPr>
+          <p:nvPr/>
+        </p:nvCxnSpPr>
+        <p:spPr>
+          <a:xfrm rot="10800000" flipV="1">
+            <a:off x="884831" y="13189665"/>
+            <a:ext cx="1534525" cy="3171"/>
+          </a:xfrm>
+          <a:prstGeom prst="bentConnector3">
+            <a:avLst>
+              <a:gd name="adj1" fmla="val 50000"/>
+            </a:avLst>
+          </a:prstGeom>
+          <a:ln w="15875">
+            <a:solidFill>
+              <a:schemeClr val="tx1"/>
+            </a:solidFill>
+            <a:tailEnd type="triangle" w="lg" len="lg"/>
+          </a:ln>
+        </p:spPr>
+        <p:style>
+          <a:lnRef idx="1">
+            <a:schemeClr val="accent1"/>
+          </a:lnRef>
+          <a:fillRef idx="0">
+            <a:schemeClr val="accent1"/>
+          </a:fillRef>
+          <a:effectRef idx="0">
+            <a:schemeClr val="accent1"/>
+          </a:effectRef>
+          <a:fontRef idx="minor">
+            <a:schemeClr val="tx1"/>
+          </a:fontRef>
+        </p:style>
+      </p:cxnSp>
+      <p:sp>
+        <p:nvSpPr>
+          <p:cNvPr id="8" name="TextBox 97">
+            <a:extLst>
+              <a:ext uri="{FF2B5EF4-FFF2-40B4-BE49-F238E27FC236}">
+                <a16:creationId xmlns:a16="http://schemas.microsoft.com/office/drawing/2014/main" id="{6474C2DA-6A96-21E0-C7D4-7FECA945ADF8}"/>
+              </a:ext>
+            </a:extLst>
+          </p:cNvPr>
+          <p:cNvSpPr txBox="1"/>
+          <p:nvPr/>
+        </p:nvSpPr>
+        <p:spPr>
+          <a:xfrm>
+            <a:off x="-1979641" y="12818439"/>
+            <a:ext cx="2864471" cy="748795"/>
+          </a:xfrm>
+          <a:prstGeom prst="rect">
+            <a:avLst/>
+          </a:prstGeom>
+          <a:noFill/>
+          <a:ln w="19050">
+            <a:solidFill>
+              <a:srgbClr val="0356B1"/>
+            </a:solidFill>
+          </a:ln>
+        </p:spPr>
+        <p:txBody>
+          <a:bodyPr wrap="square" rtlCol="0" anchor="ctr" anchorCtr="0">
+            <a:spAutoFit/>
+          </a:bodyPr>
+          <a:lstStyle/>
+          <a:p>
+            <a:pPr algn="ctr"/>
+            <a:r>
+              <a:rPr lang="en-GB" sz="2133" dirty="0">
+                <a:latin typeface="EC Square Sans Cond Pro" panose="020B0506040000020004" pitchFamily="34" charset="0"/>
+              </a:rPr>
+              <a:t>Update UML</a:t>
+            </a:r>
+          </a:p>
+          <a:p>
+            <a:pPr algn="ctr"/>
+            <a:r>
+              <a:rPr lang="en-GB" sz="2133" b="1" i="1" dirty="0">
+                <a:latin typeface="EC Square Sans Cond Pro" panose="020B0506040000020004" pitchFamily="34" charset="0"/>
+              </a:rPr>
+              <a:t>[JRC]</a:t>
+            </a:r>
+          </a:p>
+        </p:txBody>
+      </p:sp>
+      <p:sp>
+        <p:nvSpPr>
+          <p:cNvPr id="10" name="Rounded Rectangle 98">
+            <a:extLst>
+              <a:ext uri="{FF2B5EF4-FFF2-40B4-BE49-F238E27FC236}">
+                <a16:creationId xmlns:a16="http://schemas.microsoft.com/office/drawing/2014/main" id="{F9AC6C59-F878-09DC-B071-2E8690CD74E6}"/>
+              </a:ext>
+            </a:extLst>
+          </p:cNvPr>
+          <p:cNvSpPr/>
+          <p:nvPr/>
+        </p:nvSpPr>
+        <p:spPr>
+          <a:xfrm>
+            <a:off x="-1982799" y="12424754"/>
+            <a:ext cx="1404000" cy="298186"/>
+          </a:xfrm>
+          <a:prstGeom prst="roundRect">
+            <a:avLst>
+              <a:gd name="adj" fmla="val 50000"/>
+            </a:avLst>
+          </a:prstGeom>
+          <a:solidFill>
+            <a:srgbClr val="5EFBBB"/>
+          </a:solidFill>
+          <a:ln>
+            <a:noFill/>
+          </a:ln>
+        </p:spPr>
+        <p:style>
+          <a:lnRef idx="2">
+            <a:schemeClr val="accent1">
+              <a:shade val="50000"/>
+            </a:schemeClr>
+          </a:lnRef>
+          <a:fillRef idx="1">
+            <a:schemeClr val="accent1"/>
+          </a:fillRef>
+          <a:effectRef idx="0">
+            <a:schemeClr val="accent1"/>
+          </a:effectRef>
+          <a:fontRef idx="minor">
+            <a:schemeClr val="lt1"/>
+          </a:fontRef>
+        </p:style>
+        <p:txBody>
+          <a:bodyPr rtlCol="0" anchor="ctr"/>
+          <a:lstStyle/>
+          <a:p>
+            <a:pPr algn="ctr"/>
+            <a:r>
+              <a:rPr lang="da-DK" sz="1400" dirty="0">
                 <a:solidFill>
-                  <a:srgbClr val="000000"/>
+                  <a:schemeClr val="tx1">
+                    <a:lumMod val="50000"/>
+                  </a:schemeClr>
                 </a:solidFill>
                 <a:latin typeface="EC Square Sans Cond Pro" panose="020B0506040000020004"/>
               </a:rPr>
-              <a:t>JRC</a:t>
-            </a:r>
-            <a:endParaRPr lang="da-DK" sz="1400" dirty="0">
-              <a:solidFill>
-                <a:srgbClr val="000000"/>
-              </a:solidFill>
-              <a:latin typeface="EC Square Sans Cond Pro" panose="020B0506040000020004"/>
+              <a:t>impact on UML</a:t>
+            </a:r>
+          </a:p>
+        </p:txBody>
+      </p:sp>
+      <p:sp>
+        <p:nvSpPr>
+          <p:cNvPr id="13" name="TextBox 100">
+            <a:extLst>
+              <a:ext uri="{FF2B5EF4-FFF2-40B4-BE49-F238E27FC236}">
+                <a16:creationId xmlns:a16="http://schemas.microsoft.com/office/drawing/2014/main" id="{7B4BFC3E-0A02-EB34-7B13-B0998A090F9D}"/>
+              </a:ext>
+            </a:extLst>
+          </p:cNvPr>
+          <p:cNvSpPr txBox="1"/>
+          <p:nvPr/>
+        </p:nvSpPr>
+        <p:spPr>
+          <a:xfrm>
+            <a:off x="-2062767" y="11600407"/>
+            <a:ext cx="1652746" cy="869854"/>
+          </a:xfrm>
+          <a:prstGeom prst="rect">
+            <a:avLst/>
+          </a:prstGeom>
+          <a:noFill/>
+          <a:ln w="19050">
+            <a:noFill/>
+          </a:ln>
+        </p:spPr>
+        <p:txBody>
+          <a:bodyPr wrap="square" rtlCol="0" anchor="ctr" anchorCtr="0">
+            <a:spAutoFit/>
+          </a:bodyPr>
+          <a:lstStyle/>
+          <a:p>
+            <a:pPr algn="ctr">
+              <a:lnSpc>
+                <a:spcPts val="2000"/>
+              </a:lnSpc>
+            </a:pPr>
+            <a:r>
+              <a:rPr lang="en-GB" sz="2133" dirty="0">
+                <a:latin typeface="EC Square Sans Cond Pro" panose="020B0506040000020004" pitchFamily="34" charset="0"/>
+              </a:rPr>
+              <a:t>requires update of UML</a:t>
+            </a:r>
+            <a:endParaRPr lang="en-GB" sz="2133" i="1" dirty="0">
+              <a:latin typeface="EC Square Sans Cond Pro" panose="020B0506040000020004" pitchFamily="34" charset="0"/>
+            </a:endParaRPr>
+          </a:p>
+        </p:txBody>
+      </p:sp>
+      <p:cxnSp>
+        <p:nvCxnSpPr>
+          <p:cNvPr id="36" name="Straight Arrow Connector 78">
+            <a:extLst>
+              <a:ext uri="{FF2B5EF4-FFF2-40B4-BE49-F238E27FC236}">
+                <a16:creationId xmlns:a16="http://schemas.microsoft.com/office/drawing/2014/main" id="{F15951F4-414E-A332-4988-FFB640F67C64}"/>
+              </a:ext>
+            </a:extLst>
+          </p:cNvPr>
+          <p:cNvCxnSpPr>
+            <a:cxnSpLocks/>
+            <a:stCxn id="142" idx="1"/>
+            <a:endCxn id="52" idx="0"/>
+          </p:cNvCxnSpPr>
+          <p:nvPr/>
+        </p:nvCxnSpPr>
+        <p:spPr>
+          <a:xfrm rot="10800000" flipV="1">
+            <a:off x="-605928" y="8488995"/>
+            <a:ext cx="3038650" cy="944395"/>
+          </a:xfrm>
+          <a:prstGeom prst="bentConnector2">
+            <a:avLst/>
+          </a:prstGeom>
+          <a:ln w="15875">
+            <a:solidFill>
+              <a:schemeClr val="tx1"/>
+            </a:solidFill>
+            <a:tailEnd type="triangle" w="lg" len="lg"/>
+          </a:ln>
+        </p:spPr>
+        <p:style>
+          <a:lnRef idx="1">
+            <a:schemeClr val="accent1"/>
+          </a:lnRef>
+          <a:fillRef idx="0">
+            <a:schemeClr val="accent1"/>
+          </a:fillRef>
+          <a:effectRef idx="0">
+            <a:schemeClr val="accent1"/>
+          </a:effectRef>
+          <a:fontRef idx="minor">
+            <a:schemeClr val="tx1"/>
+          </a:fontRef>
+        </p:style>
+      </p:cxnSp>
+      <p:cxnSp>
+        <p:nvCxnSpPr>
+          <p:cNvPr id="15" name="Straight Arrow Connector 78">
+            <a:extLst>
+              <a:ext uri="{FF2B5EF4-FFF2-40B4-BE49-F238E27FC236}">
+                <a16:creationId xmlns:a16="http://schemas.microsoft.com/office/drawing/2014/main" id="{50834D82-B7A7-CA75-F723-C1602FD794EF}"/>
+              </a:ext>
+            </a:extLst>
+          </p:cNvPr>
+          <p:cNvCxnSpPr>
+            <a:cxnSpLocks/>
+            <a:stCxn id="90" idx="1"/>
+            <a:endCxn id="52" idx="3"/>
+          </p:cNvCxnSpPr>
+          <p:nvPr/>
+        </p:nvCxnSpPr>
+        <p:spPr>
+          <a:xfrm rot="10800000">
+            <a:off x="829171" y="9807789"/>
+            <a:ext cx="4936348" cy="1559654"/>
+          </a:xfrm>
+          <a:prstGeom prst="bentConnector3">
+            <a:avLst>
+              <a:gd name="adj1" fmla="val 74911"/>
+            </a:avLst>
+          </a:prstGeom>
+          <a:ln w="15875">
+            <a:solidFill>
+              <a:schemeClr val="tx1"/>
+            </a:solidFill>
+            <a:prstDash val="dash"/>
+            <a:tailEnd type="triangle" w="lg" len="lg"/>
+          </a:ln>
+        </p:spPr>
+        <p:style>
+          <a:lnRef idx="1">
+            <a:schemeClr val="accent1"/>
+          </a:lnRef>
+          <a:fillRef idx="0">
+            <a:schemeClr val="accent1"/>
+          </a:fillRef>
+          <a:effectRef idx="0">
+            <a:schemeClr val="accent1"/>
+          </a:effectRef>
+          <a:fontRef idx="minor">
+            <a:schemeClr val="tx1"/>
+          </a:fontRef>
+        </p:style>
+      </p:cxnSp>
+      <p:sp>
+        <p:nvSpPr>
+          <p:cNvPr id="24" name="Rounded Rectangle 127">
+            <a:extLst>
+              <a:ext uri="{FF2B5EF4-FFF2-40B4-BE49-F238E27FC236}">
+                <a16:creationId xmlns:a16="http://schemas.microsoft.com/office/drawing/2014/main" id="{9813C827-84DE-3FA6-9FC3-C074A56944FA}"/>
+              </a:ext>
+            </a:extLst>
+          </p:cNvPr>
+          <p:cNvSpPr/>
+          <p:nvPr/>
+        </p:nvSpPr>
+        <p:spPr>
+          <a:xfrm>
+            <a:off x="3446794" y="10525216"/>
+            <a:ext cx="1355987" cy="298186"/>
+          </a:xfrm>
+          <a:prstGeom prst="roundRect">
+            <a:avLst>
+              <a:gd name="adj" fmla="val 50000"/>
+            </a:avLst>
+          </a:prstGeom>
+          <a:solidFill>
+            <a:srgbClr val="CF8D23"/>
+          </a:solidFill>
+          <a:ln>
+            <a:noFill/>
+          </a:ln>
+        </p:spPr>
+        <p:style>
+          <a:lnRef idx="2">
+            <a:schemeClr val="accent1">
+              <a:shade val="50000"/>
+            </a:schemeClr>
+          </a:lnRef>
+          <a:fillRef idx="1">
+            <a:schemeClr val="accent1"/>
+          </a:fillRef>
+          <a:effectRef idx="0">
+            <a:schemeClr val="accent1"/>
+          </a:effectRef>
+          <a:fontRef idx="minor">
+            <a:schemeClr val="lt1"/>
+          </a:fontRef>
+        </p:style>
+        <p:txBody>
+          <a:bodyPr rtlCol="0" anchor="ctr"/>
+          <a:lstStyle/>
+          <a:p>
+            <a:pPr algn="ctr"/>
+            <a:r>
+              <a:rPr lang="da-DK" sz="1400" dirty="0">
+                <a:solidFill>
+                  <a:schemeClr val="bg1"/>
+                </a:solidFill>
+                <a:latin typeface="EC Square Sans Cond Pro" panose="020B0506040000020004"/>
+              </a:rPr>
+              <a:t>IR revised</a:t>
+            </a:r>
+          </a:p>
+        </p:txBody>
+      </p:sp>
+      <p:sp>
+        <p:nvSpPr>
+          <p:cNvPr id="26" name="TextBox 86">
+            <a:extLst>
+              <a:ext uri="{FF2B5EF4-FFF2-40B4-BE49-F238E27FC236}">
+                <a16:creationId xmlns:a16="http://schemas.microsoft.com/office/drawing/2014/main" id="{E57540F4-5344-D4A0-FD0F-74E90FC1D31F}"/>
+              </a:ext>
+            </a:extLst>
+          </p:cNvPr>
+          <p:cNvSpPr txBox="1"/>
+          <p:nvPr/>
+        </p:nvSpPr>
+        <p:spPr>
+          <a:xfrm>
+            <a:off x="2661163" y="10814324"/>
+            <a:ext cx="2870198" cy="613373"/>
+          </a:xfrm>
+          <a:prstGeom prst="rect">
+            <a:avLst/>
+          </a:prstGeom>
+          <a:noFill/>
+          <a:ln w="19050">
+            <a:noFill/>
+          </a:ln>
+        </p:spPr>
+        <p:txBody>
+          <a:bodyPr wrap="square" rtlCol="0" anchor="ctr" anchorCtr="0">
+            <a:spAutoFit/>
+          </a:bodyPr>
+          <a:lstStyle/>
+          <a:p>
+            <a:pPr algn="ctr">
+              <a:lnSpc>
+                <a:spcPts val="2000"/>
+              </a:lnSpc>
+            </a:pPr>
+            <a:r>
+              <a:rPr lang="en-GB" sz="2133" dirty="0">
+                <a:latin typeface="EC Square Sans Cond Pro" panose="020B0506040000020004" pitchFamily="34" charset="0"/>
+              </a:rPr>
+              <a:t>if endorsed and after publication of revised IR</a:t>
+            </a:r>
+            <a:endParaRPr lang="en-GB" sz="2133" i="1" dirty="0">
+              <a:latin typeface="EC Square Sans Cond Pro" panose="020B0506040000020004" pitchFamily="34" charset="0"/>
             </a:endParaRPr>
           </a:p>
         </p:txBody>
@@ -11147,20 +12335,13 @@
     </p:spTree>
     <p:extLst>
       <p:ext uri="{BB962C8B-B14F-4D97-AF65-F5344CB8AC3E}">
-        <p14:creationId xmlns:p14="http://schemas.microsoft.com/office/powerpoint/2010/main" val="1058563292"/>
+        <p14:creationId xmlns:p14="http://schemas.microsoft.com/office/powerpoint/2010/main" val="1710378541"/>
       </p:ext>
     </p:extLst>
   </p:cSld>
   <p:clrMapOvr>
     <a:masterClrMapping/>
   </p:clrMapOvr>
-  <p:timing>
-    <p:tnLst>
-      <p:par>
-        <p:cTn id="1" dur="indefinite" restart="never" nodeType="tmRoot"/>
-      </p:par>
-    </p:tnLst>
-  </p:timing>
 </p:sld>
 </file>
 

</xml_diff>